<commit_message>
Updating presentation on Mesh Labeling:
</commit_message>
<xml_diff>
--- a/sources/Guo_Mesh_Labeling.pptx
+++ b/sources/Guo_Mesh_Labeling.pptx
@@ -14,8 +14,20 @@
     <p:sldId id="258" r:id="rId8"/>
     <p:sldId id="266" r:id="rId9"/>
     <p:sldId id="263" r:id="rId10"/>
-    <p:sldId id="265" r:id="rId11"/>
-    <p:sldId id="264" r:id="rId12"/>
+    <p:sldId id="267" r:id="rId11"/>
+    <p:sldId id="268" r:id="rId12"/>
+    <p:sldId id="269" r:id="rId13"/>
+    <p:sldId id="270" r:id="rId14"/>
+    <p:sldId id="271" r:id="rId15"/>
+    <p:sldId id="265" r:id="rId16"/>
+    <p:sldId id="264" r:id="rId17"/>
+    <p:sldId id="272" r:id="rId18"/>
+    <p:sldId id="273" r:id="rId19"/>
+    <p:sldId id="274" r:id="rId20"/>
+    <p:sldId id="275" r:id="rId21"/>
+    <p:sldId id="276" r:id="rId22"/>
+    <p:sldId id="277" r:id="rId23"/>
+    <p:sldId id="278" r:id="rId24"/>
   </p:sldIdLst>
   <p:sldSz cx="12192000" cy="6858000"/>
   <p:notesSz cx="6858000" cy="9144000"/>
@@ -3416,7 +3428,7 @@
           <a:p>
             <a:r>
               <a:rPr lang="en-US" dirty="0" smtClean="0"/>
-              <a:t>One feature-set to rule them all</a:t>
+              <a:t>Additional step - Label optimization</a:t>
             </a:r>
             <a:endParaRPr lang="en-US" dirty="0"/>
           </a:p>
@@ -3439,16 +3451,114 @@
           <a:p>
             <a:r>
               <a:rPr lang="en-US" dirty="0" smtClean="0"/>
-              <a:t>The set of features </a:t>
+              <a:t>Obtained a labeled novel mesh. However, there may be slight inconsistencies, as decisions were taken for each triangle separately.</a:t>
+            </a:r>
+          </a:p>
+          <a:p>
+            <a:r>
+              <a:rPr lang="en-US" dirty="0" smtClean="0"/>
+              <a:t>“Smoothen” the labeling by optimizing an appropriate energy function.</a:t>
             </a:r>
             <a:endParaRPr lang="en-US" dirty="0"/>
+          </a:p>
+        </p:txBody>
+      </p:sp>
+      <p:pic>
+        <p:nvPicPr>
+          <p:cNvPr id="4" name="Picture 3"/>
+          <p:cNvPicPr>
+            <a:picLocks noChangeAspect="1"/>
+          </p:cNvPicPr>
+          <p:nvPr/>
+        </p:nvPicPr>
+        <p:blipFill>
+          <a:blip r:embed="rId2"/>
+          <a:stretch>
+            <a:fillRect/>
+          </a:stretch>
+        </p:blipFill>
+        <p:spPr>
+          <a:xfrm>
+            <a:off x="3452192" y="3348450"/>
+            <a:ext cx="1869795" cy="2828513"/>
+          </a:xfrm>
+          <a:prstGeom prst="rect">
+            <a:avLst/>
+          </a:prstGeom>
+        </p:spPr>
+      </p:pic>
+      <p:pic>
+        <p:nvPicPr>
+          <p:cNvPr id="5" name="Picture 4"/>
+          <p:cNvPicPr>
+            <a:picLocks noChangeAspect="1"/>
+          </p:cNvPicPr>
+          <p:nvPr/>
+        </p:nvPicPr>
+        <p:blipFill>
+          <a:blip r:embed="rId3"/>
+          <a:stretch>
+            <a:fillRect/>
+          </a:stretch>
+        </p:blipFill>
+        <p:spPr>
+          <a:xfrm>
+            <a:off x="6312017" y="3348452"/>
+            <a:ext cx="1869796" cy="2828512"/>
+          </a:xfrm>
+          <a:prstGeom prst="rect">
+            <a:avLst/>
+          </a:prstGeom>
+        </p:spPr>
+      </p:pic>
+      <p:sp>
+        <p:nvSpPr>
+          <p:cNvPr id="6" name="Right Arrow 5"/>
+          <p:cNvSpPr/>
+          <p:nvPr/>
+        </p:nvSpPr>
+        <p:spPr>
+          <a:xfrm>
+            <a:off x="5169017" y="4762706"/>
+            <a:ext cx="1609470" cy="740829"/>
+          </a:xfrm>
+          <a:prstGeom prst="rightArrow">
+            <a:avLst/>
+          </a:prstGeom>
+        </p:spPr>
+        <p:style>
+          <a:lnRef idx="2">
+            <a:schemeClr val="accent1">
+              <a:shade val="50000"/>
+            </a:schemeClr>
+          </a:lnRef>
+          <a:fillRef idx="1">
+            <a:schemeClr val="accent1"/>
+          </a:fillRef>
+          <a:effectRef idx="0">
+            <a:schemeClr val="accent1"/>
+          </a:effectRef>
+          <a:fontRef idx="minor">
+            <a:schemeClr val="lt1"/>
+          </a:fontRef>
+        </p:style>
+        <p:txBody>
+          <a:bodyPr rtlCol="0" anchor="ctr"/>
+          <a:lstStyle/>
+          <a:p>
+            <a:pPr algn="ctr"/>
+            <a:r>
+              <a:rPr lang="en-US" sz="1400" dirty="0" smtClean="0"/>
+              <a:t>Label Optimization</a:t>
+            </a:r>
+            <a:endParaRPr lang="en-US" sz="1400" dirty="0"/>
           </a:p>
         </p:txBody>
       </p:sp>
     </p:spTree>
     <p:extLst>
       <p:ext uri="{BB962C8B-B14F-4D97-AF65-F5344CB8AC3E}">
-        <p14:creationId xmlns:p14="http://schemas.microsoft.com/office/powerpoint/2010/main" val="2578823140"/>
+        <p14:creationId xmlns:p14="http://schemas.microsoft.com/office/powerpoint/2010/main" val="2087388030"/>
       </p:ext>
     </p:extLst>
   </p:cSld>
@@ -3490,10 +3600,455 @@
           <a:bodyPr/>
           <a:lstStyle/>
           <a:p>
+            <a:r>
+              <a:rPr lang="en-US" dirty="0" smtClean="0"/>
+              <a:t>Label Optimization</a:t>
+            </a:r>
+            <a:endParaRPr lang="en-US" dirty="0"/>
+          </a:p>
+        </p:txBody>
+      </p:sp>
+      <p:sp>
+        <p:nvSpPr>
+          <p:cNvPr id="3" name="Content Placeholder 2"/>
+          <p:cNvSpPr>
+            <a:spLocks noGrp="1"/>
+          </p:cNvSpPr>
+          <p:nvPr>
+            <p:ph idx="1"/>
+          </p:nvPr>
+        </p:nvSpPr>
+        <p:spPr/>
+        <p:txBody>
+          <a:bodyPr/>
+          <a:lstStyle/>
+          <a:p>
+            <a:r>
+              <a:rPr lang="en-US" dirty="0" smtClean="0"/>
+              <a:t>For each triangle t (equivalently its feature vector v):</a:t>
+            </a:r>
+          </a:p>
+          <a:p>
+            <a:pPr lvl="1"/>
+            <a:r>
+              <a:rPr lang="en-US" dirty="0" smtClean="0"/>
+              <a:t>Term to minimize inconsistency between label k and p(t | k):</a:t>
+            </a:r>
+          </a:p>
+          <a:p>
+            <a:pPr lvl="1"/>
+            <a:endParaRPr lang="en-US" dirty="0"/>
+          </a:p>
+          <a:p>
+            <a:pPr lvl="1"/>
+            <a:endParaRPr lang="en-US" dirty="0" smtClean="0"/>
+          </a:p>
+          <a:p>
+            <a:pPr marL="457200" lvl="1" indent="0">
+              <a:buNone/>
+            </a:pPr>
+            <a:endParaRPr lang="en-US" dirty="0" smtClean="0"/>
+          </a:p>
+          <a:p>
+            <a:pPr marL="457200" lvl="1" indent="0">
+              <a:buNone/>
+            </a:pPr>
+            <a:r>
+              <a:rPr lang="en-US" dirty="0" smtClean="0"/>
+              <a:t>	Penalize if this t is being assigned a head label: –log(p(k)).</a:t>
+            </a:r>
+          </a:p>
+          <a:p>
+            <a:pPr lvl="1"/>
+            <a:endParaRPr lang="en-US" dirty="0"/>
+          </a:p>
+        </p:txBody>
+      </p:sp>
+      <p:pic>
+        <p:nvPicPr>
+          <p:cNvPr id="4" name="Picture 3"/>
+          <p:cNvPicPr>
+            <a:picLocks noChangeAspect="1"/>
+          </p:cNvPicPr>
+          <p:nvPr/>
+        </p:nvPicPr>
+        <p:blipFill>
+          <a:blip r:embed="rId2"/>
+          <a:stretch>
+            <a:fillRect/>
+          </a:stretch>
+        </p:blipFill>
+        <p:spPr>
+          <a:xfrm>
+            <a:off x="3846651" y="2572370"/>
+            <a:ext cx="1169586" cy="1204499"/>
+          </a:xfrm>
+          <a:prstGeom prst="rect">
+            <a:avLst/>
+          </a:prstGeom>
+        </p:spPr>
+      </p:pic>
+      <p:sp>
+        <p:nvSpPr>
+          <p:cNvPr id="5" name="TextBox 4"/>
+          <p:cNvSpPr txBox="1"/>
+          <p:nvPr/>
+        </p:nvSpPr>
+        <p:spPr>
+          <a:xfrm>
+            <a:off x="5098191" y="3091741"/>
+            <a:ext cx="1965795" cy="369332"/>
+          </a:xfrm>
+          <a:prstGeom prst="rect">
+            <a:avLst/>
+          </a:prstGeom>
+          <a:noFill/>
+        </p:spPr>
+        <p:txBody>
+          <a:bodyPr wrap="none" rtlCol="0">
+            <a:spAutoFit/>
+          </a:bodyPr>
+          <a:lstStyle/>
+          <a:p>
+            <a:r>
+              <a:rPr lang="en-US" dirty="0" smtClean="0"/>
+              <a:t>p(torso | v) = 0.95 </a:t>
+            </a:r>
+            <a:endParaRPr lang="en-US" dirty="0"/>
+          </a:p>
+        </p:txBody>
+      </p:sp>
+      <p:sp>
+        <p:nvSpPr>
+          <p:cNvPr id="6" name="TextBox 5"/>
+          <p:cNvSpPr txBox="1"/>
+          <p:nvPr/>
+        </p:nvSpPr>
+        <p:spPr>
+          <a:xfrm>
+            <a:off x="5098191" y="2722409"/>
+            <a:ext cx="1915909" cy="369332"/>
+          </a:xfrm>
+          <a:prstGeom prst="rect">
+            <a:avLst/>
+          </a:prstGeom>
+          <a:noFill/>
+        </p:spPr>
+        <p:txBody>
+          <a:bodyPr wrap="none" rtlCol="0">
+            <a:spAutoFit/>
+          </a:bodyPr>
+          <a:lstStyle/>
+          <a:p>
+            <a:r>
+              <a:rPr lang="en-US" dirty="0" smtClean="0"/>
+              <a:t>p(head | v) = 0.05</a:t>
+            </a:r>
+            <a:endParaRPr lang="en-US" dirty="0"/>
+          </a:p>
+        </p:txBody>
+      </p:sp>
+      <p:pic>
+        <p:nvPicPr>
+          <p:cNvPr id="7" name="Picture 6"/>
+          <p:cNvPicPr>
+            <a:picLocks noChangeAspect="1"/>
+          </p:cNvPicPr>
+          <p:nvPr/>
+        </p:nvPicPr>
+        <p:blipFill>
+          <a:blip r:embed="rId3"/>
+          <a:stretch>
+            <a:fillRect/>
+          </a:stretch>
+        </p:blipFill>
+        <p:spPr>
+          <a:xfrm>
+            <a:off x="3936762" y="4357857"/>
+            <a:ext cx="1666875" cy="1695450"/>
+          </a:xfrm>
+          <a:prstGeom prst="rect">
+            <a:avLst/>
+          </a:prstGeom>
+        </p:spPr>
+      </p:pic>
+      <p:cxnSp>
+        <p:nvCxnSpPr>
+          <p:cNvPr id="9" name="Straight Arrow Connector 8"/>
+          <p:cNvCxnSpPr/>
+          <p:nvPr/>
+        </p:nvCxnSpPr>
+        <p:spPr>
+          <a:xfrm flipH="1">
+            <a:off x="2733261" y="4523614"/>
+            <a:ext cx="1698183" cy="1"/>
+          </a:xfrm>
+          <a:prstGeom prst="straightConnector1">
+            <a:avLst/>
+          </a:prstGeom>
+          <a:ln>
+            <a:tailEnd type="triangle"/>
+          </a:ln>
+        </p:spPr>
+        <p:style>
+          <a:lnRef idx="1">
+            <a:schemeClr val="accent1"/>
+          </a:lnRef>
+          <a:fillRef idx="0">
+            <a:schemeClr val="accent1"/>
+          </a:fillRef>
+          <a:effectRef idx="0">
+            <a:schemeClr val="accent1"/>
+          </a:effectRef>
+          <a:fontRef idx="minor">
+            <a:schemeClr val="tx1"/>
+          </a:fontRef>
+        </p:style>
+      </p:cxnSp>
+      <p:sp>
+        <p:nvSpPr>
+          <p:cNvPr id="13" name="TextBox 12"/>
+          <p:cNvSpPr txBox="1"/>
+          <p:nvPr/>
+        </p:nvSpPr>
+        <p:spPr>
+          <a:xfrm>
+            <a:off x="943714" y="4357857"/>
+            <a:ext cx="1789547" cy="646331"/>
+          </a:xfrm>
+          <a:prstGeom prst="rect">
+            <a:avLst/>
+          </a:prstGeom>
+          <a:noFill/>
+        </p:spPr>
+        <p:txBody>
+          <a:bodyPr wrap="square" rtlCol="0">
+            <a:spAutoFit/>
+          </a:bodyPr>
+          <a:lstStyle/>
+          <a:p>
+            <a:r>
+              <a:rPr lang="en-US" dirty="0" smtClean="0"/>
+              <a:t>Penalty if t was labeled head</a:t>
+            </a:r>
+            <a:endParaRPr lang="en-US" dirty="0"/>
+          </a:p>
+        </p:txBody>
+      </p:sp>
+      <p:sp>
+        <p:nvSpPr>
+          <p:cNvPr id="14" name="Isosceles Triangle 13"/>
+          <p:cNvSpPr/>
+          <p:nvPr/>
+        </p:nvSpPr>
+        <p:spPr>
+          <a:xfrm>
+            <a:off x="3901092" y="2677629"/>
+            <a:ext cx="1060704" cy="914400"/>
+          </a:xfrm>
+          <a:prstGeom prst="triangle">
+            <a:avLst/>
+          </a:prstGeom>
+        </p:spPr>
+        <p:style>
+          <a:lnRef idx="2">
+            <a:schemeClr val="accent6"/>
+          </a:lnRef>
+          <a:fillRef idx="1">
+            <a:schemeClr val="lt1"/>
+          </a:fillRef>
+          <a:effectRef idx="0">
+            <a:schemeClr val="accent6"/>
+          </a:effectRef>
+          <a:fontRef idx="minor">
+            <a:schemeClr val="dk1"/>
+          </a:fontRef>
+        </p:style>
+        <p:txBody>
+          <a:bodyPr rtlCol="0" anchor="ctr"/>
+          <a:lstStyle/>
+          <a:p>
+            <a:pPr algn="ctr"/>
             <a:endParaRPr lang="en-US"/>
           </a:p>
         </p:txBody>
       </p:sp>
+      <p:cxnSp>
+        <p:nvCxnSpPr>
+          <p:cNvPr id="15" name="Straight Arrow Connector 14"/>
+          <p:cNvCxnSpPr/>
+          <p:nvPr/>
+        </p:nvCxnSpPr>
+        <p:spPr>
+          <a:xfrm flipH="1">
+            <a:off x="3482009" y="5623664"/>
+            <a:ext cx="1698183" cy="1"/>
+          </a:xfrm>
+          <a:prstGeom prst="straightConnector1">
+            <a:avLst/>
+          </a:prstGeom>
+          <a:ln>
+            <a:tailEnd type="triangle"/>
+          </a:ln>
+        </p:spPr>
+        <p:style>
+          <a:lnRef idx="1">
+            <a:schemeClr val="accent1"/>
+          </a:lnRef>
+          <a:fillRef idx="0">
+            <a:schemeClr val="accent1"/>
+          </a:fillRef>
+          <a:effectRef idx="0">
+            <a:schemeClr val="accent1"/>
+          </a:effectRef>
+          <a:fontRef idx="minor">
+            <a:schemeClr val="tx1"/>
+          </a:fontRef>
+        </p:style>
+      </p:cxnSp>
+      <p:sp>
+        <p:nvSpPr>
+          <p:cNvPr id="16" name="TextBox 15"/>
+          <p:cNvSpPr txBox="1"/>
+          <p:nvPr/>
+        </p:nvSpPr>
+        <p:spPr>
+          <a:xfrm>
+            <a:off x="4633247" y="5847764"/>
+            <a:ext cx="546945" cy="369332"/>
+          </a:xfrm>
+          <a:prstGeom prst="rect">
+            <a:avLst/>
+          </a:prstGeom>
+          <a:noFill/>
+        </p:spPr>
+        <p:txBody>
+          <a:bodyPr wrap="none" rtlCol="0">
+            <a:spAutoFit/>
+          </a:bodyPr>
+          <a:lstStyle/>
+          <a:p>
+            <a:r>
+              <a:rPr lang="en-US" dirty="0" smtClean="0"/>
+              <a:t>p(x)</a:t>
+            </a:r>
+            <a:endParaRPr lang="en-US" dirty="0"/>
+          </a:p>
+        </p:txBody>
+      </p:sp>
+      <p:sp>
+        <p:nvSpPr>
+          <p:cNvPr id="17" name="TextBox 16"/>
+          <p:cNvSpPr txBox="1"/>
+          <p:nvPr/>
+        </p:nvSpPr>
+        <p:spPr>
+          <a:xfrm rot="16200000">
+            <a:off x="3608705" y="4858009"/>
+            <a:ext cx="954107" cy="369332"/>
+          </a:xfrm>
+          <a:prstGeom prst="rect">
+            <a:avLst/>
+          </a:prstGeom>
+          <a:noFill/>
+        </p:spPr>
+        <p:txBody>
+          <a:bodyPr wrap="none" rtlCol="0">
+            <a:spAutoFit/>
+          </a:bodyPr>
+          <a:lstStyle/>
+          <a:p>
+            <a:r>
+              <a:rPr lang="en-US" dirty="0" smtClean="0"/>
+              <a:t>-log p(x)</a:t>
+            </a:r>
+            <a:endParaRPr lang="en-US" dirty="0"/>
+          </a:p>
+        </p:txBody>
+      </p:sp>
+      <p:sp>
+        <p:nvSpPr>
+          <p:cNvPr id="18" name="TextBox 17"/>
+          <p:cNvSpPr txBox="1"/>
+          <p:nvPr/>
+        </p:nvSpPr>
+        <p:spPr>
+          <a:xfrm>
+            <a:off x="1828981" y="5386099"/>
+            <a:ext cx="1789547" cy="646331"/>
+          </a:xfrm>
+          <a:prstGeom prst="rect">
+            <a:avLst/>
+          </a:prstGeom>
+          <a:noFill/>
+        </p:spPr>
+        <p:txBody>
+          <a:bodyPr wrap="square" rtlCol="0">
+            <a:spAutoFit/>
+          </a:bodyPr>
+          <a:lstStyle/>
+          <a:p>
+            <a:r>
+              <a:rPr lang="en-US" dirty="0" smtClean="0"/>
+              <a:t>Penalty if t was labeled torso</a:t>
+            </a:r>
+            <a:endParaRPr lang="en-US" dirty="0"/>
+          </a:p>
+        </p:txBody>
+      </p:sp>
+    </p:spTree>
+    <p:extLst>
+      <p:ext uri="{BB962C8B-B14F-4D97-AF65-F5344CB8AC3E}">
+        <p14:creationId xmlns:p14="http://schemas.microsoft.com/office/powerpoint/2010/main" val="2540841299"/>
+      </p:ext>
+    </p:extLst>
+  </p:cSld>
+  <p:clrMapOvr>
+    <a:masterClrMapping/>
+  </p:clrMapOvr>
+</p:sld>
+</file>
+
+<file path=ppt/slides/slide12.xml><?xml version="1.0" encoding="utf-8"?>
+<p:sld xmlns:a="http://schemas.openxmlformats.org/drawingml/2006/main" xmlns:r="http://schemas.openxmlformats.org/officeDocument/2006/relationships" xmlns:p="http://schemas.openxmlformats.org/presentationml/2006/main">
+  <p:cSld>
+    <p:spTree>
+      <p:nvGrpSpPr>
+        <p:cNvPr id="1" name=""/>
+        <p:cNvGrpSpPr/>
+        <p:nvPr/>
+      </p:nvGrpSpPr>
+      <p:grpSpPr>
+        <a:xfrm>
+          <a:off x="0" y="0"/>
+          <a:ext cx="0" cy="0"/>
+          <a:chOff x="0" y="0"/>
+          <a:chExt cx="0" cy="0"/>
+        </a:xfrm>
+      </p:grpSpPr>
+      <p:sp>
+        <p:nvSpPr>
+          <p:cNvPr id="2" name="Title 1"/>
+          <p:cNvSpPr>
+            <a:spLocks noGrp="1"/>
+          </p:cNvSpPr>
+          <p:nvPr>
+            <p:ph type="title"/>
+          </p:nvPr>
+        </p:nvSpPr>
+        <p:spPr/>
+        <p:txBody>
+          <a:bodyPr/>
+          <a:lstStyle/>
+          <a:p>
+            <a:r>
+              <a:rPr lang="en-US" dirty="0" smtClean="0"/>
+              <a:t>Label Optimization</a:t>
+            </a:r>
+            <a:endParaRPr lang="en-US" dirty="0"/>
+          </a:p>
+        </p:txBody>
+      </p:sp>
       <p:sp>
         <p:nvSpPr>
           <p:cNvPr id="3" name="Content Placeholder 2"/>
@@ -3509,14 +4064,1787 @@
           <a:bodyPr/>
           <a:lstStyle/>
           <a:p>
-            <a:endParaRPr lang="en-US"/>
-          </a:p>
-        </p:txBody>
-      </p:sp>
+            <a:r>
+              <a:rPr lang="en-US" dirty="0" smtClean="0"/>
+              <a:t>For each triangle t (equivalently its feature vector v):</a:t>
+            </a:r>
+          </a:p>
+          <a:p>
+            <a:pPr lvl="1"/>
+            <a:r>
+              <a:rPr lang="en-US" dirty="0" smtClean="0"/>
+              <a:t>Term to minimize inconsistency between label k and p(t | k).</a:t>
+            </a:r>
+          </a:p>
+          <a:p>
+            <a:pPr lvl="1"/>
+            <a:r>
+              <a:rPr lang="en-US" dirty="0" smtClean="0"/>
+              <a:t>Term to ensure smoothness amongst neighboring triangles.</a:t>
+            </a:r>
+          </a:p>
+          <a:p>
+            <a:pPr lvl="2"/>
+            <a:r>
+              <a:rPr lang="en-US" dirty="0" smtClean="0"/>
+              <a:t>0 penalty if the labels are the same.</a:t>
+            </a:r>
+          </a:p>
+          <a:p>
+            <a:pPr lvl="2"/>
+            <a:r>
+              <a:rPr lang="en-US" dirty="0" smtClean="0"/>
+              <a:t>Penalize otherwise based on distance between centroids and dihedral angles.</a:t>
+            </a:r>
+          </a:p>
+          <a:p>
+            <a:pPr marL="1371600" lvl="3" indent="0">
+              <a:buNone/>
+            </a:pPr>
+            <a:r>
+              <a:rPr lang="en-US" dirty="0" smtClean="0"/>
+              <a:t>-log(k * </a:t>
+            </a:r>
+            <a:r>
+              <a:rPr lang="en-US" dirty="0" err="1" smtClean="0"/>
+              <a:t>dist</a:t>
+            </a:r>
+            <a:r>
+              <a:rPr lang="en-US" dirty="0" smtClean="0"/>
+              <a:t> * dihedral angle) (k – tunable constant)</a:t>
+            </a:r>
+          </a:p>
+        </p:txBody>
+      </p:sp>
+      <p:sp>
+        <p:nvSpPr>
+          <p:cNvPr id="11" name="TextBox 10"/>
+          <p:cNvSpPr txBox="1"/>
+          <p:nvPr/>
+        </p:nvSpPr>
+        <p:spPr>
+          <a:xfrm>
+            <a:off x="2292891" y="6085521"/>
+            <a:ext cx="7898124" cy="369332"/>
+          </a:xfrm>
+          <a:prstGeom prst="rect">
+            <a:avLst/>
+          </a:prstGeom>
+          <a:noFill/>
+        </p:spPr>
+        <p:txBody>
+          <a:bodyPr wrap="none" rtlCol="0">
+            <a:spAutoFit/>
+          </a:bodyPr>
+          <a:lstStyle/>
+          <a:p>
+            <a:r>
+              <a:rPr lang="en-US" dirty="0" smtClean="0"/>
+              <a:t>High penalty                                                              Low penalties (High </a:t>
+            </a:r>
+            <a:r>
+              <a:rPr lang="en-US" dirty="0" err="1" smtClean="0"/>
+              <a:t>dist</a:t>
+            </a:r>
+            <a:r>
+              <a:rPr lang="en-US" dirty="0" smtClean="0"/>
+              <a:t> * dihedral)</a:t>
+            </a:r>
+            <a:endParaRPr lang="en-US" dirty="0"/>
+          </a:p>
+        </p:txBody>
+      </p:sp>
+      <p:pic>
+        <p:nvPicPr>
+          <p:cNvPr id="12" name="Picture 11"/>
+          <p:cNvPicPr>
+            <a:picLocks noChangeAspect="1"/>
+          </p:cNvPicPr>
+          <p:nvPr/>
+        </p:nvPicPr>
+        <p:blipFill>
+          <a:blip r:embed="rId2"/>
+          <a:stretch>
+            <a:fillRect/>
+          </a:stretch>
+        </p:blipFill>
+        <p:spPr>
+          <a:xfrm>
+            <a:off x="1802026" y="4474209"/>
+            <a:ext cx="1828800" cy="1476375"/>
+          </a:xfrm>
+          <a:prstGeom prst="rect">
+            <a:avLst/>
+          </a:prstGeom>
+        </p:spPr>
+      </p:pic>
+      <p:pic>
+        <p:nvPicPr>
+          <p:cNvPr id="19" name="Picture 18"/>
+          <p:cNvPicPr>
+            <a:picLocks noChangeAspect="1"/>
+          </p:cNvPicPr>
+          <p:nvPr/>
+        </p:nvPicPr>
+        <p:blipFill>
+          <a:blip r:embed="rId3"/>
+          <a:stretch>
+            <a:fillRect/>
+          </a:stretch>
+        </p:blipFill>
+        <p:spPr>
+          <a:xfrm>
+            <a:off x="4966865" y="4390459"/>
+            <a:ext cx="2825103" cy="1695062"/>
+          </a:xfrm>
+          <a:prstGeom prst="rect">
+            <a:avLst/>
+          </a:prstGeom>
+        </p:spPr>
+      </p:pic>
+      <p:pic>
+        <p:nvPicPr>
+          <p:cNvPr id="20" name="Picture 19"/>
+          <p:cNvPicPr>
+            <a:picLocks noChangeAspect="1"/>
+          </p:cNvPicPr>
+          <p:nvPr/>
+        </p:nvPicPr>
+        <p:blipFill>
+          <a:blip r:embed="rId4"/>
+          <a:stretch>
+            <a:fillRect/>
+          </a:stretch>
+        </p:blipFill>
+        <p:spPr>
+          <a:xfrm>
+            <a:off x="7956552" y="4575386"/>
+            <a:ext cx="1491870" cy="1345608"/>
+          </a:xfrm>
+          <a:prstGeom prst="rect">
+            <a:avLst/>
+          </a:prstGeom>
+        </p:spPr>
+      </p:pic>
+      <p:pic>
+        <p:nvPicPr>
+          <p:cNvPr id="21" name="Picture 20"/>
+          <p:cNvPicPr>
+            <a:picLocks noChangeAspect="1"/>
+          </p:cNvPicPr>
+          <p:nvPr/>
+        </p:nvPicPr>
+        <p:blipFill>
+          <a:blip r:embed="rId5"/>
+          <a:stretch>
+            <a:fillRect/>
+          </a:stretch>
+        </p:blipFill>
+        <p:spPr>
+          <a:xfrm>
+            <a:off x="10253758" y="3110547"/>
+            <a:ext cx="1666875" cy="1695450"/>
+          </a:xfrm>
+          <a:prstGeom prst="rect">
+            <a:avLst/>
+          </a:prstGeom>
+        </p:spPr>
+      </p:pic>
+      <p:sp>
+        <p:nvSpPr>
+          <p:cNvPr id="22" name="TextBox 21"/>
+          <p:cNvSpPr txBox="1"/>
+          <p:nvPr/>
+        </p:nvSpPr>
+        <p:spPr>
+          <a:xfrm>
+            <a:off x="10950243" y="4600454"/>
+            <a:ext cx="546945" cy="369332"/>
+          </a:xfrm>
+          <a:prstGeom prst="rect">
+            <a:avLst/>
+          </a:prstGeom>
+          <a:noFill/>
+        </p:spPr>
+        <p:txBody>
+          <a:bodyPr wrap="none" rtlCol="0">
+            <a:spAutoFit/>
+          </a:bodyPr>
+          <a:lstStyle/>
+          <a:p>
+            <a:r>
+              <a:rPr lang="en-US" dirty="0" smtClean="0"/>
+              <a:t>p(x)</a:t>
+            </a:r>
+            <a:endParaRPr lang="en-US" dirty="0"/>
+          </a:p>
+        </p:txBody>
+      </p:sp>
+      <p:sp>
+        <p:nvSpPr>
+          <p:cNvPr id="23" name="TextBox 22"/>
+          <p:cNvSpPr txBox="1"/>
+          <p:nvPr/>
+        </p:nvSpPr>
+        <p:spPr>
+          <a:xfrm rot="16200000">
+            <a:off x="9925701" y="3610699"/>
+            <a:ext cx="954107" cy="369332"/>
+          </a:xfrm>
+          <a:prstGeom prst="rect">
+            <a:avLst/>
+          </a:prstGeom>
+          <a:noFill/>
+        </p:spPr>
+        <p:txBody>
+          <a:bodyPr wrap="none" rtlCol="0">
+            <a:spAutoFit/>
+          </a:bodyPr>
+          <a:lstStyle/>
+          <a:p>
+            <a:r>
+              <a:rPr lang="en-US" dirty="0" smtClean="0"/>
+              <a:t>-log p(x)</a:t>
+            </a:r>
+            <a:endParaRPr lang="en-US" dirty="0"/>
+          </a:p>
+        </p:txBody>
+      </p:sp>
+    </p:spTree>
+    <p:extLst>
+      <p:ext uri="{BB962C8B-B14F-4D97-AF65-F5344CB8AC3E}">
+        <p14:creationId xmlns:p14="http://schemas.microsoft.com/office/powerpoint/2010/main" val="197693328"/>
+      </p:ext>
+    </p:extLst>
+  </p:cSld>
+  <p:clrMapOvr>
+    <a:masterClrMapping/>
+  </p:clrMapOvr>
+</p:sld>
+</file>
+
+<file path=ppt/slides/slide13.xml><?xml version="1.0" encoding="utf-8"?>
+<p:sld xmlns:a="http://schemas.openxmlformats.org/drawingml/2006/main" xmlns:r="http://schemas.openxmlformats.org/officeDocument/2006/relationships" xmlns:p="http://schemas.openxmlformats.org/presentationml/2006/main">
+  <p:cSld>
+    <p:spTree>
+      <p:nvGrpSpPr>
+        <p:cNvPr id="1" name=""/>
+        <p:cNvGrpSpPr/>
+        <p:nvPr/>
+      </p:nvGrpSpPr>
+      <p:grpSpPr>
+        <a:xfrm>
+          <a:off x="0" y="0"/>
+          <a:ext cx="0" cy="0"/>
+          <a:chOff x="0" y="0"/>
+          <a:chExt cx="0" cy="0"/>
+        </a:xfrm>
+      </p:grpSpPr>
+      <p:sp>
+        <p:nvSpPr>
+          <p:cNvPr id="2" name="Title 1"/>
+          <p:cNvSpPr>
+            <a:spLocks noGrp="1"/>
+          </p:cNvSpPr>
+          <p:nvPr>
+            <p:ph type="title"/>
+          </p:nvPr>
+        </p:nvSpPr>
+        <p:spPr/>
+        <p:txBody>
+          <a:bodyPr/>
+          <a:lstStyle/>
+          <a:p>
+            <a:r>
+              <a:rPr lang="en-US" dirty="0" smtClean="0"/>
+              <a:t>Label Optimization</a:t>
+            </a:r>
+            <a:endParaRPr lang="en-US" dirty="0"/>
+          </a:p>
+        </p:txBody>
+      </p:sp>
+      <p:pic>
+        <p:nvPicPr>
+          <p:cNvPr id="4" name="Content Placeholder 3"/>
+          <p:cNvPicPr>
+            <a:picLocks noGrp="1" noChangeAspect="1"/>
+          </p:cNvPicPr>
+          <p:nvPr>
+            <p:ph idx="1"/>
+          </p:nvPr>
+        </p:nvPicPr>
+        <p:blipFill>
+          <a:blip r:embed="rId2"/>
+          <a:stretch>
+            <a:fillRect/>
+          </a:stretch>
+        </p:blipFill>
+        <p:spPr>
+          <a:xfrm>
+            <a:off x="3605212" y="2622792"/>
+            <a:ext cx="4981575" cy="756512"/>
+          </a:xfrm>
+          <a:prstGeom prst="rect">
+            <a:avLst/>
+          </a:prstGeom>
+        </p:spPr>
+      </p:pic>
+      <p:pic>
+        <p:nvPicPr>
+          <p:cNvPr id="5" name="Picture 4"/>
+          <p:cNvPicPr>
+            <a:picLocks noChangeAspect="1"/>
+          </p:cNvPicPr>
+          <p:nvPr/>
+        </p:nvPicPr>
+        <p:blipFill>
+          <a:blip r:embed="rId3"/>
+          <a:stretch>
+            <a:fillRect/>
+          </a:stretch>
+        </p:blipFill>
+        <p:spPr>
+          <a:xfrm>
+            <a:off x="2872201" y="4316896"/>
+            <a:ext cx="2809875" cy="476250"/>
+          </a:xfrm>
+          <a:prstGeom prst="rect">
+            <a:avLst/>
+          </a:prstGeom>
+        </p:spPr>
+      </p:pic>
+      <p:cxnSp>
+        <p:nvCxnSpPr>
+          <p:cNvPr id="7" name="Straight Arrow Connector 6"/>
+          <p:cNvCxnSpPr>
+            <a:endCxn id="5" idx="0"/>
+          </p:cNvCxnSpPr>
+          <p:nvPr/>
+        </p:nvCxnSpPr>
+        <p:spPr>
+          <a:xfrm flipH="1">
+            <a:off x="4277139" y="3448878"/>
+            <a:ext cx="791818" cy="868018"/>
+          </a:xfrm>
+          <a:prstGeom prst="straightConnector1">
+            <a:avLst/>
+          </a:prstGeom>
+          <a:ln>
+            <a:tailEnd type="triangle"/>
+          </a:ln>
+        </p:spPr>
+        <p:style>
+          <a:lnRef idx="1">
+            <a:schemeClr val="accent1"/>
+          </a:lnRef>
+          <a:fillRef idx="0">
+            <a:schemeClr val="accent1"/>
+          </a:fillRef>
+          <a:effectRef idx="0">
+            <a:schemeClr val="accent1"/>
+          </a:effectRef>
+          <a:fontRef idx="minor">
+            <a:schemeClr val="tx1"/>
+          </a:fontRef>
+        </p:style>
+      </p:cxnSp>
+      <p:pic>
+        <p:nvPicPr>
+          <p:cNvPr id="13" name="Picture 12"/>
+          <p:cNvPicPr>
+            <a:picLocks noChangeAspect="1"/>
+          </p:cNvPicPr>
+          <p:nvPr/>
+        </p:nvPicPr>
+        <p:blipFill>
+          <a:blip r:embed="rId4"/>
+          <a:stretch>
+            <a:fillRect/>
+          </a:stretch>
+        </p:blipFill>
+        <p:spPr>
+          <a:xfrm>
+            <a:off x="5784574" y="4311408"/>
+            <a:ext cx="4876800" cy="733425"/>
+          </a:xfrm>
+          <a:prstGeom prst="rect">
+            <a:avLst/>
+          </a:prstGeom>
+        </p:spPr>
+      </p:pic>
+      <p:cxnSp>
+        <p:nvCxnSpPr>
+          <p:cNvPr id="14" name="Straight Arrow Connector 13"/>
+          <p:cNvCxnSpPr>
+            <a:endCxn id="13" idx="0"/>
+          </p:cNvCxnSpPr>
+          <p:nvPr/>
+        </p:nvCxnSpPr>
+        <p:spPr>
+          <a:xfrm>
+            <a:off x="7553739" y="3448878"/>
+            <a:ext cx="669235" cy="862530"/>
+          </a:xfrm>
+          <a:prstGeom prst="straightConnector1">
+            <a:avLst/>
+          </a:prstGeom>
+          <a:ln>
+            <a:tailEnd type="triangle"/>
+          </a:ln>
+        </p:spPr>
+        <p:style>
+          <a:lnRef idx="1">
+            <a:schemeClr val="accent1"/>
+          </a:lnRef>
+          <a:fillRef idx="0">
+            <a:schemeClr val="accent1"/>
+          </a:fillRef>
+          <a:effectRef idx="0">
+            <a:schemeClr val="accent1"/>
+          </a:effectRef>
+          <a:fontRef idx="minor">
+            <a:schemeClr val="tx1"/>
+          </a:fontRef>
+        </p:style>
+      </p:cxnSp>
+    </p:spTree>
+    <p:extLst>
+      <p:ext uri="{BB962C8B-B14F-4D97-AF65-F5344CB8AC3E}">
+        <p14:creationId xmlns:p14="http://schemas.microsoft.com/office/powerpoint/2010/main" val="1452610913"/>
+      </p:ext>
+    </p:extLst>
+  </p:cSld>
+  <p:clrMapOvr>
+    <a:masterClrMapping/>
+  </p:clrMapOvr>
+</p:sld>
+</file>
+
+<file path=ppt/slides/slide14.xml><?xml version="1.0" encoding="utf-8"?>
+<p:sld xmlns:a="http://schemas.openxmlformats.org/drawingml/2006/main" xmlns:r="http://schemas.openxmlformats.org/officeDocument/2006/relationships" xmlns:p="http://schemas.openxmlformats.org/presentationml/2006/main">
+  <p:cSld>
+    <p:spTree>
+      <p:nvGrpSpPr>
+        <p:cNvPr id="1" name=""/>
+        <p:cNvGrpSpPr/>
+        <p:nvPr/>
+      </p:nvGrpSpPr>
+      <p:grpSpPr>
+        <a:xfrm>
+          <a:off x="0" y="0"/>
+          <a:ext cx="0" cy="0"/>
+          <a:chOff x="0" y="0"/>
+          <a:chExt cx="0" cy="0"/>
+        </a:xfrm>
+      </p:grpSpPr>
+      <p:sp>
+        <p:nvSpPr>
+          <p:cNvPr id="2" name="Title 1"/>
+          <p:cNvSpPr>
+            <a:spLocks noGrp="1"/>
+          </p:cNvSpPr>
+          <p:nvPr>
+            <p:ph type="title"/>
+          </p:nvPr>
+        </p:nvSpPr>
+        <p:spPr/>
+        <p:txBody>
+          <a:bodyPr/>
+          <a:lstStyle/>
+          <a:p>
+            <a:r>
+              <a:rPr lang="en-US" dirty="0" smtClean="0"/>
+              <a:t>Label Optimization – </a:t>
+            </a:r>
+            <a:r>
+              <a:rPr lang="en-US" dirty="0" smtClean="0"/>
+              <a:t>(Local) </a:t>
+            </a:r>
+            <a:r>
+              <a:rPr lang="en-US" dirty="0" smtClean="0"/>
+              <a:t>Objective minimization using multi-label graph-cuts</a:t>
+            </a:r>
+            <a:endParaRPr lang="en-US" dirty="0"/>
+          </a:p>
+        </p:txBody>
+      </p:sp>
+      <p:sp>
+        <p:nvSpPr>
+          <p:cNvPr id="3" name="Content Placeholder 2"/>
+          <p:cNvSpPr>
+            <a:spLocks noGrp="1"/>
+          </p:cNvSpPr>
+          <p:nvPr>
+            <p:ph idx="1"/>
+          </p:nvPr>
+        </p:nvSpPr>
+        <p:spPr/>
+        <p:txBody>
+          <a:bodyPr>
+            <a:normAutofit/>
+          </a:bodyPr>
+          <a:lstStyle/>
+          <a:p>
+            <a:r>
+              <a:rPr lang="en-US" sz="1600" dirty="0" smtClean="0"/>
+              <a:t>Fast Approximate Energy Minimization via Graph Cuts – </a:t>
+            </a:r>
+            <a:r>
+              <a:rPr lang="en-US" sz="1600" dirty="0" err="1" smtClean="0"/>
+              <a:t>Boykov</a:t>
+            </a:r>
+            <a:r>
+              <a:rPr lang="en-US" sz="1600" dirty="0" smtClean="0"/>
+              <a:t> et al.</a:t>
+            </a:r>
+          </a:p>
+          <a:p>
+            <a:r>
+              <a:rPr lang="en-US" sz="1600" dirty="0" smtClean="0"/>
+              <a:t>Start with the labels obtained using </a:t>
+            </a:r>
+          </a:p>
+          <a:p>
+            <a:r>
+              <a:rPr lang="en-US" sz="1600" dirty="0" smtClean="0"/>
+              <a:t>Consider each pair of labels and find the corresponding triangle sets.</a:t>
+            </a:r>
+          </a:p>
+          <a:p>
+            <a:r>
+              <a:rPr lang="en-US" sz="1600" dirty="0" smtClean="0"/>
+              <a:t>For each triangle set, allow two types of moves for optimization of objective:</a:t>
+            </a:r>
+          </a:p>
+          <a:p>
+            <a:pPr lvl="1"/>
+            <a:r>
+              <a:rPr lang="en-US" sz="1200" dirty="0" smtClean="0"/>
+              <a:t>Label-swap: The labels of two triangles are swapped.</a:t>
+            </a:r>
+          </a:p>
+          <a:p>
+            <a:pPr lvl="1"/>
+            <a:r>
+              <a:rPr lang="en-US" sz="1200" dirty="0" smtClean="0"/>
+              <a:t>Label-expansion: The label of a triangle is switched to the other label.</a:t>
+            </a:r>
+          </a:p>
+          <a:p>
+            <a:r>
+              <a:rPr lang="en-US" sz="1600" dirty="0" smtClean="0"/>
+              <a:t>The authors frame finding optimal swap and expansion moves as finding a </a:t>
+            </a:r>
+            <a:r>
+              <a:rPr lang="en-US" sz="1600" dirty="0" err="1" smtClean="0"/>
+              <a:t>minimium</a:t>
+            </a:r>
+            <a:r>
+              <a:rPr lang="en-US" sz="1600" dirty="0" smtClean="0"/>
+              <a:t> cut in an appropriate graph.</a:t>
+            </a:r>
+          </a:p>
+        </p:txBody>
+      </p:sp>
+      <p:pic>
+        <p:nvPicPr>
+          <p:cNvPr id="5" name="Picture 4"/>
+          <p:cNvPicPr>
+            <a:picLocks noChangeAspect="1"/>
+          </p:cNvPicPr>
+          <p:nvPr/>
+        </p:nvPicPr>
+        <p:blipFill>
+          <a:blip r:embed="rId2"/>
+          <a:stretch>
+            <a:fillRect/>
+          </a:stretch>
+        </p:blipFill>
+        <p:spPr>
+          <a:xfrm>
+            <a:off x="116578" y="4702417"/>
+            <a:ext cx="866775" cy="762000"/>
+          </a:xfrm>
+          <a:prstGeom prst="rect">
+            <a:avLst/>
+          </a:prstGeom>
+        </p:spPr>
+      </p:pic>
+      <p:pic>
+        <p:nvPicPr>
+          <p:cNvPr id="6" name="Picture 5"/>
+          <p:cNvPicPr>
+            <a:picLocks noChangeAspect="1"/>
+          </p:cNvPicPr>
+          <p:nvPr/>
+        </p:nvPicPr>
+        <p:blipFill>
+          <a:blip r:embed="rId3"/>
+          <a:stretch>
+            <a:fillRect/>
+          </a:stretch>
+        </p:blipFill>
+        <p:spPr>
+          <a:xfrm>
+            <a:off x="1082769" y="4001294"/>
+            <a:ext cx="1673683" cy="2164245"/>
+          </a:xfrm>
+          <a:prstGeom prst="rect">
+            <a:avLst/>
+          </a:prstGeom>
+        </p:spPr>
+      </p:pic>
+      <p:pic>
+        <p:nvPicPr>
+          <p:cNvPr id="7" name="Picture 6"/>
+          <p:cNvPicPr>
+            <a:picLocks noChangeAspect="1"/>
+          </p:cNvPicPr>
+          <p:nvPr/>
+        </p:nvPicPr>
+        <p:blipFill>
+          <a:blip r:embed="rId4"/>
+          <a:stretch>
+            <a:fillRect/>
+          </a:stretch>
+        </p:blipFill>
+        <p:spPr>
+          <a:xfrm>
+            <a:off x="2712463" y="4069896"/>
+            <a:ext cx="1471588" cy="2027040"/>
+          </a:xfrm>
+          <a:prstGeom prst="rect">
+            <a:avLst/>
+          </a:prstGeom>
+        </p:spPr>
+      </p:pic>
+      <p:sp>
+        <p:nvSpPr>
+          <p:cNvPr id="8" name="TextBox 7"/>
+          <p:cNvSpPr txBox="1"/>
+          <p:nvPr/>
+        </p:nvSpPr>
+        <p:spPr>
+          <a:xfrm>
+            <a:off x="1082769" y="6150083"/>
+            <a:ext cx="1351652" cy="369332"/>
+          </a:xfrm>
+          <a:prstGeom prst="rect">
+            <a:avLst/>
+          </a:prstGeom>
+          <a:noFill/>
+        </p:spPr>
+        <p:txBody>
+          <a:bodyPr wrap="none" rtlCol="0">
+            <a:spAutoFit/>
+          </a:bodyPr>
+          <a:lstStyle/>
+          <a:p>
+            <a:r>
+              <a:rPr lang="en-US" dirty="0" smtClean="0"/>
+              <a:t>Initial Labels</a:t>
+            </a:r>
+            <a:endParaRPr lang="en-US" dirty="0"/>
+          </a:p>
+        </p:txBody>
+      </p:sp>
+      <p:sp>
+        <p:nvSpPr>
+          <p:cNvPr id="9" name="TextBox 8"/>
+          <p:cNvSpPr txBox="1"/>
+          <p:nvPr/>
+        </p:nvSpPr>
+        <p:spPr>
+          <a:xfrm>
+            <a:off x="2434421" y="6148839"/>
+            <a:ext cx="2239909" cy="646331"/>
+          </a:xfrm>
+          <a:prstGeom prst="rect">
+            <a:avLst/>
+          </a:prstGeom>
+          <a:noFill/>
+        </p:spPr>
+        <p:txBody>
+          <a:bodyPr wrap="none" rtlCol="0">
+            <a:spAutoFit/>
+          </a:bodyPr>
+          <a:lstStyle/>
+          <a:p>
+            <a:r>
+              <a:rPr lang="en-US" dirty="0" smtClean="0"/>
+              <a:t>Considering torso and</a:t>
+            </a:r>
+          </a:p>
+          <a:p>
+            <a:r>
+              <a:rPr lang="en-US" dirty="0" smtClean="0"/>
+              <a:t> head triangles</a:t>
+            </a:r>
+            <a:endParaRPr lang="en-US" dirty="0"/>
+          </a:p>
+        </p:txBody>
+      </p:sp>
+      <p:pic>
+        <p:nvPicPr>
+          <p:cNvPr id="10" name="Picture 9"/>
+          <p:cNvPicPr>
+            <a:picLocks noChangeAspect="1"/>
+          </p:cNvPicPr>
+          <p:nvPr/>
+        </p:nvPicPr>
+        <p:blipFill>
+          <a:blip r:embed="rId5"/>
+          <a:stretch>
+            <a:fillRect/>
+          </a:stretch>
+        </p:blipFill>
+        <p:spPr>
+          <a:xfrm>
+            <a:off x="6276593" y="5377311"/>
+            <a:ext cx="650258" cy="1008072"/>
+          </a:xfrm>
+          <a:prstGeom prst="rect">
+            <a:avLst/>
+          </a:prstGeom>
+        </p:spPr>
+      </p:pic>
+      <p:pic>
+        <p:nvPicPr>
+          <p:cNvPr id="11" name="Picture 10"/>
+          <p:cNvPicPr>
+            <a:picLocks noChangeAspect="1"/>
+          </p:cNvPicPr>
+          <p:nvPr/>
+        </p:nvPicPr>
+        <p:blipFill>
+          <a:blip r:embed="rId6"/>
+          <a:stretch>
+            <a:fillRect/>
+          </a:stretch>
+        </p:blipFill>
+        <p:spPr>
+          <a:xfrm>
+            <a:off x="4623735" y="4211642"/>
+            <a:ext cx="1533525" cy="1085850"/>
+          </a:xfrm>
+          <a:prstGeom prst="rect">
+            <a:avLst/>
+          </a:prstGeom>
+        </p:spPr>
+      </p:pic>
+      <p:cxnSp>
+        <p:nvCxnSpPr>
+          <p:cNvPr id="13" name="Straight Arrow Connector 12"/>
+          <p:cNvCxnSpPr/>
+          <p:nvPr/>
+        </p:nvCxnSpPr>
+        <p:spPr>
+          <a:xfrm flipH="1" flipV="1">
+            <a:off x="5533606" y="4994084"/>
+            <a:ext cx="1148772" cy="693484"/>
+          </a:xfrm>
+          <a:prstGeom prst="straightConnector1">
+            <a:avLst/>
+          </a:prstGeom>
+          <a:ln>
+            <a:tailEnd type="triangle"/>
+          </a:ln>
+        </p:spPr>
+        <p:style>
+          <a:lnRef idx="1">
+            <a:schemeClr val="dk1"/>
+          </a:lnRef>
+          <a:fillRef idx="0">
+            <a:schemeClr val="dk1"/>
+          </a:fillRef>
+          <a:effectRef idx="0">
+            <a:schemeClr val="dk1"/>
+          </a:effectRef>
+          <a:fontRef idx="minor">
+            <a:schemeClr val="tx1"/>
+          </a:fontRef>
+        </p:style>
+      </p:cxnSp>
+      <p:sp>
+        <p:nvSpPr>
+          <p:cNvPr id="14" name="TextBox 13"/>
+          <p:cNvSpPr txBox="1"/>
+          <p:nvPr/>
+        </p:nvSpPr>
+        <p:spPr>
+          <a:xfrm>
+            <a:off x="5533606" y="6232270"/>
+            <a:ext cx="2106667" cy="646331"/>
+          </a:xfrm>
+          <a:prstGeom prst="rect">
+            <a:avLst/>
+          </a:prstGeom>
+          <a:noFill/>
+        </p:spPr>
+        <p:txBody>
+          <a:bodyPr wrap="none" rtlCol="0">
+            <a:spAutoFit/>
+          </a:bodyPr>
+          <a:lstStyle/>
+          <a:p>
+            <a:r>
+              <a:rPr lang="en-US" dirty="0" smtClean="0"/>
+              <a:t>Find and execute </a:t>
+            </a:r>
+          </a:p>
+          <a:p>
+            <a:r>
+              <a:rPr lang="en-US" dirty="0" smtClean="0"/>
+              <a:t>optimal swap moves</a:t>
+            </a:r>
+            <a:endParaRPr lang="en-US" dirty="0"/>
+          </a:p>
+        </p:txBody>
+      </p:sp>
+      <p:pic>
+        <p:nvPicPr>
+          <p:cNvPr id="15" name="Picture 14"/>
+          <p:cNvPicPr>
+            <a:picLocks noChangeAspect="1"/>
+          </p:cNvPicPr>
+          <p:nvPr/>
+        </p:nvPicPr>
+        <p:blipFill>
+          <a:blip r:embed="rId7"/>
+          <a:stretch>
+            <a:fillRect/>
+          </a:stretch>
+        </p:blipFill>
+        <p:spPr>
+          <a:xfrm>
+            <a:off x="8655587" y="4069896"/>
+            <a:ext cx="977868" cy="1275342"/>
+          </a:xfrm>
+          <a:prstGeom prst="rect">
+            <a:avLst/>
+          </a:prstGeom>
+        </p:spPr>
+      </p:pic>
+      <p:pic>
+        <p:nvPicPr>
+          <p:cNvPr id="16" name="Picture 15"/>
+          <p:cNvPicPr>
+            <a:picLocks noChangeAspect="1"/>
+          </p:cNvPicPr>
+          <p:nvPr/>
+        </p:nvPicPr>
+        <p:blipFill>
+          <a:blip r:embed="rId5"/>
+          <a:stretch>
+            <a:fillRect/>
+          </a:stretch>
+        </p:blipFill>
+        <p:spPr>
+          <a:xfrm>
+            <a:off x="9482829" y="5340117"/>
+            <a:ext cx="650258" cy="1008072"/>
+          </a:xfrm>
+          <a:prstGeom prst="rect">
+            <a:avLst/>
+          </a:prstGeom>
+        </p:spPr>
+      </p:pic>
+      <p:cxnSp>
+        <p:nvCxnSpPr>
+          <p:cNvPr id="18" name="Straight Arrow Connector 17"/>
+          <p:cNvCxnSpPr/>
+          <p:nvPr/>
+        </p:nvCxnSpPr>
+        <p:spPr>
+          <a:xfrm flipH="1" flipV="1">
+            <a:off x="9482829" y="4754567"/>
+            <a:ext cx="301251" cy="994099"/>
+          </a:xfrm>
+          <a:prstGeom prst="straightConnector1">
+            <a:avLst/>
+          </a:prstGeom>
+          <a:ln>
+            <a:tailEnd type="triangle"/>
+          </a:ln>
+        </p:spPr>
+        <p:style>
+          <a:lnRef idx="1">
+            <a:schemeClr val="dk1"/>
+          </a:lnRef>
+          <a:fillRef idx="0">
+            <a:schemeClr val="dk1"/>
+          </a:fillRef>
+          <a:effectRef idx="0">
+            <a:schemeClr val="dk1"/>
+          </a:effectRef>
+          <a:fontRef idx="minor">
+            <a:schemeClr val="tx1"/>
+          </a:fontRef>
+        </p:style>
+      </p:cxnSp>
+      <p:sp>
+        <p:nvSpPr>
+          <p:cNvPr id="20" name="TextBox 19"/>
+          <p:cNvSpPr txBox="1"/>
+          <p:nvPr/>
+        </p:nvSpPr>
+        <p:spPr>
+          <a:xfrm>
+            <a:off x="8755923" y="6232271"/>
+            <a:ext cx="2575000" cy="646331"/>
+          </a:xfrm>
+          <a:prstGeom prst="rect">
+            <a:avLst/>
+          </a:prstGeom>
+          <a:noFill/>
+        </p:spPr>
+        <p:txBody>
+          <a:bodyPr wrap="none" rtlCol="0">
+            <a:spAutoFit/>
+          </a:bodyPr>
+          <a:lstStyle/>
+          <a:p>
+            <a:r>
+              <a:rPr lang="en-US" dirty="0" smtClean="0"/>
+              <a:t>Find and execute </a:t>
+            </a:r>
+          </a:p>
+          <a:p>
+            <a:r>
+              <a:rPr lang="en-US" dirty="0" smtClean="0"/>
+              <a:t>optimal expansion moves</a:t>
+            </a:r>
+            <a:endParaRPr lang="en-US" dirty="0"/>
+          </a:p>
+        </p:txBody>
+      </p:sp>
+      <p:pic>
+        <p:nvPicPr>
+          <p:cNvPr id="23" name="Picture 22"/>
+          <p:cNvPicPr>
+            <a:picLocks noChangeAspect="1"/>
+          </p:cNvPicPr>
+          <p:nvPr/>
+        </p:nvPicPr>
+        <p:blipFill>
+          <a:blip r:embed="rId8"/>
+          <a:stretch>
+            <a:fillRect/>
+          </a:stretch>
+        </p:blipFill>
+        <p:spPr>
+          <a:xfrm>
+            <a:off x="6564786" y="4211642"/>
+            <a:ext cx="1533525" cy="1085850"/>
+          </a:xfrm>
+          <a:prstGeom prst="rect">
+            <a:avLst/>
+          </a:prstGeom>
+        </p:spPr>
+      </p:pic>
+      <p:cxnSp>
+        <p:nvCxnSpPr>
+          <p:cNvPr id="28" name="Straight Arrow Connector 27"/>
+          <p:cNvCxnSpPr>
+            <a:stCxn id="11" idx="3"/>
+          </p:cNvCxnSpPr>
+          <p:nvPr/>
+        </p:nvCxnSpPr>
+        <p:spPr>
+          <a:xfrm>
+            <a:off x="6157260" y="4754567"/>
+            <a:ext cx="383391" cy="0"/>
+          </a:xfrm>
+          <a:prstGeom prst="straightConnector1">
+            <a:avLst/>
+          </a:prstGeom>
+          <a:ln>
+            <a:tailEnd type="triangle"/>
+          </a:ln>
+        </p:spPr>
+        <p:style>
+          <a:lnRef idx="1">
+            <a:schemeClr val="accent1"/>
+          </a:lnRef>
+          <a:fillRef idx="0">
+            <a:schemeClr val="accent1"/>
+          </a:fillRef>
+          <a:effectRef idx="0">
+            <a:schemeClr val="accent1"/>
+          </a:effectRef>
+          <a:fontRef idx="minor">
+            <a:schemeClr val="tx1"/>
+          </a:fontRef>
+        </p:style>
+      </p:cxnSp>
+      <p:pic>
+        <p:nvPicPr>
+          <p:cNvPr id="30" name="Picture 29"/>
+          <p:cNvPicPr>
+            <a:picLocks noChangeAspect="1"/>
+          </p:cNvPicPr>
+          <p:nvPr/>
+        </p:nvPicPr>
+        <p:blipFill>
+          <a:blip r:embed="rId9"/>
+          <a:stretch>
+            <a:fillRect/>
+          </a:stretch>
+        </p:blipFill>
+        <p:spPr>
+          <a:xfrm>
+            <a:off x="9975775" y="4075974"/>
+            <a:ext cx="990600" cy="1295400"/>
+          </a:xfrm>
+          <a:prstGeom prst="rect">
+            <a:avLst/>
+          </a:prstGeom>
+        </p:spPr>
+      </p:pic>
+      <p:cxnSp>
+        <p:nvCxnSpPr>
+          <p:cNvPr id="31" name="Straight Arrow Connector 30"/>
+          <p:cNvCxnSpPr/>
+          <p:nvPr/>
+        </p:nvCxnSpPr>
+        <p:spPr>
+          <a:xfrm>
+            <a:off x="9592384" y="4723674"/>
+            <a:ext cx="383391" cy="0"/>
+          </a:xfrm>
+          <a:prstGeom prst="straightConnector1">
+            <a:avLst/>
+          </a:prstGeom>
+          <a:ln>
+            <a:tailEnd type="triangle"/>
+          </a:ln>
+        </p:spPr>
+        <p:style>
+          <a:lnRef idx="1">
+            <a:schemeClr val="accent1"/>
+          </a:lnRef>
+          <a:fillRef idx="0">
+            <a:schemeClr val="accent1"/>
+          </a:fillRef>
+          <a:effectRef idx="0">
+            <a:schemeClr val="accent1"/>
+          </a:effectRef>
+          <a:fontRef idx="minor">
+            <a:schemeClr val="tx1"/>
+          </a:fontRef>
+        </p:style>
+      </p:cxnSp>
+    </p:spTree>
+    <p:extLst>
+      <p:ext uri="{BB962C8B-B14F-4D97-AF65-F5344CB8AC3E}">
+        <p14:creationId xmlns:p14="http://schemas.microsoft.com/office/powerpoint/2010/main" val="3629990328"/>
+      </p:ext>
+    </p:extLst>
+  </p:cSld>
+  <p:clrMapOvr>
+    <a:masterClrMapping/>
+  </p:clrMapOvr>
+</p:sld>
+</file>
+
+<file path=ppt/slides/slide15.xml><?xml version="1.0" encoding="utf-8"?>
+<p:sld xmlns:a="http://schemas.openxmlformats.org/drawingml/2006/main" xmlns:r="http://schemas.openxmlformats.org/officeDocument/2006/relationships" xmlns:p="http://schemas.openxmlformats.org/presentationml/2006/main">
+  <p:cSld>
+    <p:spTree>
+      <p:nvGrpSpPr>
+        <p:cNvPr id="1" name=""/>
+        <p:cNvGrpSpPr/>
+        <p:nvPr/>
+      </p:nvGrpSpPr>
+      <p:grpSpPr>
+        <a:xfrm>
+          <a:off x="0" y="0"/>
+          <a:ext cx="0" cy="0"/>
+          <a:chOff x="0" y="0"/>
+          <a:chExt cx="0" cy="0"/>
+        </a:xfrm>
+      </p:grpSpPr>
+      <p:sp>
+        <p:nvSpPr>
+          <p:cNvPr id="2" name="Title 1"/>
+          <p:cNvSpPr>
+            <a:spLocks noGrp="1"/>
+          </p:cNvSpPr>
+          <p:nvPr>
+            <p:ph type="title"/>
+          </p:nvPr>
+        </p:nvSpPr>
+        <p:spPr/>
+        <p:txBody>
+          <a:bodyPr/>
+          <a:lstStyle/>
+          <a:p>
+            <a:r>
+              <a:rPr lang="en-US" dirty="0" smtClean="0"/>
+              <a:t>One feature-set to rule them all</a:t>
+            </a:r>
+            <a:endParaRPr lang="en-US" dirty="0"/>
+          </a:p>
+        </p:txBody>
+      </p:sp>
+      <p:sp>
+        <p:nvSpPr>
+          <p:cNvPr id="3" name="Content Placeholder 2"/>
+          <p:cNvSpPr>
+            <a:spLocks noGrp="1"/>
+          </p:cNvSpPr>
+          <p:nvPr>
+            <p:ph idx="1"/>
+          </p:nvPr>
+        </p:nvSpPr>
+        <p:spPr/>
+        <p:txBody>
+          <a:bodyPr/>
+          <a:lstStyle/>
+          <a:p>
+            <a:r>
+              <a:rPr lang="en-US" dirty="0" smtClean="0"/>
+              <a:t>Many different meshes. </a:t>
+            </a:r>
+          </a:p>
+          <a:p>
+            <a:endParaRPr lang="en-US" dirty="0" smtClean="0"/>
+          </a:p>
+          <a:p>
+            <a:r>
+              <a:rPr lang="en-US" dirty="0" smtClean="0"/>
+              <a:t>A particular feature f</a:t>
+            </a:r>
+            <a:r>
+              <a:rPr lang="en-US" baseline="-25000" dirty="0" smtClean="0"/>
+              <a:t>i</a:t>
+            </a:r>
+            <a:r>
+              <a:rPr lang="en-US" dirty="0" smtClean="0"/>
+              <a:t> that works for one class of meshes may not work for another.</a:t>
+            </a:r>
+          </a:p>
+          <a:p>
+            <a:endParaRPr lang="en-US" dirty="0" smtClean="0"/>
+          </a:p>
+          <a:p>
+            <a:r>
+              <a:rPr lang="en-US" dirty="0" smtClean="0"/>
+              <a:t>Some approaches learn a linear combination of features for each class of mesh: f:t -&gt; R</a:t>
+            </a:r>
+            <a:r>
+              <a:rPr lang="en-US" baseline="30000" dirty="0" smtClean="0"/>
+              <a:t>n</a:t>
+            </a:r>
+            <a:r>
+              <a:rPr lang="en-US" dirty="0" smtClean="0"/>
+              <a:t> = a</a:t>
+            </a:r>
+            <a:r>
+              <a:rPr lang="en-US" baseline="-25000" dirty="0" smtClean="0"/>
+              <a:t>1</a:t>
+            </a:r>
+            <a:r>
+              <a:rPr lang="en-US" dirty="0" smtClean="0"/>
+              <a:t>f</a:t>
+            </a:r>
+            <a:r>
+              <a:rPr lang="en-US" baseline="-25000" dirty="0" smtClean="0"/>
+              <a:t>1</a:t>
+            </a:r>
+            <a:r>
+              <a:rPr lang="en-US" dirty="0" smtClean="0"/>
+              <a:t> +  a</a:t>
+            </a:r>
+            <a:r>
+              <a:rPr lang="en-US" baseline="-25000" dirty="0" smtClean="0"/>
+              <a:t>2</a:t>
+            </a:r>
+            <a:r>
+              <a:rPr lang="en-US" dirty="0" smtClean="0"/>
+              <a:t>f</a:t>
+            </a:r>
+            <a:r>
+              <a:rPr lang="en-US" baseline="-25000" dirty="0" smtClean="0"/>
+              <a:t>2</a:t>
+            </a:r>
+            <a:r>
+              <a:rPr lang="en-US" dirty="0" smtClean="0"/>
+              <a:t> + … </a:t>
+            </a:r>
+          </a:p>
+          <a:p>
+            <a:endParaRPr lang="en-US" dirty="0" smtClean="0"/>
+          </a:p>
+          <a:p>
+            <a:r>
+              <a:rPr lang="en-US" dirty="0" smtClean="0"/>
+              <a:t>The approach using CNNs learns a non-linear combination of features.</a:t>
+            </a:r>
+          </a:p>
+          <a:p>
+            <a:endParaRPr lang="en-US" dirty="0" smtClean="0"/>
+          </a:p>
+          <a:p>
+            <a:endParaRPr lang="en-US" dirty="0"/>
+          </a:p>
+        </p:txBody>
+      </p:sp>
+      <p:pic>
+        <p:nvPicPr>
+          <p:cNvPr id="4102" name="Picture 6" descr="http://www.film.com/wp-content/uploads/2011/06/One-Ring-to-Rule-Them-All1.jpg"/>
+          <p:cNvPicPr>
+            <a:picLocks noChangeAspect="1" noChangeArrowheads="1"/>
+          </p:cNvPicPr>
+          <p:nvPr/>
+        </p:nvPicPr>
+        <p:blipFill>
+          <a:blip r:embed="rId2" cstate="print">
+            <a:extLst>
+              <a:ext uri="{28A0092B-C50C-407E-A947-70E740481C1C}">
+                <a14:useLocalDpi xmlns:a14="http://schemas.microsoft.com/office/drawing/2010/main" val="0"/>
+              </a:ext>
+            </a:extLst>
+          </a:blip>
+          <a:srcRect/>
+          <a:stretch>
+            <a:fillRect/>
+          </a:stretch>
+        </p:blipFill>
+        <p:spPr bwMode="auto">
+          <a:xfrm>
+            <a:off x="8349615" y="536825"/>
+            <a:ext cx="1901825" cy="1221332"/>
+          </a:xfrm>
+          <a:prstGeom prst="rect">
+            <a:avLst/>
+          </a:prstGeom>
+          <a:noFill/>
+          <a:extLst>
+            <a:ext uri="{909E8E84-426E-40DD-AFC4-6F175D3DCCD1}">
+              <a14:hiddenFill xmlns:a14="http://schemas.microsoft.com/office/drawing/2010/main">
+                <a:solidFill>
+                  <a:srgbClr val="FFFFFF"/>
+                </a:solidFill>
+              </a14:hiddenFill>
+            </a:ext>
+          </a:extLst>
+        </p:spPr>
+      </p:pic>
+    </p:spTree>
+    <p:extLst>
+      <p:ext uri="{BB962C8B-B14F-4D97-AF65-F5344CB8AC3E}">
+        <p14:creationId xmlns:p14="http://schemas.microsoft.com/office/powerpoint/2010/main" val="2578823140"/>
+      </p:ext>
+    </p:extLst>
+  </p:cSld>
+  <p:clrMapOvr>
+    <a:masterClrMapping/>
+  </p:clrMapOvr>
+</p:sld>
+</file>
+
+<file path=ppt/slides/slide16.xml><?xml version="1.0" encoding="utf-8"?>
+<p:sld xmlns:a="http://schemas.openxmlformats.org/drawingml/2006/main" xmlns:r="http://schemas.openxmlformats.org/officeDocument/2006/relationships" xmlns:p="http://schemas.openxmlformats.org/presentationml/2006/main">
+  <p:cSld>
+    <p:spTree>
+      <p:nvGrpSpPr>
+        <p:cNvPr id="1" name=""/>
+        <p:cNvGrpSpPr/>
+        <p:nvPr/>
+      </p:nvGrpSpPr>
+      <p:grpSpPr>
+        <a:xfrm>
+          <a:off x="0" y="0"/>
+          <a:ext cx="0" cy="0"/>
+          <a:chOff x="0" y="0"/>
+          <a:chExt cx="0" cy="0"/>
+        </a:xfrm>
+      </p:grpSpPr>
+      <p:sp>
+        <p:nvSpPr>
+          <p:cNvPr id="2" name="Title 1"/>
+          <p:cNvSpPr>
+            <a:spLocks noGrp="1"/>
+          </p:cNvSpPr>
+          <p:nvPr>
+            <p:ph type="title"/>
+          </p:nvPr>
+        </p:nvSpPr>
+        <p:spPr/>
+        <p:txBody>
+          <a:bodyPr/>
+          <a:lstStyle/>
+          <a:p>
+            <a:r>
+              <a:rPr lang="en-US" dirty="0" smtClean="0"/>
+              <a:t>CNNs for 3D Mesh Labeling</a:t>
+            </a:r>
+            <a:endParaRPr lang="en-US" dirty="0"/>
+          </a:p>
+        </p:txBody>
+      </p:sp>
+      <p:sp>
+        <p:nvSpPr>
+          <p:cNvPr id="3" name="Content Placeholder 2"/>
+          <p:cNvSpPr>
+            <a:spLocks noGrp="1"/>
+          </p:cNvSpPr>
+          <p:nvPr>
+            <p:ph idx="1"/>
+          </p:nvPr>
+        </p:nvSpPr>
+        <p:spPr/>
+        <p:txBody>
+          <a:bodyPr/>
+          <a:lstStyle/>
+          <a:p>
+            <a:r>
+              <a:rPr lang="en-US" dirty="0" smtClean="0"/>
+              <a:t>Extract geometry features for each triangle face.</a:t>
+            </a:r>
+            <a:endParaRPr lang="en-US" dirty="0"/>
+          </a:p>
+        </p:txBody>
+      </p:sp>
+      <p:pic>
+        <p:nvPicPr>
+          <p:cNvPr id="4" name="Picture 3"/>
+          <p:cNvPicPr>
+            <a:picLocks noChangeAspect="1"/>
+          </p:cNvPicPr>
+          <p:nvPr/>
+        </p:nvPicPr>
+        <p:blipFill>
+          <a:blip r:embed="rId2"/>
+          <a:stretch>
+            <a:fillRect/>
+          </a:stretch>
+        </p:blipFill>
+        <p:spPr>
+          <a:xfrm>
+            <a:off x="4077652" y="2940050"/>
+            <a:ext cx="3000375" cy="3371850"/>
+          </a:xfrm>
+          <a:prstGeom prst="rect">
+            <a:avLst/>
+          </a:prstGeom>
+        </p:spPr>
+      </p:pic>
     </p:spTree>
     <p:extLst>
       <p:ext uri="{BB962C8B-B14F-4D97-AF65-F5344CB8AC3E}">
         <p14:creationId xmlns:p14="http://schemas.microsoft.com/office/powerpoint/2010/main" val="2066177562"/>
+      </p:ext>
+    </p:extLst>
+  </p:cSld>
+  <p:clrMapOvr>
+    <a:masterClrMapping/>
+  </p:clrMapOvr>
+</p:sld>
+</file>
+
+<file path=ppt/slides/slide17.xml><?xml version="1.0" encoding="utf-8"?>
+<p:sld xmlns:a="http://schemas.openxmlformats.org/drawingml/2006/main" xmlns:r="http://schemas.openxmlformats.org/officeDocument/2006/relationships" xmlns:p="http://schemas.openxmlformats.org/presentationml/2006/main">
+  <p:cSld>
+    <p:spTree>
+      <p:nvGrpSpPr>
+        <p:cNvPr id="1" name=""/>
+        <p:cNvGrpSpPr/>
+        <p:nvPr/>
+      </p:nvGrpSpPr>
+      <p:grpSpPr>
+        <a:xfrm>
+          <a:off x="0" y="0"/>
+          <a:ext cx="0" cy="0"/>
+          <a:chOff x="0" y="0"/>
+          <a:chExt cx="0" cy="0"/>
+        </a:xfrm>
+      </p:grpSpPr>
+      <p:sp>
+        <p:nvSpPr>
+          <p:cNvPr id="2" name="Title 1"/>
+          <p:cNvSpPr>
+            <a:spLocks noGrp="1"/>
+          </p:cNvSpPr>
+          <p:nvPr>
+            <p:ph type="title"/>
+          </p:nvPr>
+        </p:nvSpPr>
+        <p:spPr/>
+        <p:txBody>
+          <a:bodyPr/>
+          <a:lstStyle/>
+          <a:p>
+            <a:r>
+              <a:rPr lang="en-US" dirty="0" smtClean="0"/>
+              <a:t>CNNs for 3D Mesh Labeling</a:t>
+            </a:r>
+            <a:endParaRPr lang="en-US" dirty="0"/>
+          </a:p>
+        </p:txBody>
+      </p:sp>
+      <p:sp>
+        <p:nvSpPr>
+          <p:cNvPr id="3" name="Content Placeholder 2"/>
+          <p:cNvSpPr>
+            <a:spLocks noGrp="1"/>
+          </p:cNvSpPr>
+          <p:nvPr>
+            <p:ph idx="1"/>
+          </p:nvPr>
+        </p:nvSpPr>
+        <p:spPr/>
+        <p:txBody>
+          <a:bodyPr/>
+          <a:lstStyle/>
+          <a:p>
+            <a:r>
+              <a:rPr lang="en-US" dirty="0" smtClean="0"/>
+              <a:t>Place the features in a 2D grid that will serve as the input to the CNN.</a:t>
+            </a:r>
+          </a:p>
+          <a:p>
+            <a:r>
+              <a:rPr lang="en-US" dirty="0" smtClean="0"/>
+              <a:t>A key experiment in the work is showing that </a:t>
+            </a:r>
+            <a:r>
+              <a:rPr lang="en-US" b="1" dirty="0" smtClean="0"/>
+              <a:t>any</a:t>
+            </a:r>
+            <a:r>
+              <a:rPr lang="en-US" dirty="0" smtClean="0"/>
+              <a:t> mapping from the 1D set of features to the 2D grid leads to a performant labeler.</a:t>
+            </a:r>
+            <a:endParaRPr lang="en-US" dirty="0"/>
+          </a:p>
+        </p:txBody>
+      </p:sp>
+      <p:pic>
+        <p:nvPicPr>
+          <p:cNvPr id="5" name="Picture 4"/>
+          <p:cNvPicPr>
+            <a:picLocks noChangeAspect="1"/>
+          </p:cNvPicPr>
+          <p:nvPr/>
+        </p:nvPicPr>
+        <p:blipFill>
+          <a:blip r:embed="rId2"/>
+          <a:stretch>
+            <a:fillRect/>
+          </a:stretch>
+        </p:blipFill>
+        <p:spPr>
+          <a:xfrm>
+            <a:off x="3871277" y="3617119"/>
+            <a:ext cx="3291523" cy="2342365"/>
+          </a:xfrm>
+          <a:prstGeom prst="rect">
+            <a:avLst/>
+          </a:prstGeom>
+        </p:spPr>
+      </p:pic>
+    </p:spTree>
+    <p:extLst>
+      <p:ext uri="{BB962C8B-B14F-4D97-AF65-F5344CB8AC3E}">
+        <p14:creationId xmlns:p14="http://schemas.microsoft.com/office/powerpoint/2010/main" val="305026517"/>
+      </p:ext>
+    </p:extLst>
+  </p:cSld>
+  <p:clrMapOvr>
+    <a:masterClrMapping/>
+  </p:clrMapOvr>
+</p:sld>
+</file>
+
+<file path=ppt/slides/slide18.xml><?xml version="1.0" encoding="utf-8"?>
+<p:sld xmlns:a="http://schemas.openxmlformats.org/drawingml/2006/main" xmlns:r="http://schemas.openxmlformats.org/officeDocument/2006/relationships" xmlns:p="http://schemas.openxmlformats.org/presentationml/2006/main">
+  <p:cSld>
+    <p:spTree>
+      <p:nvGrpSpPr>
+        <p:cNvPr id="1" name=""/>
+        <p:cNvGrpSpPr/>
+        <p:nvPr/>
+      </p:nvGrpSpPr>
+      <p:grpSpPr>
+        <a:xfrm>
+          <a:off x="0" y="0"/>
+          <a:ext cx="0" cy="0"/>
+          <a:chOff x="0" y="0"/>
+          <a:chExt cx="0" cy="0"/>
+        </a:xfrm>
+      </p:grpSpPr>
+      <p:sp>
+        <p:nvSpPr>
+          <p:cNvPr id="2" name="Title 1"/>
+          <p:cNvSpPr>
+            <a:spLocks noGrp="1"/>
+          </p:cNvSpPr>
+          <p:nvPr>
+            <p:ph type="title"/>
+          </p:nvPr>
+        </p:nvSpPr>
+        <p:spPr/>
+        <p:txBody>
+          <a:bodyPr/>
+          <a:lstStyle/>
+          <a:p>
+            <a:r>
+              <a:rPr lang="en-US" dirty="0" smtClean="0"/>
+              <a:t>CNN structure</a:t>
+            </a:r>
+            <a:endParaRPr lang="en-US" dirty="0"/>
+          </a:p>
+        </p:txBody>
+      </p:sp>
+      <p:pic>
+        <p:nvPicPr>
+          <p:cNvPr id="7" name="Picture 6"/>
+          <p:cNvPicPr>
+            <a:picLocks noChangeAspect="1"/>
+          </p:cNvPicPr>
+          <p:nvPr/>
+        </p:nvPicPr>
+        <p:blipFill>
+          <a:blip r:embed="rId2"/>
+          <a:stretch>
+            <a:fillRect/>
+          </a:stretch>
+        </p:blipFill>
+        <p:spPr>
+          <a:xfrm>
+            <a:off x="680720" y="2124519"/>
+            <a:ext cx="11094720" cy="3744468"/>
+          </a:xfrm>
+          <a:prstGeom prst="rect">
+            <a:avLst/>
+          </a:prstGeom>
+        </p:spPr>
+      </p:pic>
+    </p:spTree>
+    <p:extLst>
+      <p:ext uri="{BB962C8B-B14F-4D97-AF65-F5344CB8AC3E}">
+        <p14:creationId xmlns:p14="http://schemas.microsoft.com/office/powerpoint/2010/main" val="3211492239"/>
+      </p:ext>
+    </p:extLst>
+  </p:cSld>
+  <p:clrMapOvr>
+    <a:masterClrMapping/>
+  </p:clrMapOvr>
+</p:sld>
+</file>
+
+<file path=ppt/slides/slide19.xml><?xml version="1.0" encoding="utf-8"?>
+<p:sld xmlns:a="http://schemas.openxmlformats.org/drawingml/2006/main" xmlns:r="http://schemas.openxmlformats.org/officeDocument/2006/relationships" xmlns:p="http://schemas.openxmlformats.org/presentationml/2006/main">
+  <p:cSld>
+    <p:spTree>
+      <p:nvGrpSpPr>
+        <p:cNvPr id="1" name=""/>
+        <p:cNvGrpSpPr/>
+        <p:nvPr/>
+      </p:nvGrpSpPr>
+      <p:grpSpPr>
+        <a:xfrm>
+          <a:off x="0" y="0"/>
+          <a:ext cx="0" cy="0"/>
+          <a:chOff x="0" y="0"/>
+          <a:chExt cx="0" cy="0"/>
+        </a:xfrm>
+      </p:grpSpPr>
+      <p:sp>
+        <p:nvSpPr>
+          <p:cNvPr id="2" name="Title 1"/>
+          <p:cNvSpPr>
+            <a:spLocks noGrp="1"/>
+          </p:cNvSpPr>
+          <p:nvPr>
+            <p:ph type="title"/>
+          </p:nvPr>
+        </p:nvSpPr>
+        <p:spPr/>
+        <p:txBody>
+          <a:bodyPr/>
+          <a:lstStyle/>
+          <a:p>
+            <a:r>
+              <a:rPr lang="en-US" dirty="0" smtClean="0"/>
+              <a:t>CNN training</a:t>
+            </a:r>
+            <a:endParaRPr lang="en-US" dirty="0"/>
+          </a:p>
+        </p:txBody>
+      </p:sp>
+      <p:sp>
+        <p:nvSpPr>
+          <p:cNvPr id="3" name="Content Placeholder 2"/>
+          <p:cNvSpPr>
+            <a:spLocks noGrp="1"/>
+          </p:cNvSpPr>
+          <p:nvPr>
+            <p:ph idx="1"/>
+          </p:nvPr>
+        </p:nvSpPr>
+        <p:spPr/>
+        <p:txBody>
+          <a:bodyPr/>
+          <a:lstStyle/>
+          <a:p>
+            <a:r>
+              <a:rPr lang="en-US" dirty="0" smtClean="0"/>
+              <a:t>For each training triangle, for an indicator vector for its label.</a:t>
+            </a:r>
+            <a:endParaRPr lang="en-US" dirty="0"/>
+          </a:p>
+        </p:txBody>
+      </p:sp>
+      <p:pic>
+        <p:nvPicPr>
+          <p:cNvPr id="4" name="Picture 3"/>
+          <p:cNvPicPr>
+            <a:picLocks noChangeAspect="1"/>
+          </p:cNvPicPr>
+          <p:nvPr/>
+        </p:nvPicPr>
+        <p:blipFill>
+          <a:blip r:embed="rId2"/>
+          <a:stretch>
+            <a:fillRect/>
+          </a:stretch>
+        </p:blipFill>
+        <p:spPr>
+          <a:xfrm>
+            <a:off x="2586856" y="3054561"/>
+            <a:ext cx="2724150" cy="2733675"/>
+          </a:xfrm>
+          <a:prstGeom prst="rect">
+            <a:avLst/>
+          </a:prstGeom>
+        </p:spPr>
+      </p:pic>
+      <p:cxnSp>
+        <p:nvCxnSpPr>
+          <p:cNvPr id="6" name="Straight Arrow Connector 5"/>
+          <p:cNvCxnSpPr/>
+          <p:nvPr/>
+        </p:nvCxnSpPr>
+        <p:spPr>
+          <a:xfrm flipV="1">
+            <a:off x="3657600" y="3510546"/>
+            <a:ext cx="3098800" cy="136894"/>
+          </a:xfrm>
+          <a:prstGeom prst="straightConnector1">
+            <a:avLst/>
+          </a:prstGeom>
+          <a:ln>
+            <a:tailEnd type="triangle"/>
+          </a:ln>
+        </p:spPr>
+        <p:style>
+          <a:lnRef idx="1">
+            <a:schemeClr val="accent1"/>
+          </a:lnRef>
+          <a:fillRef idx="0">
+            <a:schemeClr val="accent1"/>
+          </a:fillRef>
+          <a:effectRef idx="0">
+            <a:schemeClr val="accent1"/>
+          </a:effectRef>
+          <a:fontRef idx="minor">
+            <a:schemeClr val="tx1"/>
+          </a:fontRef>
+        </p:style>
+      </p:cxnSp>
+      <p:sp>
+        <p:nvSpPr>
+          <p:cNvPr id="7" name="TextBox 6"/>
+          <p:cNvSpPr txBox="1"/>
+          <p:nvPr/>
+        </p:nvSpPr>
+        <p:spPr>
+          <a:xfrm>
+            <a:off x="6756400" y="3261360"/>
+            <a:ext cx="1795684" cy="1477328"/>
+          </a:xfrm>
+          <a:prstGeom prst="rect">
+            <a:avLst/>
+          </a:prstGeom>
+          <a:noFill/>
+        </p:spPr>
+        <p:txBody>
+          <a:bodyPr wrap="none" rtlCol="0">
+            <a:spAutoFit/>
+          </a:bodyPr>
+          <a:lstStyle/>
+          <a:p>
+            <a:r>
+              <a:rPr lang="en-US" dirty="0" smtClean="0"/>
+              <a:t>g = [0, 1, 0, 0, 0]</a:t>
+            </a:r>
+            <a:r>
+              <a:rPr lang="en-US" baseline="30000" dirty="0" smtClean="0"/>
+              <a:t>T</a:t>
+            </a:r>
+          </a:p>
+          <a:p>
+            <a:endParaRPr lang="en-US" dirty="0"/>
+          </a:p>
+          <a:p>
+            <a:endParaRPr lang="en-US" dirty="0" smtClean="0"/>
+          </a:p>
+          <a:p>
+            <a:endParaRPr lang="en-US" dirty="0"/>
+          </a:p>
+          <a:p>
+            <a:r>
+              <a:rPr lang="en-US" dirty="0" smtClean="0"/>
+              <a:t>g = [0, 0, 1, 0, 0]</a:t>
+            </a:r>
+            <a:r>
+              <a:rPr lang="en-US" baseline="30000" dirty="0" smtClean="0"/>
+              <a:t>T</a:t>
+            </a:r>
+            <a:endParaRPr lang="en-US" baseline="30000" dirty="0"/>
+          </a:p>
+        </p:txBody>
+      </p:sp>
+      <p:cxnSp>
+        <p:nvCxnSpPr>
+          <p:cNvPr id="9" name="Straight Arrow Connector 8"/>
+          <p:cNvCxnSpPr/>
+          <p:nvPr/>
+        </p:nvCxnSpPr>
+        <p:spPr>
+          <a:xfrm flipV="1">
+            <a:off x="3901440" y="4560094"/>
+            <a:ext cx="2854960" cy="178594"/>
+          </a:xfrm>
+          <a:prstGeom prst="straightConnector1">
+            <a:avLst/>
+          </a:prstGeom>
+          <a:ln>
+            <a:tailEnd type="triangle"/>
+          </a:ln>
+        </p:spPr>
+        <p:style>
+          <a:lnRef idx="1">
+            <a:schemeClr val="accent1"/>
+          </a:lnRef>
+          <a:fillRef idx="0">
+            <a:schemeClr val="accent1"/>
+          </a:fillRef>
+          <a:effectRef idx="0">
+            <a:schemeClr val="accent1"/>
+          </a:effectRef>
+          <a:fontRef idx="minor">
+            <a:schemeClr val="tx1"/>
+          </a:fontRef>
+        </p:style>
+      </p:cxnSp>
+    </p:spTree>
+    <p:extLst>
+      <p:ext uri="{BB962C8B-B14F-4D97-AF65-F5344CB8AC3E}">
+        <p14:creationId xmlns:p14="http://schemas.microsoft.com/office/powerpoint/2010/main" val="4013879756"/>
       </p:ext>
     </p:extLst>
   </p:cSld>
@@ -3688,6 +6016,880 @@
     <p:extLst>
       <p:ext uri="{BB962C8B-B14F-4D97-AF65-F5344CB8AC3E}">
         <p14:creationId xmlns:p14="http://schemas.microsoft.com/office/powerpoint/2010/main" val="1977971271"/>
+      </p:ext>
+    </p:extLst>
+  </p:cSld>
+  <p:clrMapOvr>
+    <a:masterClrMapping/>
+  </p:clrMapOvr>
+</p:sld>
+</file>
+
+<file path=ppt/slides/slide20.xml><?xml version="1.0" encoding="utf-8"?>
+<p:sld xmlns:a="http://schemas.openxmlformats.org/drawingml/2006/main" xmlns:r="http://schemas.openxmlformats.org/officeDocument/2006/relationships" xmlns:p="http://schemas.openxmlformats.org/presentationml/2006/main">
+  <p:cSld>
+    <p:spTree>
+      <p:nvGrpSpPr>
+        <p:cNvPr id="1" name=""/>
+        <p:cNvGrpSpPr/>
+        <p:nvPr/>
+      </p:nvGrpSpPr>
+      <p:grpSpPr>
+        <a:xfrm>
+          <a:off x="0" y="0"/>
+          <a:ext cx="0" cy="0"/>
+          <a:chOff x="0" y="0"/>
+          <a:chExt cx="0" cy="0"/>
+        </a:xfrm>
+      </p:grpSpPr>
+      <p:sp>
+        <p:nvSpPr>
+          <p:cNvPr id="2" name="Title 1"/>
+          <p:cNvSpPr>
+            <a:spLocks noGrp="1"/>
+          </p:cNvSpPr>
+          <p:nvPr>
+            <p:ph type="title"/>
+          </p:nvPr>
+        </p:nvSpPr>
+        <p:spPr/>
+        <p:txBody>
+          <a:bodyPr/>
+          <a:lstStyle/>
+          <a:p>
+            <a:r>
+              <a:rPr lang="en-US" dirty="0" smtClean="0"/>
+              <a:t>CNN training</a:t>
+            </a:r>
+            <a:endParaRPr lang="en-US" dirty="0"/>
+          </a:p>
+        </p:txBody>
+      </p:sp>
+      <p:sp>
+        <p:nvSpPr>
+          <p:cNvPr id="3" name="Content Placeholder 2"/>
+          <p:cNvSpPr>
+            <a:spLocks noGrp="1"/>
+          </p:cNvSpPr>
+          <p:nvPr>
+            <p:ph idx="1"/>
+          </p:nvPr>
+        </p:nvSpPr>
+        <p:spPr/>
+        <p:txBody>
+          <a:bodyPr/>
+          <a:lstStyle/>
+          <a:p>
+            <a:r>
+              <a:rPr lang="en-US" dirty="0" smtClean="0"/>
+              <a:t>Drive the squared error between the label probabilities and the indicator matrix to 0</a:t>
+            </a:r>
+            <a:endParaRPr lang="en-US" dirty="0"/>
+          </a:p>
+        </p:txBody>
+      </p:sp>
+      <p:pic>
+        <p:nvPicPr>
+          <p:cNvPr id="4" name="Picture 3"/>
+          <p:cNvPicPr>
+            <a:picLocks noChangeAspect="1"/>
+          </p:cNvPicPr>
+          <p:nvPr/>
+        </p:nvPicPr>
+        <p:blipFill>
+          <a:blip r:embed="rId2"/>
+          <a:stretch>
+            <a:fillRect/>
+          </a:stretch>
+        </p:blipFill>
+        <p:spPr>
+          <a:xfrm>
+            <a:off x="2330903" y="2623185"/>
+            <a:ext cx="4195128" cy="3942314"/>
+          </a:xfrm>
+          <a:prstGeom prst="rect">
+            <a:avLst/>
+          </a:prstGeom>
+        </p:spPr>
+      </p:pic>
+      <p:cxnSp>
+        <p:nvCxnSpPr>
+          <p:cNvPr id="8" name="Straight Arrow Connector 7"/>
+          <p:cNvCxnSpPr/>
+          <p:nvPr/>
+        </p:nvCxnSpPr>
+        <p:spPr>
+          <a:xfrm>
+            <a:off x="6840990" y="4083919"/>
+            <a:ext cx="0" cy="599440"/>
+          </a:xfrm>
+          <a:prstGeom prst="straightConnector1">
+            <a:avLst/>
+          </a:prstGeom>
+          <a:ln>
+            <a:tailEnd type="triangle"/>
+          </a:ln>
+        </p:spPr>
+        <p:style>
+          <a:lnRef idx="1">
+            <a:schemeClr val="accent1"/>
+          </a:lnRef>
+          <a:fillRef idx="0">
+            <a:schemeClr val="accent1"/>
+          </a:fillRef>
+          <a:effectRef idx="0">
+            <a:schemeClr val="accent1"/>
+          </a:effectRef>
+          <a:fontRef idx="minor">
+            <a:schemeClr val="tx1"/>
+          </a:fontRef>
+        </p:style>
+      </p:cxnSp>
+      <p:cxnSp>
+        <p:nvCxnSpPr>
+          <p:cNvPr id="9" name="Straight Arrow Connector 8"/>
+          <p:cNvCxnSpPr/>
+          <p:nvPr/>
+        </p:nvCxnSpPr>
+        <p:spPr>
+          <a:xfrm>
+            <a:off x="6840990" y="4957679"/>
+            <a:ext cx="0" cy="599440"/>
+          </a:xfrm>
+          <a:prstGeom prst="straightConnector1">
+            <a:avLst/>
+          </a:prstGeom>
+          <a:ln>
+            <a:tailEnd type="triangle"/>
+          </a:ln>
+        </p:spPr>
+        <p:style>
+          <a:lnRef idx="1">
+            <a:schemeClr val="accent1"/>
+          </a:lnRef>
+          <a:fillRef idx="0">
+            <a:schemeClr val="accent1"/>
+          </a:fillRef>
+          <a:effectRef idx="0">
+            <a:schemeClr val="accent1"/>
+          </a:effectRef>
+          <a:fontRef idx="minor">
+            <a:schemeClr val="tx1"/>
+          </a:fontRef>
+        </p:style>
+      </p:cxnSp>
+      <p:cxnSp>
+        <p:nvCxnSpPr>
+          <p:cNvPr id="10" name="Straight Arrow Connector 9"/>
+          <p:cNvCxnSpPr/>
+          <p:nvPr/>
+        </p:nvCxnSpPr>
+        <p:spPr>
+          <a:xfrm>
+            <a:off x="6830830" y="3199999"/>
+            <a:ext cx="0" cy="599440"/>
+          </a:xfrm>
+          <a:prstGeom prst="straightConnector1">
+            <a:avLst/>
+          </a:prstGeom>
+          <a:ln>
+            <a:tailEnd type="triangle"/>
+          </a:ln>
+        </p:spPr>
+        <p:style>
+          <a:lnRef idx="1">
+            <a:schemeClr val="accent1"/>
+          </a:lnRef>
+          <a:fillRef idx="0">
+            <a:schemeClr val="accent1"/>
+          </a:fillRef>
+          <a:effectRef idx="0">
+            <a:schemeClr val="accent1"/>
+          </a:effectRef>
+          <a:fontRef idx="minor">
+            <a:schemeClr val="tx1"/>
+          </a:fontRef>
+        </p:style>
+      </p:cxnSp>
+      <p:pic>
+        <p:nvPicPr>
+          <p:cNvPr id="11" name="Picture 10"/>
+          <p:cNvPicPr>
+            <a:picLocks noChangeAspect="1"/>
+          </p:cNvPicPr>
+          <p:nvPr/>
+        </p:nvPicPr>
+        <p:blipFill>
+          <a:blip r:embed="rId3"/>
+          <a:stretch>
+            <a:fillRect/>
+          </a:stretch>
+        </p:blipFill>
+        <p:spPr>
+          <a:xfrm>
+            <a:off x="6992552" y="3791880"/>
+            <a:ext cx="3495675" cy="466725"/>
+          </a:xfrm>
+          <a:prstGeom prst="rect">
+            <a:avLst/>
+          </a:prstGeom>
+        </p:spPr>
+      </p:pic>
+      <p:sp>
+        <p:nvSpPr>
+          <p:cNvPr id="12" name="TextBox 11"/>
+          <p:cNvSpPr txBox="1"/>
+          <p:nvPr/>
+        </p:nvSpPr>
+        <p:spPr>
+          <a:xfrm>
+            <a:off x="9732709" y="4407176"/>
+            <a:ext cx="917239" cy="369332"/>
+          </a:xfrm>
+          <a:prstGeom prst="rect">
+            <a:avLst/>
+          </a:prstGeom>
+          <a:noFill/>
+        </p:spPr>
+        <p:txBody>
+          <a:bodyPr wrap="none" rtlCol="0">
+            <a:spAutoFit/>
+          </a:bodyPr>
+          <a:lstStyle/>
+          <a:p>
+            <a:r>
+              <a:rPr lang="en-US" dirty="0" smtClean="0"/>
+              <a:t>sigmoid</a:t>
+            </a:r>
+            <a:endParaRPr lang="en-US" dirty="0"/>
+          </a:p>
+        </p:txBody>
+      </p:sp>
+      <p:cxnSp>
+        <p:nvCxnSpPr>
+          <p:cNvPr id="15" name="Straight Arrow Connector 14"/>
+          <p:cNvCxnSpPr/>
+          <p:nvPr/>
+        </p:nvCxnSpPr>
+        <p:spPr>
+          <a:xfrm>
+            <a:off x="9499029" y="4107456"/>
+            <a:ext cx="396240" cy="299720"/>
+          </a:xfrm>
+          <a:prstGeom prst="straightConnector1">
+            <a:avLst/>
+          </a:prstGeom>
+          <a:ln>
+            <a:tailEnd type="triangle"/>
+          </a:ln>
+        </p:spPr>
+        <p:style>
+          <a:lnRef idx="1">
+            <a:schemeClr val="accent1"/>
+          </a:lnRef>
+          <a:fillRef idx="0">
+            <a:schemeClr val="accent1"/>
+          </a:fillRef>
+          <a:effectRef idx="0">
+            <a:schemeClr val="accent1"/>
+          </a:effectRef>
+          <a:fontRef idx="minor">
+            <a:schemeClr val="tx1"/>
+          </a:fontRef>
+        </p:style>
+      </p:cxnSp>
+      <p:cxnSp>
+        <p:nvCxnSpPr>
+          <p:cNvPr id="17" name="Straight Arrow Connector 16"/>
+          <p:cNvCxnSpPr/>
+          <p:nvPr/>
+        </p:nvCxnSpPr>
+        <p:spPr>
+          <a:xfrm flipH="1">
+            <a:off x="8950389" y="4211732"/>
+            <a:ext cx="95409" cy="564776"/>
+          </a:xfrm>
+          <a:prstGeom prst="straightConnector1">
+            <a:avLst/>
+          </a:prstGeom>
+          <a:ln>
+            <a:tailEnd type="triangle"/>
+          </a:ln>
+        </p:spPr>
+        <p:style>
+          <a:lnRef idx="1">
+            <a:schemeClr val="accent1"/>
+          </a:lnRef>
+          <a:fillRef idx="0">
+            <a:schemeClr val="accent1"/>
+          </a:fillRef>
+          <a:effectRef idx="0">
+            <a:schemeClr val="accent1"/>
+          </a:effectRef>
+          <a:fontRef idx="minor">
+            <a:schemeClr val="tx1"/>
+          </a:fontRef>
+        </p:style>
+      </p:cxnSp>
+      <p:sp>
+        <p:nvSpPr>
+          <p:cNvPr id="19" name="TextBox 18"/>
+          <p:cNvSpPr txBox="1"/>
+          <p:nvPr/>
+        </p:nvSpPr>
+        <p:spPr>
+          <a:xfrm>
+            <a:off x="8165750" y="4773013"/>
+            <a:ext cx="1664686" cy="369332"/>
+          </a:xfrm>
+          <a:prstGeom prst="rect">
+            <a:avLst/>
+          </a:prstGeom>
+          <a:noFill/>
+        </p:spPr>
+        <p:txBody>
+          <a:bodyPr wrap="none" rtlCol="0">
+            <a:spAutoFit/>
+          </a:bodyPr>
+          <a:lstStyle/>
+          <a:p>
+            <a:r>
+              <a:rPr lang="en-US" dirty="0" smtClean="0"/>
+              <a:t>Indicator vector</a:t>
+            </a:r>
+            <a:endParaRPr lang="en-US" dirty="0"/>
+          </a:p>
+        </p:txBody>
+      </p:sp>
+      <p:pic>
+        <p:nvPicPr>
+          <p:cNvPr id="20" name="Picture 19"/>
+          <p:cNvPicPr>
+            <a:picLocks noChangeAspect="1"/>
+          </p:cNvPicPr>
+          <p:nvPr/>
+        </p:nvPicPr>
+        <p:blipFill>
+          <a:blip r:embed="rId4"/>
+          <a:stretch>
+            <a:fillRect/>
+          </a:stretch>
+        </p:blipFill>
+        <p:spPr>
+          <a:xfrm>
+            <a:off x="1446238" y="5733113"/>
+            <a:ext cx="1025778" cy="1029364"/>
+          </a:xfrm>
+          <a:prstGeom prst="rect">
+            <a:avLst/>
+          </a:prstGeom>
+        </p:spPr>
+      </p:pic>
+      <p:sp>
+        <p:nvSpPr>
+          <p:cNvPr id="21" name="Isosceles Triangle 20"/>
+          <p:cNvSpPr/>
+          <p:nvPr/>
+        </p:nvSpPr>
+        <p:spPr>
+          <a:xfrm>
+            <a:off x="1629499" y="5233862"/>
+            <a:ext cx="659255" cy="472902"/>
+          </a:xfrm>
+          <a:prstGeom prst="triangle">
+            <a:avLst/>
+          </a:prstGeom>
+        </p:spPr>
+        <p:style>
+          <a:lnRef idx="2">
+            <a:schemeClr val="accent6">
+              <a:shade val="50000"/>
+            </a:schemeClr>
+          </a:lnRef>
+          <a:fillRef idx="1">
+            <a:schemeClr val="accent6"/>
+          </a:fillRef>
+          <a:effectRef idx="0">
+            <a:schemeClr val="accent6"/>
+          </a:effectRef>
+          <a:fontRef idx="minor">
+            <a:schemeClr val="lt1"/>
+          </a:fontRef>
+        </p:style>
+        <p:txBody>
+          <a:bodyPr rtlCol="0" anchor="ctr"/>
+          <a:lstStyle/>
+          <a:p>
+            <a:pPr algn="ctr"/>
+            <a:endParaRPr lang="en-US"/>
+          </a:p>
+        </p:txBody>
+      </p:sp>
+      <p:sp>
+        <p:nvSpPr>
+          <p:cNvPr id="24" name="TextBox 23"/>
+          <p:cNvSpPr txBox="1"/>
+          <p:nvPr/>
+        </p:nvSpPr>
+        <p:spPr>
+          <a:xfrm>
+            <a:off x="1418758" y="2623185"/>
+            <a:ext cx="2819490" cy="369332"/>
+          </a:xfrm>
+          <a:prstGeom prst="rect">
+            <a:avLst/>
+          </a:prstGeom>
+          <a:noFill/>
+        </p:spPr>
+        <p:txBody>
+          <a:bodyPr wrap="none" rtlCol="0">
+            <a:spAutoFit/>
+          </a:bodyPr>
+          <a:lstStyle/>
+          <a:p>
+            <a:r>
+              <a:rPr lang="en-US" dirty="0" err="1" smtClean="0"/>
+              <a:t>prob</a:t>
+            </a:r>
+            <a:r>
+              <a:rPr lang="en-US" dirty="0" smtClean="0"/>
+              <a:t> = [0.0, 0.5, 0.5, 0.0, 0.0</a:t>
+            </a:r>
+            <a:endParaRPr lang="en-US" dirty="0"/>
+          </a:p>
+        </p:txBody>
+      </p:sp>
+      <p:cxnSp>
+        <p:nvCxnSpPr>
+          <p:cNvPr id="26" name="Straight Arrow Connector 25"/>
+          <p:cNvCxnSpPr/>
+          <p:nvPr/>
+        </p:nvCxnSpPr>
+        <p:spPr>
+          <a:xfrm flipV="1">
+            <a:off x="2220825" y="4083919"/>
+            <a:ext cx="0" cy="664569"/>
+          </a:xfrm>
+          <a:prstGeom prst="straightConnector1">
+            <a:avLst/>
+          </a:prstGeom>
+          <a:ln>
+            <a:tailEnd type="triangle"/>
+          </a:ln>
+        </p:spPr>
+        <p:style>
+          <a:lnRef idx="1">
+            <a:schemeClr val="accent1"/>
+          </a:lnRef>
+          <a:fillRef idx="0">
+            <a:schemeClr val="accent1"/>
+          </a:fillRef>
+          <a:effectRef idx="0">
+            <a:schemeClr val="accent1"/>
+          </a:effectRef>
+          <a:fontRef idx="minor">
+            <a:schemeClr val="tx1"/>
+          </a:fontRef>
+        </p:style>
+      </p:cxnSp>
+      <p:cxnSp>
+        <p:nvCxnSpPr>
+          <p:cNvPr id="27" name="Straight Arrow Connector 26"/>
+          <p:cNvCxnSpPr/>
+          <p:nvPr/>
+        </p:nvCxnSpPr>
+        <p:spPr>
+          <a:xfrm flipV="1">
+            <a:off x="2220825" y="3134870"/>
+            <a:ext cx="0" cy="664569"/>
+          </a:xfrm>
+          <a:prstGeom prst="straightConnector1">
+            <a:avLst/>
+          </a:prstGeom>
+          <a:ln>
+            <a:tailEnd type="triangle"/>
+          </a:ln>
+        </p:spPr>
+        <p:style>
+          <a:lnRef idx="1">
+            <a:schemeClr val="accent1"/>
+          </a:lnRef>
+          <a:fillRef idx="0">
+            <a:schemeClr val="accent1"/>
+          </a:fillRef>
+          <a:effectRef idx="0">
+            <a:schemeClr val="accent1"/>
+          </a:effectRef>
+          <a:fontRef idx="minor">
+            <a:schemeClr val="tx1"/>
+          </a:fontRef>
+        </p:style>
+      </p:cxnSp>
+      <p:sp>
+        <p:nvSpPr>
+          <p:cNvPr id="28" name="TextBox 27"/>
+          <p:cNvSpPr txBox="1"/>
+          <p:nvPr/>
+        </p:nvSpPr>
+        <p:spPr>
+          <a:xfrm>
+            <a:off x="1320573" y="4929241"/>
+            <a:ext cx="1683474" cy="369332"/>
+          </a:xfrm>
+          <a:prstGeom prst="rect">
+            <a:avLst/>
+          </a:prstGeom>
+          <a:noFill/>
+        </p:spPr>
+        <p:txBody>
+          <a:bodyPr wrap="none" rtlCol="0">
+            <a:spAutoFit/>
+          </a:bodyPr>
+          <a:lstStyle/>
+          <a:p>
+            <a:r>
+              <a:rPr lang="en-US" dirty="0" smtClean="0"/>
+              <a:t>g = [0, 1, 0, 0, 0]</a:t>
+            </a:r>
+            <a:endParaRPr lang="en-US" dirty="0"/>
+          </a:p>
+        </p:txBody>
+      </p:sp>
+    </p:spTree>
+    <p:extLst>
+      <p:ext uri="{BB962C8B-B14F-4D97-AF65-F5344CB8AC3E}">
+        <p14:creationId xmlns:p14="http://schemas.microsoft.com/office/powerpoint/2010/main" val="961674387"/>
+      </p:ext>
+    </p:extLst>
+  </p:cSld>
+  <p:clrMapOvr>
+    <a:masterClrMapping/>
+  </p:clrMapOvr>
+</p:sld>
+</file>
+
+<file path=ppt/slides/slide21.xml><?xml version="1.0" encoding="utf-8"?>
+<p:sld xmlns:a="http://schemas.openxmlformats.org/drawingml/2006/main" xmlns:r="http://schemas.openxmlformats.org/officeDocument/2006/relationships" xmlns:p="http://schemas.openxmlformats.org/presentationml/2006/main">
+  <p:cSld>
+    <p:spTree>
+      <p:nvGrpSpPr>
+        <p:cNvPr id="1" name=""/>
+        <p:cNvGrpSpPr/>
+        <p:nvPr/>
+      </p:nvGrpSpPr>
+      <p:grpSpPr>
+        <a:xfrm>
+          <a:off x="0" y="0"/>
+          <a:ext cx="0" cy="0"/>
+          <a:chOff x="0" y="0"/>
+          <a:chExt cx="0" cy="0"/>
+        </a:xfrm>
+      </p:grpSpPr>
+      <p:sp>
+        <p:nvSpPr>
+          <p:cNvPr id="2" name="Title 1"/>
+          <p:cNvSpPr>
+            <a:spLocks noGrp="1"/>
+          </p:cNvSpPr>
+          <p:nvPr>
+            <p:ph type="title"/>
+          </p:nvPr>
+        </p:nvSpPr>
+        <p:spPr/>
+        <p:txBody>
+          <a:bodyPr/>
+          <a:lstStyle/>
+          <a:p>
+            <a:r>
+              <a:rPr lang="en-US" dirty="0" smtClean="0"/>
+              <a:t>Visualization</a:t>
+            </a:r>
+            <a:endParaRPr lang="en-US" dirty="0"/>
+          </a:p>
+        </p:txBody>
+      </p:sp>
+      <p:sp>
+        <p:nvSpPr>
+          <p:cNvPr id="3" name="Content Placeholder 2"/>
+          <p:cNvSpPr>
+            <a:spLocks noGrp="1"/>
+          </p:cNvSpPr>
+          <p:nvPr>
+            <p:ph idx="1"/>
+          </p:nvPr>
+        </p:nvSpPr>
+        <p:spPr/>
+        <p:txBody>
+          <a:bodyPr/>
+          <a:lstStyle/>
+          <a:p>
+            <a:r>
+              <a:rPr lang="en-US" dirty="0" smtClean="0"/>
+              <a:t>After each stage of the CNN, the feature maps (learned weights W</a:t>
+            </a:r>
+            <a:r>
+              <a:rPr lang="en-US" baseline="-25000" dirty="0" smtClean="0"/>
+              <a:t>i</a:t>
+            </a:r>
+            <a:r>
+              <a:rPr lang="en-US" dirty="0" smtClean="0"/>
+              <a:t> = {w</a:t>
+            </a:r>
+            <a:r>
+              <a:rPr lang="en-US" baseline="-25000" dirty="0" smtClean="0"/>
+              <a:t>i1</a:t>
+            </a:r>
+            <a:r>
+              <a:rPr lang="en-US" dirty="0" smtClean="0"/>
+              <a:t>, w</a:t>
+            </a:r>
+            <a:r>
+              <a:rPr lang="en-US" baseline="-25000" dirty="0" smtClean="0"/>
+              <a:t>i2</a:t>
+            </a:r>
+            <a:r>
+              <a:rPr lang="en-US" dirty="0" smtClean="0"/>
+              <a:t>,…w</a:t>
+            </a:r>
+            <a:r>
+              <a:rPr lang="en-US" baseline="-25000" dirty="0" smtClean="0"/>
+              <a:t>in</a:t>
+            </a:r>
+            <a:r>
+              <a:rPr lang="en-US" dirty="0" smtClean="0"/>
+              <a:t>}) can be used to transform each triangle’s feature vector into some d-dimensional space.</a:t>
+            </a:r>
+          </a:p>
+          <a:p>
+            <a:pPr lvl="1"/>
+            <a:r>
+              <a:rPr lang="en-US" dirty="0" smtClean="0"/>
+              <a:t>Forward propagate feature vector v for triangle t </a:t>
+            </a:r>
+            <a:r>
+              <a:rPr lang="en-US" dirty="0" err="1" smtClean="0"/>
+              <a:t>upto</a:t>
+            </a:r>
+            <a:r>
+              <a:rPr lang="en-US" dirty="0" smtClean="0"/>
+              <a:t> a layer to get input P to the layer P</a:t>
+            </a:r>
+            <a:r>
+              <a:rPr lang="en-US" dirty="0" smtClean="0"/>
+              <a:t> = {p</a:t>
+            </a:r>
+            <a:r>
+              <a:rPr lang="en-US" baseline="-25000" dirty="0" smtClean="0"/>
+              <a:t>1</a:t>
+            </a:r>
+            <a:r>
+              <a:rPr lang="en-US" dirty="0" smtClean="0"/>
+              <a:t>, p</a:t>
+            </a:r>
+            <a:r>
+              <a:rPr lang="en-US" baseline="-25000" dirty="0" smtClean="0"/>
+              <a:t>2</a:t>
+            </a:r>
+            <a:r>
+              <a:rPr lang="en-US" dirty="0" smtClean="0"/>
+              <a:t>, …</a:t>
+            </a:r>
+            <a:r>
+              <a:rPr lang="en-US" dirty="0" smtClean="0"/>
+              <a:t>.</a:t>
+            </a:r>
+            <a:r>
+              <a:rPr lang="en-US" dirty="0" err="1" smtClean="0"/>
+              <a:t>p</a:t>
+            </a:r>
+            <a:r>
+              <a:rPr lang="en-US" baseline="-25000" dirty="0" err="1" smtClean="0"/>
+              <a:t>n</a:t>
+            </a:r>
+            <a:r>
+              <a:rPr lang="en-US" dirty="0" smtClean="0"/>
+              <a:t>}</a:t>
+            </a:r>
+            <a:endParaRPr lang="en-US" dirty="0" smtClean="0"/>
+          </a:p>
+          <a:p>
+            <a:pPr lvl="1"/>
+            <a:r>
+              <a:rPr lang="en-US" dirty="0" smtClean="0"/>
+              <a:t>For feature map Wi, compute </a:t>
+            </a:r>
+            <a:r>
+              <a:rPr lang="en-US" dirty="0" err="1" smtClean="0"/>
+              <a:t>WiTp</a:t>
+            </a:r>
+            <a:r>
+              <a:rPr lang="en-US" dirty="0" smtClean="0"/>
+              <a:t>.</a:t>
+            </a:r>
+          </a:p>
+          <a:p>
+            <a:pPr lvl="1"/>
+            <a:r>
+              <a:rPr lang="en-US" dirty="0" smtClean="0"/>
+              <a:t>Stack the above </a:t>
+            </a:r>
+            <a:endParaRPr lang="en-US" dirty="0"/>
+          </a:p>
+        </p:txBody>
+      </p:sp>
+    </p:spTree>
+    <p:extLst>
+      <p:ext uri="{BB962C8B-B14F-4D97-AF65-F5344CB8AC3E}">
+        <p14:creationId xmlns:p14="http://schemas.microsoft.com/office/powerpoint/2010/main" val="329435500"/>
+      </p:ext>
+    </p:extLst>
+  </p:cSld>
+  <p:clrMapOvr>
+    <a:masterClrMapping/>
+  </p:clrMapOvr>
+</p:sld>
+</file>
+
+<file path=ppt/slides/slide22.xml><?xml version="1.0" encoding="utf-8"?>
+<p:sld xmlns:a="http://schemas.openxmlformats.org/drawingml/2006/main" xmlns:r="http://schemas.openxmlformats.org/officeDocument/2006/relationships" xmlns:p="http://schemas.openxmlformats.org/presentationml/2006/main">
+  <p:cSld>
+    <p:spTree>
+      <p:nvGrpSpPr>
+        <p:cNvPr id="1" name=""/>
+        <p:cNvGrpSpPr/>
+        <p:nvPr/>
+      </p:nvGrpSpPr>
+      <p:grpSpPr>
+        <a:xfrm>
+          <a:off x="0" y="0"/>
+          <a:ext cx="0" cy="0"/>
+          <a:chOff x="0" y="0"/>
+          <a:chExt cx="0" cy="0"/>
+        </a:xfrm>
+      </p:grpSpPr>
+      <p:sp>
+        <p:nvSpPr>
+          <p:cNvPr id="2" name="Title 1"/>
+          <p:cNvSpPr>
+            <a:spLocks noGrp="1"/>
+          </p:cNvSpPr>
+          <p:nvPr>
+            <p:ph type="title"/>
+          </p:nvPr>
+        </p:nvSpPr>
+        <p:spPr/>
+        <p:txBody>
+          <a:bodyPr/>
+          <a:lstStyle/>
+          <a:p>
+            <a:r>
+              <a:rPr lang="en-US" dirty="0" smtClean="0"/>
+              <a:t>Visualization</a:t>
+            </a:r>
+            <a:endParaRPr lang="en-US" dirty="0"/>
+          </a:p>
+        </p:txBody>
+      </p:sp>
+      <p:sp>
+        <p:nvSpPr>
+          <p:cNvPr id="3" name="Content Placeholder 2"/>
+          <p:cNvSpPr>
+            <a:spLocks noGrp="1"/>
+          </p:cNvSpPr>
+          <p:nvPr>
+            <p:ph idx="1"/>
+          </p:nvPr>
+        </p:nvSpPr>
+        <p:spPr/>
+        <p:txBody>
+          <a:bodyPr/>
+          <a:lstStyle/>
+          <a:p>
+            <a:endParaRPr lang="en-US"/>
+          </a:p>
+        </p:txBody>
+      </p:sp>
+    </p:spTree>
+    <p:extLst>
+      <p:ext uri="{BB962C8B-B14F-4D97-AF65-F5344CB8AC3E}">
+        <p14:creationId xmlns:p14="http://schemas.microsoft.com/office/powerpoint/2010/main" val="174669303"/>
+      </p:ext>
+    </p:extLst>
+  </p:cSld>
+  <p:clrMapOvr>
+    <a:masterClrMapping/>
+  </p:clrMapOvr>
+</p:sld>
+</file>
+
+<file path=ppt/slides/slide23.xml><?xml version="1.0" encoding="utf-8"?>
+<p:sld xmlns:a="http://schemas.openxmlformats.org/drawingml/2006/main" xmlns:r="http://schemas.openxmlformats.org/officeDocument/2006/relationships" xmlns:p="http://schemas.openxmlformats.org/presentationml/2006/main">
+  <p:cSld>
+    <p:spTree>
+      <p:nvGrpSpPr>
+        <p:cNvPr id="1" name=""/>
+        <p:cNvGrpSpPr/>
+        <p:nvPr/>
+      </p:nvGrpSpPr>
+      <p:grpSpPr>
+        <a:xfrm>
+          <a:off x="0" y="0"/>
+          <a:ext cx="0" cy="0"/>
+          <a:chOff x="0" y="0"/>
+          <a:chExt cx="0" cy="0"/>
+        </a:xfrm>
+      </p:grpSpPr>
+      <p:sp>
+        <p:nvSpPr>
+          <p:cNvPr id="2" name="Title 1"/>
+          <p:cNvSpPr>
+            <a:spLocks noGrp="1"/>
+          </p:cNvSpPr>
+          <p:nvPr>
+            <p:ph type="title"/>
+          </p:nvPr>
+        </p:nvSpPr>
+        <p:spPr/>
+        <p:txBody>
+          <a:bodyPr/>
+          <a:lstStyle/>
+          <a:p>
+            <a:r>
+              <a:rPr lang="en-US" dirty="0" smtClean="0"/>
+              <a:t>Briefly - Learning to Generate Chairs, Tables and Cars with CNNs</a:t>
+            </a:r>
+            <a:endParaRPr lang="en-US" dirty="0"/>
+          </a:p>
+        </p:txBody>
+      </p:sp>
+      <p:pic>
+        <p:nvPicPr>
+          <p:cNvPr id="4" name="Picture 3"/>
+          <p:cNvPicPr>
+            <a:picLocks noChangeAspect="1"/>
+          </p:cNvPicPr>
+          <p:nvPr/>
+        </p:nvPicPr>
+        <p:blipFill>
+          <a:blip r:embed="rId2"/>
+          <a:stretch>
+            <a:fillRect/>
+          </a:stretch>
+        </p:blipFill>
+        <p:spPr>
+          <a:xfrm>
+            <a:off x="2600325" y="2401887"/>
+            <a:ext cx="6991350" cy="3476625"/>
+          </a:xfrm>
+          <a:prstGeom prst="rect">
+            <a:avLst/>
+          </a:prstGeom>
+        </p:spPr>
+      </p:pic>
+    </p:spTree>
+    <p:extLst>
+      <p:ext uri="{BB962C8B-B14F-4D97-AF65-F5344CB8AC3E}">
+        <p14:creationId xmlns:p14="http://schemas.microsoft.com/office/powerpoint/2010/main" val="3917815851"/>
       </p:ext>
     </p:extLst>
   </p:cSld>
@@ -4338,7 +7540,7 @@
           <a:p>
             <a:r>
               <a:rPr lang="en-US" dirty="0" smtClean="0"/>
-              <a:t>Possible approach - Learn a way of classifying each triangle</a:t>
+              <a:t>Possible approach - Learn a way of labeling each triangle</a:t>
             </a:r>
             <a:endParaRPr lang="en-US" dirty="0"/>
           </a:p>
@@ -4804,109 +8006,6 @@
           <a:chExt cx="0" cy="0"/>
         </a:xfrm>
       </p:grpSpPr>
-      <p:sp>
-        <p:nvSpPr>
-          <p:cNvPr id="2" name="Title 1"/>
-          <p:cNvSpPr>
-            <a:spLocks noGrp="1"/>
-          </p:cNvSpPr>
-          <p:nvPr>
-            <p:ph type="title"/>
-          </p:nvPr>
-        </p:nvSpPr>
-        <p:spPr/>
-        <p:txBody>
-          <a:bodyPr/>
-          <a:lstStyle/>
-          <a:p>
-            <a:r>
-              <a:rPr lang="en-US" dirty="0" smtClean="0"/>
-              <a:t>Learning triangle labeling – Training process</a:t>
-            </a:r>
-            <a:endParaRPr lang="en-US" dirty="0"/>
-          </a:p>
-        </p:txBody>
-      </p:sp>
-      <p:sp>
-        <p:nvSpPr>
-          <p:cNvPr id="4" name="Content Placeholder 3"/>
-          <p:cNvSpPr txBox="1">
-            <a:spLocks noGrp="1"/>
-          </p:cNvSpPr>
-          <p:nvPr>
-            <p:ph idx="1"/>
-          </p:nvPr>
-        </p:nvSpPr>
-        <p:spPr>
-          <a:xfrm>
-            <a:off x="822050" y="1461516"/>
-            <a:ext cx="10389289" cy="2028248"/>
-          </a:xfrm>
-          <a:prstGeom prst="rect">
-            <a:avLst/>
-          </a:prstGeom>
-          <a:noFill/>
-        </p:spPr>
-        <p:txBody>
-          <a:bodyPr wrap="square" rtlCol="0">
-            <a:spAutoFit/>
-          </a:bodyPr>
-          <a:lstStyle/>
-          <a:p>
-            <a:r>
-              <a:rPr lang="en-US" dirty="0" smtClean="0"/>
-              <a:t>Triangles t is transformed to vector v in R</a:t>
-            </a:r>
-            <a:r>
-              <a:rPr lang="en-US" baseline="30000" dirty="0" smtClean="0"/>
-              <a:t>n</a:t>
-            </a:r>
-            <a:r>
-              <a:rPr lang="en-US" dirty="0" smtClean="0"/>
-              <a:t>. </a:t>
-            </a:r>
-          </a:p>
-          <a:p>
-            <a:r>
-              <a:rPr lang="en-US" dirty="0" smtClean="0"/>
-              <a:t>p(label | t) =&gt; p(label | v).</a:t>
-            </a:r>
-          </a:p>
-          <a:p>
-            <a:r>
-              <a:rPr lang="en-US" dirty="0" smtClean="0"/>
-              <a:t>Model the probability distribution of each label: </a:t>
-            </a:r>
-            <a:r>
-              <a:rPr lang="en-US" dirty="0" smtClean="0"/>
-              <a:t>p(label | v) = f(</a:t>
-            </a:r>
-            <a:r>
-              <a:rPr lang="az-Cyrl-AZ" dirty="0" smtClean="0"/>
-              <a:t>Ѳ</a:t>
-            </a:r>
-            <a:r>
-              <a:rPr lang="en-US" dirty="0" smtClean="0"/>
-              <a:t>, v).</a:t>
-            </a:r>
-          </a:p>
-          <a:p>
-            <a:r>
-              <a:rPr lang="en-US" dirty="0" smtClean="0"/>
-              <a:t>Learn parameters </a:t>
-            </a:r>
-            <a:r>
-              <a:rPr lang="az-Cyrl-AZ" dirty="0" smtClean="0"/>
-              <a:t>Ѳ</a:t>
-            </a:r>
-            <a:r>
-              <a:rPr lang="en-US" dirty="0" smtClean="0"/>
-              <a:t> from input data for each label.</a:t>
-            </a:r>
-            <a:endParaRPr lang="en-US" dirty="0" smtClean="0"/>
-          </a:p>
-        </p:txBody>
-      </p:sp>
       <p:pic>
         <p:nvPicPr>
           <p:cNvPr id="5" name="Picture 4"/>
@@ -4923,7 +8022,7 @@
         </p:blipFill>
         <p:spPr>
           <a:xfrm>
-            <a:off x="1033330" y="3503860"/>
+            <a:off x="993574" y="3503860"/>
             <a:ext cx="1781175" cy="2657475"/>
           </a:xfrm>
           <a:prstGeom prst="rect">
@@ -4933,7 +8032,7 @@
       </p:pic>
       <p:pic>
         <p:nvPicPr>
-          <p:cNvPr id="6" name="Picture 5"/>
+          <p:cNvPr id="24" name="Picture 23"/>
           <p:cNvPicPr>
             <a:picLocks noChangeAspect="1"/>
           </p:cNvPicPr>
@@ -4947,6 +8046,146 @@
         </p:blipFill>
         <p:spPr>
           <a:xfrm>
+            <a:off x="1081493" y="3560359"/>
+            <a:ext cx="1705725" cy="2580316"/>
+          </a:xfrm>
+          <a:prstGeom prst="rect">
+            <a:avLst/>
+          </a:prstGeom>
+        </p:spPr>
+      </p:pic>
+      <p:sp>
+        <p:nvSpPr>
+          <p:cNvPr id="2" name="Title 1"/>
+          <p:cNvSpPr>
+            <a:spLocks noGrp="1"/>
+          </p:cNvSpPr>
+          <p:nvPr>
+            <p:ph type="title"/>
+          </p:nvPr>
+        </p:nvSpPr>
+        <p:spPr/>
+        <p:txBody>
+          <a:bodyPr/>
+          <a:lstStyle/>
+          <a:p>
+            <a:r>
+              <a:rPr lang="en-US" dirty="0" smtClean="0"/>
+              <a:t>Learning triangle labeling – Training process – assuming one v/s all</a:t>
+            </a:r>
+            <a:endParaRPr lang="en-US" dirty="0"/>
+          </a:p>
+        </p:txBody>
+      </p:sp>
+      <p:sp>
+        <p:nvSpPr>
+          <p:cNvPr id="4" name="Content Placeholder 3"/>
+          <p:cNvSpPr txBox="1">
+            <a:spLocks noGrp="1"/>
+          </p:cNvSpPr>
+          <p:nvPr>
+            <p:ph idx="1"/>
+          </p:nvPr>
+        </p:nvSpPr>
+        <p:spPr>
+          <a:xfrm>
+            <a:off x="822050" y="1461516"/>
+            <a:ext cx="10389289" cy="2305246"/>
+          </a:xfrm>
+          <a:prstGeom prst="rect">
+            <a:avLst/>
+          </a:prstGeom>
+          <a:noFill/>
+        </p:spPr>
+        <p:txBody>
+          <a:bodyPr wrap="square" rtlCol="0">
+            <a:spAutoFit/>
+          </a:bodyPr>
+          <a:lstStyle/>
+          <a:p>
+            <a:r>
+              <a:rPr lang="en-US" dirty="0" smtClean="0"/>
+              <a:t>Triangles t is transformed to vector v in R</a:t>
+            </a:r>
+            <a:r>
+              <a:rPr lang="en-US" baseline="30000" dirty="0" smtClean="0"/>
+              <a:t>n</a:t>
+            </a:r>
+            <a:r>
+              <a:rPr lang="en-US" dirty="0" smtClean="0"/>
+              <a:t>. </a:t>
+            </a:r>
+          </a:p>
+          <a:p>
+            <a:r>
+              <a:rPr lang="en-US" dirty="0" smtClean="0"/>
+              <a:t>p(label | t) =&gt; p(label | v).</a:t>
+            </a:r>
+          </a:p>
+          <a:p>
+            <a:r>
+              <a:rPr lang="en-US" dirty="0" smtClean="0"/>
+              <a:t>Model the probability distribution of each label: </a:t>
+            </a:r>
+            <a:r>
+              <a:rPr lang="en-US" dirty="0" smtClean="0"/>
+              <a:t>p(label | v) = f(</a:t>
+            </a:r>
+            <a:r>
+              <a:rPr lang="az-Cyrl-AZ" dirty="0" smtClean="0"/>
+              <a:t>Ѳ</a:t>
+            </a:r>
+            <a:r>
+              <a:rPr lang="en-US" dirty="0" smtClean="0"/>
+              <a:t>, v). </a:t>
+            </a:r>
+            <a:r>
+              <a:rPr lang="en-US" sz="1600" dirty="0" smtClean="0"/>
+              <a:t>(Or use a non-</a:t>
+            </a:r>
+            <a:r>
+              <a:rPr lang="en-US" sz="1600" dirty="0" err="1" smtClean="0"/>
+              <a:t>parameteric</a:t>
+            </a:r>
+            <a:r>
+              <a:rPr lang="en-US" sz="1600" dirty="0" smtClean="0"/>
+              <a:t> prob. density estimation technique).</a:t>
+            </a:r>
+            <a:endParaRPr lang="en-US" dirty="0" smtClean="0"/>
+          </a:p>
+          <a:p>
+            <a:r>
+              <a:rPr lang="en-US" dirty="0" smtClean="0"/>
+              <a:t>Learn parameters </a:t>
+            </a:r>
+            <a:r>
+              <a:rPr lang="az-Cyrl-AZ" dirty="0" smtClean="0"/>
+              <a:t>Ѳ</a:t>
+            </a:r>
+            <a:r>
+              <a:rPr lang="en-US" dirty="0" smtClean="0"/>
+              <a:t> from input data for each label.</a:t>
+            </a:r>
+            <a:endParaRPr lang="en-US" dirty="0" smtClean="0"/>
+          </a:p>
+        </p:txBody>
+      </p:sp>
+      <p:pic>
+        <p:nvPicPr>
+          <p:cNvPr id="6" name="Picture 5"/>
+          <p:cNvPicPr>
+            <a:picLocks noChangeAspect="1"/>
+          </p:cNvPicPr>
+          <p:nvPr/>
+        </p:nvPicPr>
+        <p:blipFill>
+          <a:blip r:embed="rId4"/>
+          <a:stretch>
+            <a:fillRect/>
+          </a:stretch>
+        </p:blipFill>
+        <p:spPr>
+          <a:xfrm>
             <a:off x="3070153" y="3747128"/>
             <a:ext cx="818322" cy="818322"/>
           </a:xfrm>
@@ -4975,13 +8214,13 @@
         </p:spPr>
         <p:style>
           <a:lnRef idx="1">
-            <a:schemeClr val="accent2"/>
+            <a:schemeClr val="dk1"/>
           </a:lnRef>
           <a:fillRef idx="0">
-            <a:schemeClr val="accent2"/>
+            <a:schemeClr val="dk1"/>
           </a:fillRef>
           <a:effectRef idx="0">
-            <a:schemeClr val="accent2"/>
+            <a:schemeClr val="dk1"/>
           </a:effectRef>
           <a:fontRef idx="minor">
             <a:schemeClr val="tx1"/>
@@ -5008,13 +8247,13 @@
         </p:spPr>
         <p:style>
           <a:lnRef idx="1">
-            <a:schemeClr val="accent2"/>
+            <a:schemeClr val="dk1"/>
           </a:lnRef>
           <a:fillRef idx="0">
-            <a:schemeClr val="accent2"/>
+            <a:schemeClr val="dk1"/>
           </a:fillRef>
           <a:effectRef idx="0">
-            <a:schemeClr val="accent2"/>
+            <a:schemeClr val="dk1"/>
           </a:effectRef>
           <a:fontRef idx="minor">
             <a:schemeClr val="tx1"/>
@@ -5030,7 +8269,7 @@
           <p:nvPr/>
         </p:nvPicPr>
         <p:blipFill>
-          <a:blip r:embed="rId3"/>
+          <a:blip r:embed="rId4"/>
           <a:stretch>
             <a:fillRect/>
           </a:stretch>
@@ -5065,13 +8304,13 @@
         </p:spPr>
         <p:style>
           <a:lnRef idx="1">
-            <a:schemeClr val="accent2"/>
+            <a:schemeClr val="dk1"/>
           </a:lnRef>
           <a:fillRef idx="0">
-            <a:schemeClr val="accent2"/>
+            <a:schemeClr val="dk1"/>
           </a:fillRef>
           <a:effectRef idx="0">
-            <a:schemeClr val="accent2"/>
+            <a:schemeClr val="dk1"/>
           </a:effectRef>
           <a:fontRef idx="minor">
             <a:schemeClr val="tx1"/>
@@ -5100,13 +8339,13 @@
         </p:spPr>
         <p:style>
           <a:lnRef idx="1">
-            <a:schemeClr val="accent2"/>
+            <a:schemeClr val="dk1"/>
           </a:lnRef>
           <a:fillRef idx="0">
-            <a:schemeClr val="accent2"/>
+            <a:schemeClr val="dk1"/>
           </a:fillRef>
           <a:effectRef idx="0">
-            <a:schemeClr val="accent2"/>
+            <a:schemeClr val="dk1"/>
           </a:effectRef>
           <a:fontRef idx="minor">
             <a:schemeClr val="tx1"/>
@@ -5122,64 +8361,6 @@
           <p:nvPr/>
         </p:nvPicPr>
         <p:blipFill>
-          <a:blip r:embed="rId4"/>
-          <a:stretch>
-            <a:fillRect/>
-          </a:stretch>
-        </p:blipFill>
-        <p:spPr>
-          <a:xfrm>
-            <a:off x="4375973" y="3489764"/>
-            <a:ext cx="3083356" cy="2635034"/>
-          </a:xfrm>
-          <a:prstGeom prst="rect">
-            <a:avLst/>
-          </a:prstGeom>
-        </p:spPr>
-      </p:pic>
-      <p:sp>
-        <p:nvSpPr>
-          <p:cNvPr id="13" name="TextBox 12"/>
-          <p:cNvSpPr txBox="1"/>
-          <p:nvPr/>
-        </p:nvSpPr>
-        <p:spPr>
-          <a:xfrm>
-            <a:off x="5897633" y="4355555"/>
-            <a:ext cx="389850" cy="369332"/>
-          </a:xfrm>
-          <a:prstGeom prst="rect">
-            <a:avLst/>
-          </a:prstGeom>
-          <a:noFill/>
-        </p:spPr>
-        <p:txBody>
-          <a:bodyPr wrap="none" rtlCol="0">
-            <a:spAutoFit/>
-          </a:bodyPr>
-          <a:lstStyle/>
-          <a:p>
-            <a:r>
-              <a:rPr lang="en-US" dirty="0" smtClean="0"/>
-              <a:t>R</a:t>
-            </a:r>
-            <a:r>
-              <a:rPr lang="en-US" baseline="30000" dirty="0" smtClean="0"/>
-              <a:t>n</a:t>
-            </a:r>
-            <a:endParaRPr lang="en-US" baseline="30000" dirty="0"/>
-          </a:p>
-        </p:txBody>
-      </p:sp>
-      <p:pic>
-        <p:nvPicPr>
-          <p:cNvPr id="14" name="Picture 13"/>
-          <p:cNvPicPr>
-            <a:picLocks noChangeAspect="1"/>
-          </p:cNvPicPr>
-          <p:nvPr/>
-        </p:nvPicPr>
-        <p:blipFill>
           <a:blip r:embed="rId5"/>
           <a:stretch>
             <a:fillRect/>
@@ -5187,14 +8368,48 @@
         </p:blipFill>
         <p:spPr>
           <a:xfrm>
-            <a:off x="308318" y="4156289"/>
-            <a:ext cx="753297" cy="1398981"/>
+            <a:off x="4323287" y="3745520"/>
+            <a:ext cx="3083356" cy="2635034"/>
           </a:xfrm>
           <a:prstGeom prst="rect">
             <a:avLst/>
           </a:prstGeom>
         </p:spPr>
       </p:pic>
+      <p:sp>
+        <p:nvSpPr>
+          <p:cNvPr id="13" name="TextBox 12"/>
+          <p:cNvSpPr txBox="1"/>
+          <p:nvPr/>
+        </p:nvSpPr>
+        <p:spPr>
+          <a:xfrm>
+            <a:off x="5897633" y="4355555"/>
+            <a:ext cx="389850" cy="369332"/>
+          </a:xfrm>
+          <a:prstGeom prst="rect">
+            <a:avLst/>
+          </a:prstGeom>
+          <a:noFill/>
+        </p:spPr>
+        <p:txBody>
+          <a:bodyPr wrap="none" rtlCol="0">
+            <a:spAutoFit/>
+          </a:bodyPr>
+          <a:lstStyle/>
+          <a:p>
+            <a:r>
+              <a:rPr lang="en-US" dirty="0" smtClean="0"/>
+              <a:t>R</a:t>
+            </a:r>
+            <a:r>
+              <a:rPr lang="en-US" baseline="30000" dirty="0" smtClean="0"/>
+              <a:t>n</a:t>
+            </a:r>
+            <a:endParaRPr lang="en-US" baseline="30000" dirty="0"/>
+          </a:p>
+        </p:txBody>
+      </p:sp>
       <p:pic>
         <p:nvPicPr>
           <p:cNvPr id="16" name="Picture 15"/>
@@ -5426,6 +8641,30 @@
           </a:p>
         </p:txBody>
       </p:sp>
+      <p:pic>
+        <p:nvPicPr>
+          <p:cNvPr id="25" name="Picture 24"/>
+          <p:cNvPicPr>
+            <a:picLocks noChangeAspect="1"/>
+          </p:cNvPicPr>
+          <p:nvPr/>
+        </p:nvPicPr>
+        <p:blipFill>
+          <a:blip r:embed="rId7"/>
+          <a:stretch>
+            <a:fillRect/>
+          </a:stretch>
+        </p:blipFill>
+        <p:spPr>
+          <a:xfrm>
+            <a:off x="185173" y="4690322"/>
+            <a:ext cx="942975" cy="523875"/>
+          </a:xfrm>
+          <a:prstGeom prst="rect">
+            <a:avLst/>
+          </a:prstGeom>
+        </p:spPr>
+      </p:pic>
     </p:spTree>
     <p:extLst>
       <p:ext uri="{BB962C8B-B14F-4D97-AF65-F5344CB8AC3E}">
@@ -5456,123 +8695,9 @@
           <a:chExt cx="0" cy="0"/>
         </a:xfrm>
       </p:grpSpPr>
-      <p:sp>
-        <p:nvSpPr>
-          <p:cNvPr id="2" name="Title 1"/>
-          <p:cNvSpPr>
-            <a:spLocks noGrp="1"/>
-          </p:cNvSpPr>
-          <p:nvPr>
-            <p:ph type="title"/>
-          </p:nvPr>
-        </p:nvSpPr>
-        <p:spPr/>
-        <p:txBody>
-          <a:bodyPr/>
-          <a:lstStyle/>
-          <a:p>
-            <a:r>
-              <a:rPr lang="en-US" dirty="0" smtClean="0"/>
-              <a:t>Learning triangle labeling – Handling novel data</a:t>
-            </a:r>
-            <a:endParaRPr lang="en-US" dirty="0"/>
-          </a:p>
-        </p:txBody>
-      </p:sp>
-      <p:sp>
-        <p:nvSpPr>
-          <p:cNvPr id="30" name="TextBox 29"/>
-          <p:cNvSpPr txBox="1"/>
-          <p:nvPr/>
-        </p:nvSpPr>
-        <p:spPr>
-          <a:xfrm>
-            <a:off x="974034" y="2087217"/>
-            <a:ext cx="9750287" cy="646331"/>
-          </a:xfrm>
-          <a:prstGeom prst="rect">
-            <a:avLst/>
-          </a:prstGeom>
-          <a:noFill/>
-        </p:spPr>
-        <p:txBody>
-          <a:bodyPr wrap="square" rtlCol="0">
-            <a:spAutoFit/>
-          </a:bodyPr>
-          <a:lstStyle/>
-          <a:p>
-            <a:r>
-              <a:rPr lang="en-US" dirty="0" smtClean="0"/>
-              <a:t>Transform triangle </a:t>
-            </a:r>
-            <a:r>
-              <a:rPr lang="en-US" dirty="0" err="1" smtClean="0"/>
-              <a:t>t</a:t>
-            </a:r>
-            <a:r>
-              <a:rPr lang="en-US" baseline="-25000" dirty="0" err="1" smtClean="0"/>
-              <a:t>i</a:t>
-            </a:r>
-            <a:r>
-              <a:rPr lang="en-US" dirty="0" smtClean="0"/>
-              <a:t> to feature space v</a:t>
-            </a:r>
-            <a:r>
-              <a:rPr lang="en-US" baseline="-25000" dirty="0" smtClean="0"/>
-              <a:t>i</a:t>
-            </a:r>
-            <a:r>
-              <a:rPr lang="en-US" dirty="0" smtClean="0"/>
-              <a:t>.</a:t>
-            </a:r>
-          </a:p>
-          <a:p>
-            <a:r>
-              <a:rPr lang="en-US" dirty="0" smtClean="0"/>
-              <a:t>Compute the probability of each label </a:t>
-            </a:r>
-            <a:r>
-              <a:rPr lang="en-US" dirty="0" err="1" smtClean="0"/>
-              <a:t>l</a:t>
-            </a:r>
-            <a:r>
-              <a:rPr lang="en-US" baseline="-25000" dirty="0" err="1" smtClean="0"/>
-              <a:t>k</a:t>
-            </a:r>
-            <a:r>
-              <a:rPr lang="en-US" baseline="-25000" dirty="0" smtClean="0"/>
-              <a:t> </a:t>
-            </a:r>
-            <a:r>
-              <a:rPr lang="en-US" dirty="0" smtClean="0"/>
-              <a:t>p(</a:t>
-            </a:r>
-            <a:r>
-              <a:rPr lang="en-US" dirty="0" err="1" smtClean="0"/>
-              <a:t>l</a:t>
-            </a:r>
-            <a:r>
-              <a:rPr lang="en-US" baseline="-25000" dirty="0" err="1" smtClean="0"/>
-              <a:t>k</a:t>
-            </a:r>
-            <a:r>
-              <a:rPr lang="en-US" dirty="0" smtClean="0"/>
-              <a:t> | v</a:t>
-            </a:r>
-            <a:r>
-              <a:rPr lang="en-US" baseline="-25000" dirty="0" smtClean="0"/>
-              <a:t>i</a:t>
-            </a:r>
-            <a:r>
-              <a:rPr lang="en-US" dirty="0" smtClean="0"/>
-              <a:t>) from the learned probability distribution.</a:t>
-            </a:r>
-          </a:p>
-        </p:txBody>
-      </p:sp>
       <p:pic>
         <p:nvPicPr>
-          <p:cNvPr id="37" name="Picture 36"/>
+          <p:cNvPr id="59" name="Picture 58"/>
           <p:cNvPicPr>
             <a:picLocks noChangeAspect="1"/>
           </p:cNvPicPr>
@@ -5586,14 +8711,128 @@
         </p:blipFill>
         <p:spPr>
           <a:xfrm>
-            <a:off x="3081337" y="2920076"/>
-            <a:ext cx="1914525" cy="2895600"/>
+            <a:off x="2745283" y="2774612"/>
+            <a:ext cx="2106462" cy="3186527"/>
           </a:xfrm>
           <a:prstGeom prst="rect">
             <a:avLst/>
           </a:prstGeom>
         </p:spPr>
       </p:pic>
+      <p:sp>
+        <p:nvSpPr>
+          <p:cNvPr id="2" name="Title 1"/>
+          <p:cNvSpPr>
+            <a:spLocks noGrp="1"/>
+          </p:cNvSpPr>
+          <p:nvPr>
+            <p:ph type="title"/>
+          </p:nvPr>
+        </p:nvSpPr>
+        <p:spPr/>
+        <p:txBody>
+          <a:bodyPr/>
+          <a:lstStyle/>
+          <a:p>
+            <a:r>
+              <a:rPr lang="en-US" dirty="0" smtClean="0"/>
+              <a:t>Learning triangle labeling – Handling novel data</a:t>
+            </a:r>
+            <a:endParaRPr lang="en-US" dirty="0"/>
+          </a:p>
+        </p:txBody>
+      </p:sp>
+      <p:sp>
+        <p:nvSpPr>
+          <p:cNvPr id="30" name="TextBox 29"/>
+          <p:cNvSpPr txBox="1"/>
+          <p:nvPr/>
+        </p:nvSpPr>
+        <p:spPr>
+          <a:xfrm>
+            <a:off x="974034" y="2087217"/>
+            <a:ext cx="9750287" cy="646331"/>
+          </a:xfrm>
+          <a:prstGeom prst="rect">
+            <a:avLst/>
+          </a:prstGeom>
+          <a:noFill/>
+        </p:spPr>
+        <p:txBody>
+          <a:bodyPr wrap="square" rtlCol="0">
+            <a:spAutoFit/>
+          </a:bodyPr>
+          <a:lstStyle/>
+          <a:p>
+            <a:r>
+              <a:rPr lang="en-US" dirty="0" smtClean="0"/>
+              <a:t>Transform triangle </a:t>
+            </a:r>
+            <a:r>
+              <a:rPr lang="en-US" dirty="0" err="1" smtClean="0"/>
+              <a:t>t</a:t>
+            </a:r>
+            <a:r>
+              <a:rPr lang="en-US" baseline="-25000" dirty="0" err="1" smtClean="0"/>
+              <a:t>i</a:t>
+            </a:r>
+            <a:r>
+              <a:rPr lang="en-US" dirty="0" smtClean="0"/>
+              <a:t> to feature space v</a:t>
+            </a:r>
+            <a:r>
+              <a:rPr lang="en-US" baseline="-25000" dirty="0" smtClean="0"/>
+              <a:t>i</a:t>
+            </a:r>
+            <a:r>
+              <a:rPr lang="en-US" dirty="0" smtClean="0"/>
+              <a:t>.</a:t>
+            </a:r>
+          </a:p>
+          <a:p>
+            <a:r>
+              <a:rPr lang="en-US" dirty="0" smtClean="0"/>
+              <a:t>Compute the probability of each label </a:t>
+            </a:r>
+            <a:r>
+              <a:rPr lang="en-US" dirty="0" err="1" smtClean="0"/>
+              <a:t>l</a:t>
+            </a:r>
+            <a:r>
+              <a:rPr lang="en-US" baseline="-25000" dirty="0" err="1" smtClean="0"/>
+              <a:t>k</a:t>
+            </a:r>
+            <a:r>
+              <a:rPr lang="en-US" baseline="-25000" dirty="0" smtClean="0"/>
+              <a:t> </a:t>
+            </a:r>
+            <a:r>
+              <a:rPr lang="en-US" dirty="0" smtClean="0"/>
+              <a:t>p(</a:t>
+            </a:r>
+            <a:r>
+              <a:rPr lang="en-US" dirty="0" err="1" smtClean="0"/>
+              <a:t>l</a:t>
+            </a:r>
+            <a:r>
+              <a:rPr lang="en-US" baseline="-25000" dirty="0" err="1" smtClean="0"/>
+              <a:t>k</a:t>
+            </a:r>
+            <a:r>
+              <a:rPr lang="en-US" dirty="0" smtClean="0"/>
+              <a:t> | v</a:t>
+            </a:r>
+            <a:r>
+              <a:rPr lang="en-US" baseline="-25000" dirty="0" smtClean="0"/>
+              <a:t>i</a:t>
+            </a:r>
+            <a:r>
+              <a:rPr lang="en-US" dirty="0" smtClean="0"/>
+              <a:t>) from the learned probability distribution.</a:t>
+            </a:r>
+          </a:p>
+        </p:txBody>
+      </p:sp>
       <p:pic>
         <p:nvPicPr>
           <p:cNvPr id="39" name="Picture 38"/>
@@ -5667,7 +8906,7 @@
         </p:blipFill>
         <p:spPr>
           <a:xfrm>
-            <a:off x="9750784" y="3368739"/>
+            <a:off x="9484000" y="3740079"/>
             <a:ext cx="1555475" cy="1044235"/>
           </a:xfrm>
           <a:prstGeom prst="rect">
@@ -5677,13 +8916,114 @@
       </p:pic>
       <p:sp>
         <p:nvSpPr>
-          <p:cNvPr id="43" name="Rectangle 42"/>
+          <p:cNvPr id="45" name="TextBox 44"/>
+          <p:cNvSpPr txBox="1"/>
+          <p:nvPr/>
+        </p:nvSpPr>
+        <p:spPr>
+          <a:xfrm>
+            <a:off x="9344829" y="5426510"/>
+            <a:ext cx="1965795" cy="369332"/>
+          </a:xfrm>
+          <a:prstGeom prst="rect">
+            <a:avLst/>
+          </a:prstGeom>
+          <a:noFill/>
+        </p:spPr>
+        <p:txBody>
+          <a:bodyPr wrap="none" rtlCol="0">
+            <a:spAutoFit/>
+          </a:bodyPr>
+          <a:lstStyle/>
+          <a:p>
+            <a:r>
+              <a:rPr lang="en-US" dirty="0" smtClean="0"/>
+              <a:t>p(torso | v</a:t>
+            </a:r>
+            <a:r>
+              <a:rPr lang="en-US" baseline="-25000" dirty="0" smtClean="0"/>
+              <a:t>i</a:t>
+            </a:r>
+            <a:r>
+              <a:rPr lang="en-US" dirty="0" smtClean="0"/>
+              <a:t>) = 0.95 </a:t>
+            </a:r>
+            <a:endParaRPr lang="en-US" dirty="0"/>
+          </a:p>
+        </p:txBody>
+      </p:sp>
+      <p:sp>
+        <p:nvSpPr>
+          <p:cNvPr id="46" name="TextBox 45"/>
+          <p:cNvSpPr txBox="1"/>
+          <p:nvPr/>
+        </p:nvSpPr>
+        <p:spPr>
+          <a:xfrm>
+            <a:off x="9352139" y="5048165"/>
+            <a:ext cx="1915909" cy="369332"/>
+          </a:xfrm>
+          <a:prstGeom prst="rect">
+            <a:avLst/>
+          </a:prstGeom>
+          <a:noFill/>
+        </p:spPr>
+        <p:txBody>
+          <a:bodyPr wrap="none" rtlCol="0">
+            <a:spAutoFit/>
+          </a:bodyPr>
+          <a:lstStyle/>
+          <a:p>
+            <a:r>
+              <a:rPr lang="en-US" dirty="0" smtClean="0"/>
+              <a:t>p(head | vi) = 0.05</a:t>
+            </a:r>
+            <a:endParaRPr lang="en-US" dirty="0"/>
+          </a:p>
+        </p:txBody>
+      </p:sp>
+      <p:cxnSp>
+        <p:nvCxnSpPr>
+          <p:cNvPr id="47" name="Straight Arrow Connector 46"/>
+          <p:cNvCxnSpPr/>
+          <p:nvPr/>
+        </p:nvCxnSpPr>
+        <p:spPr>
+          <a:xfrm>
+            <a:off x="7543800" y="4099563"/>
+            <a:ext cx="3180521" cy="160208"/>
+          </a:xfrm>
+          <a:prstGeom prst="straightConnector1">
+            <a:avLst/>
+          </a:prstGeom>
+          <a:ln>
+            <a:tailEnd type="triangle"/>
+          </a:ln>
+        </p:spPr>
+        <p:style>
+          <a:lnRef idx="3">
+            <a:schemeClr val="accent4"/>
+          </a:lnRef>
+          <a:fillRef idx="0">
+            <a:schemeClr val="accent4"/>
+          </a:fillRef>
+          <a:effectRef idx="2">
+            <a:schemeClr val="accent4"/>
+          </a:effectRef>
+          <a:fontRef idx="minor">
+            <a:schemeClr val="tx1"/>
+          </a:fontRef>
+        </p:style>
+      </p:cxnSp>
+      <p:sp>
+        <p:nvSpPr>
+          <p:cNvPr id="52" name="Rectangle 51"/>
           <p:cNvSpPr/>
           <p:nvPr/>
         </p:nvSpPr>
         <p:spPr>
           <a:xfrm>
-            <a:off x="8890182" y="3597964"/>
+            <a:off x="9408574" y="3083579"/>
             <a:ext cx="461957" cy="257492"/>
           </a:xfrm>
           <a:prstGeom prst="rect">
@@ -5717,13 +9057,13 @@
       </p:sp>
       <p:sp>
         <p:nvSpPr>
-          <p:cNvPr id="44" name="Rectangle 43"/>
+          <p:cNvPr id="53" name="Rectangle 52"/>
           <p:cNvSpPr/>
           <p:nvPr/>
         </p:nvSpPr>
         <p:spPr>
           <a:xfrm>
-            <a:off x="8890182" y="3945929"/>
+            <a:off x="9408574" y="3431544"/>
             <a:ext cx="461957" cy="257492"/>
           </a:xfrm>
           <a:prstGeom prst="rect">
@@ -5760,14 +9100,14 @@
       </p:sp>
       <p:sp>
         <p:nvSpPr>
-          <p:cNvPr id="45" name="TextBox 44"/>
+          <p:cNvPr id="54" name="TextBox 53"/>
           <p:cNvSpPr txBox="1"/>
           <p:nvPr/>
         </p:nvSpPr>
         <p:spPr>
           <a:xfrm>
-            <a:off x="9036720" y="5947780"/>
-            <a:ext cx="1504130" cy="369332"/>
+            <a:off x="10009683" y="3375624"/>
+            <a:ext cx="1247649" cy="369332"/>
           </a:xfrm>
           <a:prstGeom prst="rect">
             <a:avLst/>
@@ -5782,15 +9122,7 @@
           <a:p>
             <a:r>
               <a:rPr lang="en-US" dirty="0" smtClean="0"/>
-              <a:t>p(torso | v</a:t>
-            </a:r>
-            <a:r>
-              <a:rPr lang="en-US" baseline="-25000" dirty="0" smtClean="0"/>
-              <a:t>i</a:t>
-            </a:r>
-            <a:r>
-              <a:rPr lang="en-US" dirty="0" smtClean="0"/>
-              <a:t>) = </a:t>
+              <a:t>p(torso | v)</a:t>
             </a:r>
             <a:endParaRPr lang="en-US" dirty="0"/>
           </a:p>
@@ -5798,14 +9130,14 @@
       </p:sp>
       <p:sp>
         <p:nvSpPr>
-          <p:cNvPr id="46" name="TextBox 45"/>
+          <p:cNvPr id="55" name="TextBox 54"/>
           <p:cNvSpPr txBox="1"/>
           <p:nvPr/>
         </p:nvSpPr>
         <p:spPr>
           <a:xfrm>
-            <a:off x="9044030" y="5569435"/>
-            <a:ext cx="1285929" cy="369332"/>
+            <a:off x="10009683" y="3002909"/>
+            <a:ext cx="1233030" cy="369332"/>
           </a:xfrm>
           <a:prstGeom prst="rect">
             <a:avLst/>
@@ -5820,45 +9152,42 @@
           <a:p>
             <a:r>
               <a:rPr lang="en-US" dirty="0" smtClean="0"/>
-              <a:t>p(head | vi)</a:t>
+              <a:t>p(head | v)</a:t>
             </a:r>
             <a:endParaRPr lang="en-US" dirty="0"/>
           </a:p>
         </p:txBody>
       </p:sp>
-      <p:cxnSp>
-        <p:nvCxnSpPr>
-          <p:cNvPr id="47" name="Straight Arrow Connector 46"/>
-          <p:cNvCxnSpPr/>
-          <p:nvPr/>
-        </p:nvCxnSpPr>
-        <p:spPr>
-          <a:xfrm flipV="1">
-            <a:off x="7543800" y="3936917"/>
-            <a:ext cx="3498574" cy="162645"/>
-          </a:xfrm>
-          <a:prstGeom prst="straightConnector1">
-            <a:avLst/>
-          </a:prstGeom>
-          <a:ln>
-            <a:tailEnd type="triangle"/>
-          </a:ln>
-        </p:spPr>
-        <p:style>
-          <a:lnRef idx="3">
-            <a:schemeClr val="accent4"/>
-          </a:lnRef>
-          <a:fillRef idx="0">
-            <a:schemeClr val="accent4"/>
-          </a:fillRef>
-          <a:effectRef idx="2">
-            <a:schemeClr val="accent4"/>
-          </a:effectRef>
-          <a:fontRef idx="minor">
-            <a:schemeClr val="tx1"/>
-          </a:fontRef>
-        </p:style>
-      </p:cxnSp>
+      <p:sp>
+        <p:nvSpPr>
+          <p:cNvPr id="58" name="TextBox 57"/>
+          <p:cNvSpPr txBox="1"/>
+          <p:nvPr/>
+        </p:nvSpPr>
+        <p:spPr>
+          <a:xfrm>
+            <a:off x="3518452" y="6082640"/>
+            <a:ext cx="1301895" cy="369332"/>
+          </a:xfrm>
+          <a:prstGeom prst="rect">
+            <a:avLst/>
+          </a:prstGeom>
+          <a:noFill/>
+        </p:spPr>
+        <p:txBody>
+          <a:bodyPr wrap="none" rtlCol="0">
+            <a:spAutoFit/>
+          </a:bodyPr>
+          <a:lstStyle/>
+          <a:p>
+            <a:r>
+              <a:rPr lang="en-US" dirty="0" smtClean="0"/>
+              <a:t>Novel Mesh</a:t>
+            </a:r>
+            <a:endParaRPr lang="en-US" dirty="0"/>
+          </a:p>
+        </p:txBody>
+      </p:sp>
     </p:spTree>
     <p:extLst>
       <p:ext uri="{BB962C8B-B14F-4D97-AF65-F5344CB8AC3E}">

</xml_diff>

<commit_message>
Completing Mesh Labeling. Todo section on generative model
</commit_message>
<xml_diff>
--- a/sources/Guo_Mesh_Labeling.pptx
+++ b/sources/Guo_Mesh_Labeling.pptx
@@ -27,7 +27,11 @@
     <p:sldId id="275" r:id="rId21"/>
     <p:sldId id="276" r:id="rId22"/>
     <p:sldId id="277" r:id="rId23"/>
-    <p:sldId id="278" r:id="rId24"/>
+    <p:sldId id="279" r:id="rId24"/>
+    <p:sldId id="280" r:id="rId25"/>
+    <p:sldId id="281" r:id="rId26"/>
+    <p:sldId id="282" r:id="rId27"/>
+    <p:sldId id="278" r:id="rId28"/>
   </p:sldIdLst>
   <p:sldSz cx="12192000" cy="6858000"/>
   <p:notesSz cx="6858000" cy="9144000"/>
@@ -6602,7 +6606,7 @@
           <a:p>
             <a:r>
               <a:rPr lang="en-US" dirty="0" smtClean="0"/>
-              <a:t>Visualization</a:t>
+              <a:t>Visualization of learned features</a:t>
             </a:r>
             <a:endParaRPr lang="en-US" dirty="0"/>
           </a:p>
@@ -6620,118 +6624,224 @@
         </p:nvSpPr>
         <p:spPr/>
         <p:txBody>
-          <a:bodyPr/>
-          <a:lstStyle/>
-          <a:p>
-            <a:r>
-              <a:rPr lang="en-US" dirty="0" smtClean="0"/>
+          <a:bodyPr>
+            <a:normAutofit/>
+          </a:bodyPr>
+          <a:lstStyle/>
+          <a:p>
+            <a:r>
+              <a:rPr lang="en-US" sz="2400" dirty="0" smtClean="0"/>
               <a:t>After each stage of the CNN, the feature maps (learned weights W</a:t>
             </a:r>
             <a:r>
-              <a:rPr lang="en-US" baseline="-25000" dirty="0" smtClean="0"/>
+              <a:rPr lang="en-US" sz="2400" baseline="-25000" dirty="0" smtClean="0"/>
               <a:t>i</a:t>
             </a:r>
             <a:r>
-              <a:rPr lang="en-US" dirty="0" smtClean="0"/>
+              <a:rPr lang="en-US" sz="2400" dirty="0" smtClean="0"/>
               <a:t> = {w</a:t>
             </a:r>
             <a:r>
-              <a:rPr lang="en-US" baseline="-25000" dirty="0" smtClean="0"/>
+              <a:rPr lang="en-US" sz="2400" baseline="-25000" dirty="0" smtClean="0"/>
               <a:t>i1</a:t>
             </a:r>
             <a:r>
-              <a:rPr lang="en-US" dirty="0" smtClean="0"/>
+              <a:rPr lang="en-US" sz="2400" dirty="0" smtClean="0"/>
               <a:t>, w</a:t>
             </a:r>
             <a:r>
-              <a:rPr lang="en-US" baseline="-25000" dirty="0" smtClean="0"/>
+              <a:rPr lang="en-US" sz="2400" baseline="-25000" dirty="0" smtClean="0"/>
               <a:t>i2</a:t>
             </a:r>
             <a:r>
-              <a:rPr lang="en-US" dirty="0" smtClean="0"/>
+              <a:rPr lang="en-US" sz="2400" dirty="0" smtClean="0"/>
               <a:t>,…w</a:t>
             </a:r>
             <a:r>
-              <a:rPr lang="en-US" baseline="-25000" dirty="0" smtClean="0"/>
+              <a:rPr lang="en-US" sz="2400" baseline="-25000" dirty="0" smtClean="0"/>
               <a:t>in</a:t>
             </a:r>
             <a:r>
-              <a:rPr lang="en-US" dirty="0" smtClean="0"/>
+              <a:rPr lang="en-US" sz="2400" dirty="0" smtClean="0"/>
               <a:t>}) can be used to transform each triangle’s feature vector into some d-dimensional space.</a:t>
             </a:r>
           </a:p>
           <a:p>
             <a:pPr lvl="1"/>
             <a:r>
-              <a:rPr lang="en-US" dirty="0" smtClean="0"/>
+              <a:rPr lang="en-US" sz="2000" dirty="0" smtClean="0"/>
               <a:t>Forward propagate feature vector v for triangle t </a:t>
             </a:r>
             <a:r>
-              <a:rPr lang="en-US" dirty="0" err="1" smtClean="0"/>
+              <a:rPr lang="en-US" sz="2000" dirty="0" err="1" smtClean="0"/>
               <a:t>upto</a:t>
             </a:r>
             <a:r>
-              <a:rPr lang="en-US" dirty="0" smtClean="0"/>
+              <a:rPr lang="en-US" sz="2000" dirty="0" smtClean="0"/>
               <a:t> a layer to get input P to the layer P</a:t>
             </a:r>
             <a:r>
-              <a:rPr lang="en-US" dirty="0" smtClean="0"/>
+              <a:rPr lang="en-US" sz="2000" dirty="0" smtClean="0"/>
               <a:t> = {p</a:t>
             </a:r>
             <a:r>
-              <a:rPr lang="en-US" baseline="-25000" dirty="0" smtClean="0"/>
+              <a:rPr lang="en-US" sz="2000" baseline="-25000" dirty="0" smtClean="0"/>
               <a:t>1</a:t>
             </a:r>
             <a:r>
-              <a:rPr lang="en-US" dirty="0" smtClean="0"/>
+              <a:rPr lang="en-US" sz="2000" dirty="0" smtClean="0"/>
               <a:t>, p</a:t>
             </a:r>
             <a:r>
-              <a:rPr lang="en-US" baseline="-25000" dirty="0" smtClean="0"/>
+              <a:rPr lang="en-US" sz="2000" baseline="-25000" dirty="0" smtClean="0"/>
               <a:t>2</a:t>
             </a:r>
             <a:r>
-              <a:rPr lang="en-US" dirty="0" smtClean="0"/>
+              <a:rPr lang="en-US" sz="2000" dirty="0" smtClean="0"/>
               <a:t>, …</a:t>
             </a:r>
             <a:r>
-              <a:rPr lang="en-US" dirty="0" smtClean="0"/>
+              <a:rPr lang="en-US" sz="2000" dirty="0" smtClean="0"/>
               <a:t>.</a:t>
             </a:r>
             <a:r>
-              <a:rPr lang="en-US" dirty="0" err="1" smtClean="0"/>
+              <a:rPr lang="en-US" sz="2000" dirty="0" err="1" smtClean="0"/>
               <a:t>p</a:t>
             </a:r>
             <a:r>
-              <a:rPr lang="en-US" baseline="-25000" dirty="0" err="1" smtClean="0"/>
+              <a:rPr lang="en-US" sz="2000" baseline="-25000" dirty="0" err="1" smtClean="0"/>
               <a:t>n</a:t>
             </a:r>
             <a:r>
-              <a:rPr lang="en-US" dirty="0" smtClean="0"/>
+              <a:rPr lang="en-US" sz="2000" dirty="0" smtClean="0"/>
               <a:t>}</a:t>
             </a:r>
+            <a:endParaRPr lang="en-US" sz="2000" dirty="0" smtClean="0"/>
+          </a:p>
+          <a:p>
+            <a:pPr lvl="1"/>
+            <a:r>
+              <a:rPr lang="en-US" sz="2000" dirty="0" smtClean="0"/>
+              <a:t>For feature map W</a:t>
+            </a:r>
+            <a:r>
+              <a:rPr lang="en-US" sz="2000" baseline="-25000" dirty="0" smtClean="0"/>
+              <a:t>i</a:t>
+            </a:r>
+            <a:r>
+              <a:rPr lang="en-US" sz="2000" dirty="0" smtClean="0"/>
+              <a:t>, compute </a:t>
+            </a:r>
+            <a:r>
+              <a:rPr lang="en-US" sz="2000" dirty="0" err="1" smtClean="0"/>
+              <a:t>W</a:t>
+            </a:r>
+            <a:r>
+              <a:rPr lang="en-US" sz="2000" baseline="-25000" dirty="0" err="1" smtClean="0"/>
+              <a:t>i</a:t>
+            </a:r>
+            <a:r>
+              <a:rPr lang="en-US" sz="2000" baseline="30000" dirty="0" err="1" smtClean="0"/>
+              <a:t>T</a:t>
+            </a:r>
+            <a:r>
+              <a:rPr lang="en-US" sz="2000" dirty="0" err="1" smtClean="0"/>
+              <a:t>p</a:t>
+            </a:r>
+            <a:r>
+              <a:rPr lang="en-US" sz="2000" dirty="0" smtClean="0"/>
+              <a:t>.</a:t>
+            </a:r>
+          </a:p>
+          <a:p>
+            <a:pPr lvl="1"/>
+            <a:r>
+              <a:rPr lang="en-US" sz="2000" dirty="0" smtClean="0"/>
+              <a:t>Stack the above to get the transformed vector at each stage (input – X, final labels – p, intermediate – Y, v)</a:t>
+            </a:r>
+            <a:endParaRPr lang="en-US" sz="2000" dirty="0"/>
+          </a:p>
+        </p:txBody>
+      </p:sp>
+      <p:pic>
+        <p:nvPicPr>
+          <p:cNvPr id="4" name="Picture 3"/>
+          <p:cNvPicPr>
+            <a:picLocks noChangeAspect="1"/>
+          </p:cNvPicPr>
+          <p:nvPr/>
+        </p:nvPicPr>
+        <p:blipFill>
+          <a:blip r:embed="rId2"/>
+          <a:stretch>
+            <a:fillRect/>
+          </a:stretch>
+        </p:blipFill>
+        <p:spPr>
+          <a:xfrm>
+            <a:off x="4342583" y="4258945"/>
+            <a:ext cx="2576377" cy="2421115"/>
+          </a:xfrm>
+          <a:prstGeom prst="rect">
+            <a:avLst/>
+          </a:prstGeom>
+        </p:spPr>
+      </p:pic>
+      <p:sp>
+        <p:nvSpPr>
+          <p:cNvPr id="5" name="TextBox 4"/>
+          <p:cNvSpPr txBox="1"/>
+          <p:nvPr/>
+        </p:nvSpPr>
+        <p:spPr>
+          <a:xfrm>
+            <a:off x="6918960" y="4124008"/>
+            <a:ext cx="396240" cy="2308324"/>
+          </a:xfrm>
+          <a:prstGeom prst="rect">
+            <a:avLst/>
+          </a:prstGeom>
+          <a:noFill/>
+        </p:spPr>
+        <p:txBody>
+          <a:bodyPr wrap="square" rtlCol="0">
+            <a:spAutoFit/>
+          </a:bodyPr>
+          <a:lstStyle/>
+          <a:p>
+            <a:r>
+              <a:rPr lang="en-US" dirty="0" smtClean="0"/>
+              <a:t>p</a:t>
+            </a:r>
+          </a:p>
+          <a:p>
             <a:endParaRPr lang="en-US" dirty="0" smtClean="0"/>
           </a:p>
           <a:p>
-            <a:pPr lvl="1"/>
-            <a:r>
-              <a:rPr lang="en-US" dirty="0" smtClean="0"/>
-              <a:t>For feature map Wi, compute </a:t>
-            </a:r>
-            <a:r>
-              <a:rPr lang="en-US" dirty="0" err="1" smtClean="0"/>
-              <a:t>WiTp</a:t>
-            </a:r>
-            <a:r>
-              <a:rPr lang="en-US" dirty="0" smtClean="0"/>
-              <a:t>.</a:t>
-            </a:r>
-          </a:p>
-          <a:p>
-            <a:pPr lvl="1"/>
-            <a:r>
-              <a:rPr lang="en-US" dirty="0" smtClean="0"/>
-              <a:t>Stack the above </a:t>
+            <a:r>
+              <a:rPr lang="en-US" dirty="0" smtClean="0"/>
+              <a:t>v</a:t>
+            </a:r>
+          </a:p>
+          <a:p>
+            <a:endParaRPr lang="en-US" dirty="0"/>
+          </a:p>
+          <a:p>
+            <a:r>
+              <a:rPr lang="en-US" dirty="0" smtClean="0"/>
+              <a:t>Y</a:t>
+            </a:r>
+          </a:p>
+          <a:p>
+            <a:endParaRPr lang="en-US" dirty="0"/>
+          </a:p>
+          <a:p>
+            <a:endParaRPr lang="en-US" dirty="0" smtClean="0"/>
+          </a:p>
+          <a:p>
+            <a:r>
+              <a:rPr lang="en-US" dirty="0" smtClean="0"/>
+              <a:t>X</a:t>
             </a:r>
             <a:endParaRPr lang="en-US" dirty="0"/>
           </a:p>
@@ -6784,7 +6894,7 @@
           <a:p>
             <a:r>
               <a:rPr lang="en-US" dirty="0" smtClean="0"/>
-              <a:t>Visualization</a:t>
+              <a:t>Visualization of learned features</a:t>
             </a:r>
             <a:endParaRPr lang="en-US" dirty="0"/>
           </a:p>
@@ -6805,7 +6915,109 @@
           <a:bodyPr/>
           <a:lstStyle/>
           <a:p>
-            <a:endParaRPr lang="en-US"/>
+            <a:r>
+              <a:rPr lang="en-US" dirty="0" smtClean="0"/>
+              <a:t>At each CNN layer, compute a representative feature vector for each label at by averaging all the feature vectors of triangles with the label.</a:t>
+            </a:r>
+          </a:p>
+          <a:p>
+            <a:r>
+              <a:rPr lang="en-US" dirty="0" smtClean="0"/>
+              <a:t>Compute and visualize the distance between the feature vector for a triangle and the average feature vector for its label.</a:t>
+            </a:r>
+          </a:p>
+          <a:p>
+            <a:endParaRPr lang="en-US" dirty="0"/>
+          </a:p>
+        </p:txBody>
+      </p:sp>
+      <p:pic>
+        <p:nvPicPr>
+          <p:cNvPr id="4" name="Picture 3"/>
+          <p:cNvPicPr>
+            <a:picLocks noChangeAspect="1"/>
+          </p:cNvPicPr>
+          <p:nvPr/>
+        </p:nvPicPr>
+        <p:blipFill>
+          <a:blip r:embed="rId2"/>
+          <a:stretch>
+            <a:fillRect/>
+          </a:stretch>
+        </p:blipFill>
+        <p:spPr>
+          <a:xfrm>
+            <a:off x="1585595" y="3567113"/>
+            <a:ext cx="8858250" cy="2609850"/>
+          </a:xfrm>
+          <a:prstGeom prst="rect">
+            <a:avLst/>
+          </a:prstGeom>
+        </p:spPr>
+      </p:pic>
+      <p:sp>
+        <p:nvSpPr>
+          <p:cNvPr id="6" name="TextBox 5"/>
+          <p:cNvSpPr txBox="1"/>
+          <p:nvPr/>
+        </p:nvSpPr>
+        <p:spPr>
+          <a:xfrm>
+            <a:off x="1727200" y="6441440"/>
+            <a:ext cx="8414611" cy="369332"/>
+          </a:xfrm>
+          <a:prstGeom prst="rect">
+            <a:avLst/>
+          </a:prstGeom>
+          <a:noFill/>
+        </p:spPr>
+        <p:txBody>
+          <a:bodyPr wrap="none" rtlCol="0">
+            <a:spAutoFit/>
+          </a:bodyPr>
+          <a:lstStyle/>
+          <a:p>
+            <a:r>
+              <a:rPr lang="en-US" dirty="0" smtClean="0"/>
+              <a:t>Lower Leg     Torso         Upper leg       Foot            Head     Lower Arm   Upper Arm    Hand</a:t>
+            </a:r>
+            <a:endParaRPr lang="en-US" dirty="0"/>
+          </a:p>
+        </p:txBody>
+      </p:sp>
+      <p:sp>
+        <p:nvSpPr>
+          <p:cNvPr id="7" name="TextBox 6"/>
+          <p:cNvSpPr txBox="1"/>
+          <p:nvPr/>
+        </p:nvSpPr>
+        <p:spPr>
+          <a:xfrm>
+            <a:off x="10609696" y="4001294"/>
+            <a:ext cx="1488208" cy="923330"/>
+          </a:xfrm>
+          <a:prstGeom prst="rect">
+            <a:avLst/>
+          </a:prstGeom>
+          <a:noFill/>
+        </p:spPr>
+        <p:txBody>
+          <a:bodyPr wrap="square" rtlCol="0">
+            <a:spAutoFit/>
+          </a:bodyPr>
+          <a:lstStyle/>
+          <a:p>
+            <a:r>
+              <a:rPr lang="en-US" dirty="0" smtClean="0"/>
+              <a:t>X</a:t>
+            </a:r>
+          </a:p>
+          <a:p>
+            <a:r>
+              <a:rPr lang="en-US" dirty="0" smtClean="0"/>
+              <a:t>(Geometry features)</a:t>
+            </a:r>
+            <a:endParaRPr lang="en-US" dirty="0"/>
           </a:p>
         </p:txBody>
       </p:sp>
@@ -6823,6 +7035,841 @@
 </file>
 
 <file path=ppt/slides/slide23.xml><?xml version="1.0" encoding="utf-8"?>
+<p:sld xmlns:a="http://schemas.openxmlformats.org/drawingml/2006/main" xmlns:r="http://schemas.openxmlformats.org/officeDocument/2006/relationships" xmlns:p="http://schemas.openxmlformats.org/presentationml/2006/main">
+  <p:cSld>
+    <p:spTree>
+      <p:nvGrpSpPr>
+        <p:cNvPr id="1" name=""/>
+        <p:cNvGrpSpPr/>
+        <p:nvPr/>
+      </p:nvGrpSpPr>
+      <p:grpSpPr>
+        <a:xfrm>
+          <a:off x="0" y="0"/>
+          <a:ext cx="0" cy="0"/>
+          <a:chOff x="0" y="0"/>
+          <a:chExt cx="0" cy="0"/>
+        </a:xfrm>
+      </p:grpSpPr>
+      <p:sp>
+        <p:nvSpPr>
+          <p:cNvPr id="2" name="Title 1"/>
+          <p:cNvSpPr>
+            <a:spLocks noGrp="1"/>
+          </p:cNvSpPr>
+          <p:nvPr>
+            <p:ph type="title"/>
+          </p:nvPr>
+        </p:nvSpPr>
+        <p:spPr/>
+        <p:txBody>
+          <a:bodyPr/>
+          <a:lstStyle/>
+          <a:p>
+            <a:r>
+              <a:rPr lang="en-US" dirty="0" smtClean="0"/>
+              <a:t>Visualization of learned features</a:t>
+            </a:r>
+            <a:endParaRPr lang="en-US" dirty="0"/>
+          </a:p>
+        </p:txBody>
+      </p:sp>
+      <p:pic>
+        <p:nvPicPr>
+          <p:cNvPr id="6" name="Content Placeholder 5"/>
+          <p:cNvPicPr>
+            <a:picLocks noGrp="1" noChangeAspect="1"/>
+          </p:cNvPicPr>
+          <p:nvPr>
+            <p:ph idx="1"/>
+          </p:nvPr>
+        </p:nvPicPr>
+        <p:blipFill>
+          <a:blip r:embed="rId2"/>
+          <a:stretch>
+            <a:fillRect/>
+          </a:stretch>
+        </p:blipFill>
+        <p:spPr>
+          <a:xfrm>
+            <a:off x="6211743" y="1565671"/>
+            <a:ext cx="4047048" cy="4351338"/>
+          </a:xfrm>
+          <a:prstGeom prst="rect">
+            <a:avLst/>
+          </a:prstGeom>
+        </p:spPr>
+      </p:pic>
+      <p:pic>
+        <p:nvPicPr>
+          <p:cNvPr id="4" name="Picture 3"/>
+          <p:cNvPicPr>
+            <a:picLocks noChangeAspect="1"/>
+          </p:cNvPicPr>
+          <p:nvPr/>
+        </p:nvPicPr>
+        <p:blipFill>
+          <a:blip r:embed="rId3"/>
+          <a:stretch>
+            <a:fillRect/>
+          </a:stretch>
+        </p:blipFill>
+        <p:spPr>
+          <a:xfrm>
+            <a:off x="1706440" y="2033180"/>
+            <a:ext cx="4028420" cy="3785652"/>
+          </a:xfrm>
+          <a:prstGeom prst="rect">
+            <a:avLst/>
+          </a:prstGeom>
+        </p:spPr>
+      </p:pic>
+      <p:sp>
+        <p:nvSpPr>
+          <p:cNvPr id="5" name="TextBox 4"/>
+          <p:cNvSpPr txBox="1"/>
+          <p:nvPr/>
+        </p:nvSpPr>
+        <p:spPr>
+          <a:xfrm>
+            <a:off x="5648274" y="2033180"/>
+            <a:ext cx="563469" cy="3693319"/>
+          </a:xfrm>
+          <a:prstGeom prst="rect">
+            <a:avLst/>
+          </a:prstGeom>
+          <a:noFill/>
+        </p:spPr>
+        <p:txBody>
+          <a:bodyPr wrap="square" rtlCol="0">
+            <a:spAutoFit/>
+          </a:bodyPr>
+          <a:lstStyle/>
+          <a:p>
+            <a:r>
+              <a:rPr lang="en-US" dirty="0" smtClean="0"/>
+              <a:t>p</a:t>
+            </a:r>
+          </a:p>
+          <a:p>
+            <a:endParaRPr lang="en-US" dirty="0" smtClean="0"/>
+          </a:p>
+          <a:p>
+            <a:endParaRPr lang="en-US" dirty="0" smtClean="0"/>
+          </a:p>
+          <a:p>
+            <a:endParaRPr lang="en-US" dirty="0" smtClean="0"/>
+          </a:p>
+          <a:p>
+            <a:r>
+              <a:rPr lang="en-US" dirty="0" smtClean="0"/>
+              <a:t>v</a:t>
+            </a:r>
+          </a:p>
+          <a:p>
+            <a:endParaRPr lang="en-US" dirty="0" smtClean="0"/>
+          </a:p>
+          <a:p>
+            <a:endParaRPr lang="en-US" dirty="0"/>
+          </a:p>
+          <a:p>
+            <a:r>
+              <a:rPr lang="en-US" dirty="0" smtClean="0"/>
+              <a:t>Y</a:t>
+            </a:r>
+          </a:p>
+          <a:p>
+            <a:endParaRPr lang="en-US" dirty="0" smtClean="0"/>
+          </a:p>
+          <a:p>
+            <a:endParaRPr lang="en-US" dirty="0" smtClean="0"/>
+          </a:p>
+          <a:p>
+            <a:endParaRPr lang="en-US" dirty="0"/>
+          </a:p>
+          <a:p>
+            <a:endParaRPr lang="en-US" dirty="0" smtClean="0"/>
+          </a:p>
+          <a:p>
+            <a:r>
+              <a:rPr lang="en-US" dirty="0" smtClean="0"/>
+              <a:t>X</a:t>
+            </a:r>
+            <a:endParaRPr lang="en-US" dirty="0"/>
+          </a:p>
+        </p:txBody>
+      </p:sp>
+      <p:sp>
+        <p:nvSpPr>
+          <p:cNvPr id="7" name="TextBox 6"/>
+          <p:cNvSpPr txBox="1"/>
+          <p:nvPr/>
+        </p:nvSpPr>
+        <p:spPr>
+          <a:xfrm>
+            <a:off x="6051485" y="6044355"/>
+            <a:ext cx="4006225" cy="400110"/>
+          </a:xfrm>
+          <a:prstGeom prst="rect">
+            <a:avLst/>
+          </a:prstGeom>
+          <a:noFill/>
+        </p:spPr>
+        <p:txBody>
+          <a:bodyPr wrap="none" rtlCol="0">
+            <a:spAutoFit/>
+          </a:bodyPr>
+          <a:lstStyle/>
+          <a:p>
+            <a:r>
+              <a:rPr lang="en-US" sz="1000" dirty="0" smtClean="0"/>
+              <a:t>Lower Leg       Torso    Upper leg   Foot      Head  Lower Arm Upper     </a:t>
+            </a:r>
+            <a:r>
+              <a:rPr lang="en-US" sz="1000" dirty="0" smtClean="0"/>
+              <a:t> Hand</a:t>
+            </a:r>
+            <a:endParaRPr lang="en-US" sz="1000" dirty="0" smtClean="0"/>
+          </a:p>
+          <a:p>
+            <a:r>
+              <a:rPr lang="en-US" sz="1000" dirty="0"/>
+              <a:t> </a:t>
+            </a:r>
+            <a:r>
+              <a:rPr lang="en-US" sz="1000" dirty="0" smtClean="0"/>
+              <a:t>                                                                                                           Arm</a:t>
+            </a:r>
+            <a:endParaRPr lang="en-US" sz="1000" dirty="0"/>
+          </a:p>
+        </p:txBody>
+      </p:sp>
+    </p:spTree>
+    <p:extLst>
+      <p:ext uri="{BB962C8B-B14F-4D97-AF65-F5344CB8AC3E}">
+        <p14:creationId xmlns:p14="http://schemas.microsoft.com/office/powerpoint/2010/main" val="1466299332"/>
+      </p:ext>
+    </p:extLst>
+  </p:cSld>
+  <p:clrMapOvr>
+    <a:masterClrMapping/>
+  </p:clrMapOvr>
+</p:sld>
+</file>
+
+<file path=ppt/slides/slide24.xml><?xml version="1.0" encoding="utf-8"?>
+<p:sld xmlns:a="http://schemas.openxmlformats.org/drawingml/2006/main" xmlns:r="http://schemas.openxmlformats.org/officeDocument/2006/relationships" xmlns:p="http://schemas.openxmlformats.org/presentationml/2006/main">
+  <p:cSld>
+    <p:spTree>
+      <p:nvGrpSpPr>
+        <p:cNvPr id="1" name=""/>
+        <p:cNvGrpSpPr/>
+        <p:nvPr/>
+      </p:nvGrpSpPr>
+      <p:grpSpPr>
+        <a:xfrm>
+          <a:off x="0" y="0"/>
+          <a:ext cx="0" cy="0"/>
+          <a:chOff x="0" y="0"/>
+          <a:chExt cx="0" cy="0"/>
+        </a:xfrm>
+      </p:grpSpPr>
+      <p:sp>
+        <p:nvSpPr>
+          <p:cNvPr id="2" name="Title 1"/>
+          <p:cNvSpPr>
+            <a:spLocks noGrp="1"/>
+          </p:cNvSpPr>
+          <p:nvPr>
+            <p:ph type="title"/>
+          </p:nvPr>
+        </p:nvSpPr>
+        <p:spPr/>
+        <p:txBody>
+          <a:bodyPr/>
+          <a:lstStyle/>
+          <a:p>
+            <a:r>
+              <a:rPr lang="en-US" dirty="0" smtClean="0"/>
+              <a:t>Visualization of learned features – Approach 2</a:t>
+            </a:r>
+            <a:endParaRPr lang="en-US" dirty="0"/>
+          </a:p>
+        </p:txBody>
+      </p:sp>
+      <p:sp>
+        <p:nvSpPr>
+          <p:cNvPr id="3" name="Content Placeholder 2"/>
+          <p:cNvSpPr>
+            <a:spLocks noGrp="1"/>
+          </p:cNvSpPr>
+          <p:nvPr>
+            <p:ph idx="1"/>
+          </p:nvPr>
+        </p:nvSpPr>
+        <p:spPr/>
+        <p:txBody>
+          <a:bodyPr/>
+          <a:lstStyle/>
+          <a:p>
+            <a:r>
+              <a:rPr lang="en-US" dirty="0" smtClean="0"/>
+              <a:t>K-Means cluster the vectors and color each triangle based on cluster it belongs to</a:t>
+            </a:r>
+            <a:endParaRPr lang="en-US" dirty="0"/>
+          </a:p>
+        </p:txBody>
+      </p:sp>
+      <p:pic>
+        <p:nvPicPr>
+          <p:cNvPr id="4" name="Picture 3"/>
+          <p:cNvPicPr>
+            <a:picLocks noChangeAspect="1"/>
+          </p:cNvPicPr>
+          <p:nvPr/>
+        </p:nvPicPr>
+        <p:blipFill>
+          <a:blip r:embed="rId2"/>
+          <a:stretch>
+            <a:fillRect/>
+          </a:stretch>
+        </p:blipFill>
+        <p:spPr>
+          <a:xfrm>
+            <a:off x="4909502" y="3036572"/>
+            <a:ext cx="2935025" cy="3140391"/>
+          </a:xfrm>
+          <a:prstGeom prst="rect">
+            <a:avLst/>
+          </a:prstGeom>
+        </p:spPr>
+      </p:pic>
+      <p:sp>
+        <p:nvSpPr>
+          <p:cNvPr id="7" name="TextBox 6"/>
+          <p:cNvSpPr txBox="1"/>
+          <p:nvPr/>
+        </p:nvSpPr>
+        <p:spPr>
+          <a:xfrm>
+            <a:off x="5156167" y="2665972"/>
+            <a:ext cx="2547492" cy="369332"/>
+          </a:xfrm>
+          <a:prstGeom prst="rect">
+            <a:avLst/>
+          </a:prstGeom>
+          <a:noFill/>
+        </p:spPr>
+        <p:txBody>
+          <a:bodyPr wrap="none" rtlCol="0">
+            <a:spAutoFit/>
+          </a:bodyPr>
+          <a:lstStyle/>
+          <a:p>
+            <a:r>
+              <a:rPr lang="en-US" dirty="0" smtClean="0"/>
+              <a:t>X            Y             p           v</a:t>
+            </a:r>
+            <a:endParaRPr lang="en-US" dirty="0"/>
+          </a:p>
+        </p:txBody>
+      </p:sp>
+    </p:spTree>
+    <p:extLst>
+      <p:ext uri="{BB962C8B-B14F-4D97-AF65-F5344CB8AC3E}">
+        <p14:creationId xmlns:p14="http://schemas.microsoft.com/office/powerpoint/2010/main" val="3726196946"/>
+      </p:ext>
+    </p:extLst>
+  </p:cSld>
+  <p:clrMapOvr>
+    <a:masterClrMapping/>
+  </p:clrMapOvr>
+</p:sld>
+</file>
+
+<file path=ppt/slides/slide25.xml><?xml version="1.0" encoding="utf-8"?>
+<p:sld xmlns:a="http://schemas.openxmlformats.org/drawingml/2006/main" xmlns:r="http://schemas.openxmlformats.org/officeDocument/2006/relationships" xmlns:p="http://schemas.openxmlformats.org/presentationml/2006/main">
+  <p:cSld>
+    <p:spTree>
+      <p:nvGrpSpPr>
+        <p:cNvPr id="1" name=""/>
+        <p:cNvGrpSpPr/>
+        <p:nvPr/>
+      </p:nvGrpSpPr>
+      <p:grpSpPr>
+        <a:xfrm>
+          <a:off x="0" y="0"/>
+          <a:ext cx="0" cy="0"/>
+          <a:chOff x="0" y="0"/>
+          <a:chExt cx="0" cy="0"/>
+        </a:xfrm>
+      </p:grpSpPr>
+      <p:sp>
+        <p:nvSpPr>
+          <p:cNvPr id="2" name="Title 1"/>
+          <p:cNvSpPr>
+            <a:spLocks noGrp="1"/>
+          </p:cNvSpPr>
+          <p:nvPr>
+            <p:ph type="title"/>
+          </p:nvPr>
+        </p:nvSpPr>
+        <p:spPr/>
+        <p:txBody>
+          <a:bodyPr/>
+          <a:lstStyle/>
+          <a:p>
+            <a:r>
+              <a:rPr lang="en-US" dirty="0" smtClean="0"/>
+              <a:t>Comparison with learning a linear combination of features</a:t>
+            </a:r>
+            <a:endParaRPr lang="en-US" dirty="0"/>
+          </a:p>
+        </p:txBody>
+      </p:sp>
+      <p:pic>
+        <p:nvPicPr>
+          <p:cNvPr id="4" name="Content Placeholder 3"/>
+          <p:cNvPicPr>
+            <a:picLocks noGrp="1" noChangeAspect="1"/>
+          </p:cNvPicPr>
+          <p:nvPr>
+            <p:ph idx="1"/>
+          </p:nvPr>
+        </p:nvPicPr>
+        <p:blipFill>
+          <a:blip r:embed="rId2"/>
+          <a:stretch>
+            <a:fillRect/>
+          </a:stretch>
+        </p:blipFill>
+        <p:spPr>
+          <a:xfrm>
+            <a:off x="1852612" y="2367756"/>
+            <a:ext cx="8486775" cy="3267075"/>
+          </a:xfrm>
+          <a:prstGeom prst="rect">
+            <a:avLst/>
+          </a:prstGeom>
+        </p:spPr>
+      </p:pic>
+      <p:cxnSp>
+        <p:nvCxnSpPr>
+          <p:cNvPr id="6" name="Straight Arrow Connector 5"/>
+          <p:cNvCxnSpPr/>
+          <p:nvPr/>
+        </p:nvCxnSpPr>
+        <p:spPr>
+          <a:xfrm flipH="1" flipV="1">
+            <a:off x="10339387" y="4551680"/>
+            <a:ext cx="795973" cy="10160"/>
+          </a:xfrm>
+          <a:prstGeom prst="straightConnector1">
+            <a:avLst/>
+          </a:prstGeom>
+          <a:ln>
+            <a:tailEnd type="triangle"/>
+          </a:ln>
+        </p:spPr>
+        <p:style>
+          <a:lnRef idx="1">
+            <a:schemeClr val="accent1"/>
+          </a:lnRef>
+          <a:fillRef idx="0">
+            <a:schemeClr val="accent1"/>
+          </a:fillRef>
+          <a:effectRef idx="0">
+            <a:schemeClr val="accent1"/>
+          </a:effectRef>
+          <a:fontRef idx="minor">
+            <a:schemeClr val="tx1"/>
+          </a:fontRef>
+        </p:style>
+      </p:cxnSp>
+      <p:sp>
+        <p:nvSpPr>
+          <p:cNvPr id="7" name="TextBox 6"/>
+          <p:cNvSpPr txBox="1"/>
+          <p:nvPr/>
+        </p:nvSpPr>
+        <p:spPr>
+          <a:xfrm>
+            <a:off x="11247120" y="4377174"/>
+            <a:ext cx="606256" cy="369332"/>
+          </a:xfrm>
+          <a:prstGeom prst="rect">
+            <a:avLst/>
+          </a:prstGeom>
+          <a:noFill/>
+        </p:spPr>
+        <p:txBody>
+          <a:bodyPr wrap="none" rtlCol="0">
+            <a:spAutoFit/>
+          </a:bodyPr>
+          <a:lstStyle/>
+          <a:p>
+            <a:r>
+              <a:rPr lang="en-US" dirty="0" smtClean="0"/>
+              <a:t>CNN</a:t>
+            </a:r>
+            <a:endParaRPr lang="en-US" dirty="0"/>
+          </a:p>
+        </p:txBody>
+      </p:sp>
+      <p:sp>
+        <p:nvSpPr>
+          <p:cNvPr id="8" name="TextBox 7"/>
+          <p:cNvSpPr txBox="1"/>
+          <p:nvPr/>
+        </p:nvSpPr>
+        <p:spPr>
+          <a:xfrm>
+            <a:off x="10753684" y="2849265"/>
+            <a:ext cx="763351" cy="369332"/>
+          </a:xfrm>
+          <a:prstGeom prst="rect">
+            <a:avLst/>
+          </a:prstGeom>
+          <a:noFill/>
+        </p:spPr>
+        <p:txBody>
+          <a:bodyPr wrap="none" rtlCol="0">
+            <a:spAutoFit/>
+          </a:bodyPr>
+          <a:lstStyle/>
+          <a:p>
+            <a:r>
+              <a:rPr lang="en-US" dirty="0" smtClean="0"/>
+              <a:t>Linear</a:t>
+            </a:r>
+            <a:endParaRPr lang="en-US" dirty="0"/>
+          </a:p>
+        </p:txBody>
+      </p:sp>
+      <p:cxnSp>
+        <p:nvCxnSpPr>
+          <p:cNvPr id="10" name="Straight Arrow Connector 9"/>
+          <p:cNvCxnSpPr>
+            <a:stCxn id="8" idx="1"/>
+          </p:cNvCxnSpPr>
+          <p:nvPr/>
+        </p:nvCxnSpPr>
+        <p:spPr>
+          <a:xfrm flipH="1">
+            <a:off x="10372010" y="3011379"/>
+            <a:ext cx="381674" cy="2630"/>
+          </a:xfrm>
+          <a:prstGeom prst="straightConnector1">
+            <a:avLst/>
+          </a:prstGeom>
+          <a:ln>
+            <a:tailEnd type="triangle"/>
+          </a:ln>
+        </p:spPr>
+        <p:style>
+          <a:lnRef idx="1">
+            <a:schemeClr val="accent1"/>
+          </a:lnRef>
+          <a:fillRef idx="0">
+            <a:schemeClr val="accent1"/>
+          </a:fillRef>
+          <a:effectRef idx="0">
+            <a:schemeClr val="accent1"/>
+          </a:effectRef>
+          <a:fontRef idx="minor">
+            <a:schemeClr val="tx1"/>
+          </a:fontRef>
+        </p:style>
+      </p:cxnSp>
+    </p:spTree>
+    <p:extLst>
+      <p:ext uri="{BB962C8B-B14F-4D97-AF65-F5344CB8AC3E}">
+        <p14:creationId xmlns:p14="http://schemas.microsoft.com/office/powerpoint/2010/main" val="2293147299"/>
+      </p:ext>
+    </p:extLst>
+  </p:cSld>
+  <p:clrMapOvr>
+    <a:masterClrMapping/>
+  </p:clrMapOvr>
+</p:sld>
+</file>
+
+<file path=ppt/slides/slide26.xml><?xml version="1.0" encoding="utf-8"?>
+<p:sld xmlns:a="http://schemas.openxmlformats.org/drawingml/2006/main" xmlns:r="http://schemas.openxmlformats.org/officeDocument/2006/relationships" xmlns:p="http://schemas.openxmlformats.org/presentationml/2006/main">
+  <p:cSld>
+    <p:spTree>
+      <p:nvGrpSpPr>
+        <p:cNvPr id="1" name=""/>
+        <p:cNvGrpSpPr/>
+        <p:nvPr/>
+      </p:nvGrpSpPr>
+      <p:grpSpPr>
+        <a:xfrm>
+          <a:off x="0" y="0"/>
+          <a:ext cx="0" cy="0"/>
+          <a:chOff x="0" y="0"/>
+          <a:chExt cx="0" cy="0"/>
+        </a:xfrm>
+      </p:grpSpPr>
+      <p:sp>
+        <p:nvSpPr>
+          <p:cNvPr id="2" name="Title 1"/>
+          <p:cNvSpPr>
+            <a:spLocks noGrp="1"/>
+          </p:cNvSpPr>
+          <p:nvPr>
+            <p:ph type="title"/>
+          </p:nvPr>
+        </p:nvSpPr>
+        <p:spPr/>
+        <p:txBody>
+          <a:bodyPr/>
+          <a:lstStyle/>
+          <a:p>
+            <a:r>
+              <a:rPr lang="en-US" dirty="0" smtClean="0"/>
+              <a:t>Blended categories and transfer of learning</a:t>
+            </a:r>
+            <a:endParaRPr lang="en-US" dirty="0"/>
+          </a:p>
+        </p:txBody>
+      </p:sp>
+      <p:pic>
+        <p:nvPicPr>
+          <p:cNvPr id="6" name="Content Placeholder 5"/>
+          <p:cNvPicPr>
+            <a:picLocks noGrp="1" noChangeAspect="1"/>
+          </p:cNvPicPr>
+          <p:nvPr>
+            <p:ph idx="1"/>
+          </p:nvPr>
+        </p:nvPicPr>
+        <p:blipFill>
+          <a:blip r:embed="rId2"/>
+          <a:stretch>
+            <a:fillRect/>
+          </a:stretch>
+        </p:blipFill>
+        <p:spPr>
+          <a:xfrm>
+            <a:off x="3169602" y="3491070"/>
+            <a:ext cx="6238875" cy="1066800"/>
+          </a:xfrm>
+          <a:prstGeom prst="rect">
+            <a:avLst/>
+          </a:prstGeom>
+        </p:spPr>
+      </p:pic>
+      <p:pic>
+        <p:nvPicPr>
+          <p:cNvPr id="5" name="Picture 4"/>
+          <p:cNvPicPr>
+            <a:picLocks noChangeAspect="1"/>
+          </p:cNvPicPr>
+          <p:nvPr/>
+        </p:nvPicPr>
+        <p:blipFill>
+          <a:blip r:embed="rId3"/>
+          <a:stretch>
+            <a:fillRect/>
+          </a:stretch>
+        </p:blipFill>
+        <p:spPr>
+          <a:xfrm>
+            <a:off x="3088322" y="1637585"/>
+            <a:ext cx="6229350" cy="1647825"/>
+          </a:xfrm>
+          <a:prstGeom prst="rect">
+            <a:avLst/>
+          </a:prstGeom>
+        </p:spPr>
+      </p:pic>
+      <p:pic>
+        <p:nvPicPr>
+          <p:cNvPr id="7" name="Picture 6"/>
+          <p:cNvPicPr>
+            <a:picLocks noChangeAspect="1"/>
+          </p:cNvPicPr>
+          <p:nvPr/>
+        </p:nvPicPr>
+        <p:blipFill>
+          <a:blip r:embed="rId4"/>
+          <a:stretch>
+            <a:fillRect/>
+          </a:stretch>
+        </p:blipFill>
+        <p:spPr>
+          <a:xfrm>
+            <a:off x="3169602" y="5024752"/>
+            <a:ext cx="6181725" cy="1333500"/>
+          </a:xfrm>
+          <a:prstGeom prst="rect">
+            <a:avLst/>
+          </a:prstGeom>
+        </p:spPr>
+      </p:pic>
+      <p:sp>
+        <p:nvSpPr>
+          <p:cNvPr id="8" name="TextBox 7"/>
+          <p:cNvSpPr txBox="1"/>
+          <p:nvPr/>
+        </p:nvSpPr>
+        <p:spPr>
+          <a:xfrm>
+            <a:off x="3944827" y="4628276"/>
+            <a:ext cx="4861780" cy="369332"/>
+          </a:xfrm>
+          <a:prstGeom prst="rect">
+            <a:avLst/>
+          </a:prstGeom>
+          <a:noFill/>
+        </p:spPr>
+        <p:txBody>
+          <a:bodyPr wrap="none" rtlCol="0">
+            <a:spAutoFit/>
+          </a:bodyPr>
+          <a:lstStyle/>
+          <a:p>
+            <a:r>
+              <a:rPr lang="en-US" dirty="0" smtClean="0"/>
+              <a:t>Training                                                            Testing</a:t>
+            </a:r>
+            <a:endParaRPr lang="en-US" dirty="0"/>
+          </a:p>
+        </p:txBody>
+      </p:sp>
+      <p:cxnSp>
+        <p:nvCxnSpPr>
+          <p:cNvPr id="10" name="Straight Arrow Connector 9"/>
+          <p:cNvCxnSpPr/>
+          <p:nvPr/>
+        </p:nvCxnSpPr>
+        <p:spPr>
+          <a:xfrm>
+            <a:off x="2225040" y="1690688"/>
+            <a:ext cx="0" cy="2867182"/>
+          </a:xfrm>
+          <a:prstGeom prst="straightConnector1">
+            <a:avLst/>
+          </a:prstGeom>
+          <a:ln>
+            <a:headEnd type="triangle"/>
+            <a:tailEnd type="triangle"/>
+          </a:ln>
+        </p:spPr>
+        <p:style>
+          <a:lnRef idx="1">
+            <a:schemeClr val="accent1"/>
+          </a:lnRef>
+          <a:fillRef idx="0">
+            <a:schemeClr val="accent1"/>
+          </a:fillRef>
+          <a:effectRef idx="0">
+            <a:schemeClr val="accent1"/>
+          </a:effectRef>
+          <a:fontRef idx="minor">
+            <a:schemeClr val="tx1"/>
+          </a:fontRef>
+        </p:style>
+      </p:cxnSp>
+      <p:sp>
+        <p:nvSpPr>
+          <p:cNvPr id="11" name="TextBox 10"/>
+          <p:cNvSpPr txBox="1"/>
+          <p:nvPr/>
+        </p:nvSpPr>
+        <p:spPr>
+          <a:xfrm rot="16200000">
+            <a:off x="1039844" y="3100743"/>
+            <a:ext cx="2001061" cy="369332"/>
+          </a:xfrm>
+          <a:prstGeom prst="rect">
+            <a:avLst/>
+          </a:prstGeom>
+          <a:noFill/>
+        </p:spPr>
+        <p:txBody>
+          <a:bodyPr wrap="none" rtlCol="0">
+            <a:spAutoFit/>
+          </a:bodyPr>
+          <a:lstStyle/>
+          <a:p>
+            <a:r>
+              <a:rPr lang="en-US" dirty="0" smtClean="0"/>
+              <a:t>Blended Categories</a:t>
+            </a:r>
+            <a:endParaRPr lang="en-US" dirty="0"/>
+          </a:p>
+        </p:txBody>
+      </p:sp>
+      <p:sp>
+        <p:nvSpPr>
+          <p:cNvPr id="12" name="TextBox 11"/>
+          <p:cNvSpPr txBox="1"/>
+          <p:nvPr/>
+        </p:nvSpPr>
+        <p:spPr>
+          <a:xfrm>
+            <a:off x="1344542" y="5011340"/>
+            <a:ext cx="1391663" cy="1477328"/>
+          </a:xfrm>
+          <a:prstGeom prst="rect">
+            <a:avLst/>
+          </a:prstGeom>
+          <a:noFill/>
+        </p:spPr>
+        <p:txBody>
+          <a:bodyPr wrap="none" rtlCol="0">
+            <a:spAutoFit/>
+          </a:bodyPr>
+          <a:lstStyle/>
+          <a:p>
+            <a:r>
+              <a:rPr lang="en-US" dirty="0" smtClean="0"/>
+              <a:t>Learning</a:t>
+            </a:r>
+          </a:p>
+          <a:p>
+            <a:r>
+              <a:rPr lang="en-US" dirty="0" smtClean="0"/>
+              <a:t>Transfers to</a:t>
+            </a:r>
+          </a:p>
+          <a:p>
+            <a:r>
+              <a:rPr lang="en-US" dirty="0" smtClean="0"/>
+              <a:t>similar, but </a:t>
+            </a:r>
+          </a:p>
+          <a:p>
+            <a:r>
+              <a:rPr lang="en-US" dirty="0" smtClean="0"/>
+              <a:t>novel object </a:t>
+            </a:r>
+          </a:p>
+          <a:p>
+            <a:r>
+              <a:rPr lang="en-US" dirty="0" smtClean="0"/>
+              <a:t>classes</a:t>
+            </a:r>
+            <a:endParaRPr lang="en-US" dirty="0"/>
+          </a:p>
+        </p:txBody>
+      </p:sp>
+    </p:spTree>
+    <p:extLst>
+      <p:ext uri="{BB962C8B-B14F-4D97-AF65-F5344CB8AC3E}">
+        <p14:creationId xmlns:p14="http://schemas.microsoft.com/office/powerpoint/2010/main" val="1303945767"/>
+      </p:ext>
+    </p:extLst>
+  </p:cSld>
+  <p:clrMapOvr>
+    <a:masterClrMapping/>
+  </p:clrMapOvr>
+</p:sld>
+</file>
+
+<file path=ppt/slides/slide27.xml><?xml version="1.0" encoding="utf-8"?>
 <p:sld xmlns:a="http://schemas.openxmlformats.org/drawingml/2006/main" xmlns:r="http://schemas.openxmlformats.org/officeDocument/2006/relationships" xmlns:p="http://schemas.openxmlformats.org/presentationml/2006/main">
   <p:cSld>
     <p:spTree>

</xml_diff>

<commit_message>
Adding final presentation and publishing to psf
</commit_message>
<xml_diff>
--- a/sources/Guo_Mesh_Labeling.pptx
+++ b/sources/Guo_Mesh_Labeling.pptx
@@ -135,6 +135,11 @@
       </a:defRPr>
     </a:lvl9pPr>
   </p:defaultTextStyle>
+  <p:extLst>
+    <p:ext uri="{EFAFB233-063F-42B5-8137-9DF3F51BA10A}">
+      <p15:sldGuideLst xmlns:p15="http://schemas.microsoft.com/office/powerpoint/2012/main"/>
+    </p:ext>
+  </p:extLst>
 </p:presentation>
 </file>
 
@@ -269,7 +274,7 @@
           <a:p>
             <a:fld id="{725C34B6-1103-4777-865D-4EEE87E9CB6F}" type="datetimeFigureOut">
               <a:rPr lang="en-US" smtClean="0"/>
-              <a:t>2/21/2016</a:t>
+              <a:t>2/22/2016</a:t>
             </a:fld>
             <a:endParaRPr lang="en-US"/>
           </a:p>
@@ -439,7 +444,7 @@
           <a:p>
             <a:fld id="{725C34B6-1103-4777-865D-4EEE87E9CB6F}" type="datetimeFigureOut">
               <a:rPr lang="en-US" smtClean="0"/>
-              <a:t>2/21/2016</a:t>
+              <a:t>2/22/2016</a:t>
             </a:fld>
             <a:endParaRPr lang="en-US"/>
           </a:p>
@@ -619,7 +624,7 @@
           <a:p>
             <a:fld id="{725C34B6-1103-4777-865D-4EEE87E9CB6F}" type="datetimeFigureOut">
               <a:rPr lang="en-US" smtClean="0"/>
-              <a:t>2/21/2016</a:t>
+              <a:t>2/22/2016</a:t>
             </a:fld>
             <a:endParaRPr lang="en-US"/>
           </a:p>
@@ -789,7 +794,7 @@
           <a:p>
             <a:fld id="{725C34B6-1103-4777-865D-4EEE87E9CB6F}" type="datetimeFigureOut">
               <a:rPr lang="en-US" smtClean="0"/>
-              <a:t>2/21/2016</a:t>
+              <a:t>2/22/2016</a:t>
             </a:fld>
             <a:endParaRPr lang="en-US"/>
           </a:p>
@@ -1035,7 +1040,7 @@
           <a:p>
             <a:fld id="{725C34B6-1103-4777-865D-4EEE87E9CB6F}" type="datetimeFigureOut">
               <a:rPr lang="en-US" smtClean="0"/>
-              <a:t>2/21/2016</a:t>
+              <a:t>2/22/2016</a:t>
             </a:fld>
             <a:endParaRPr lang="en-US"/>
           </a:p>
@@ -1267,7 +1272,7 @@
           <a:p>
             <a:fld id="{725C34B6-1103-4777-865D-4EEE87E9CB6F}" type="datetimeFigureOut">
               <a:rPr lang="en-US" smtClean="0"/>
-              <a:t>2/21/2016</a:t>
+              <a:t>2/22/2016</a:t>
             </a:fld>
             <a:endParaRPr lang="en-US"/>
           </a:p>
@@ -1634,7 +1639,7 @@
           <a:p>
             <a:fld id="{725C34B6-1103-4777-865D-4EEE87E9CB6F}" type="datetimeFigureOut">
               <a:rPr lang="en-US" smtClean="0"/>
-              <a:t>2/21/2016</a:t>
+              <a:t>2/22/2016</a:t>
             </a:fld>
             <a:endParaRPr lang="en-US"/>
           </a:p>
@@ -1752,7 +1757,7 @@
           <a:p>
             <a:fld id="{725C34B6-1103-4777-865D-4EEE87E9CB6F}" type="datetimeFigureOut">
               <a:rPr lang="en-US" smtClean="0"/>
-              <a:t>2/21/2016</a:t>
+              <a:t>2/22/2016</a:t>
             </a:fld>
             <a:endParaRPr lang="en-US"/>
           </a:p>
@@ -1847,7 +1852,7 @@
           <a:p>
             <a:fld id="{725C34B6-1103-4777-865D-4EEE87E9CB6F}" type="datetimeFigureOut">
               <a:rPr lang="en-US" smtClean="0"/>
-              <a:t>2/21/2016</a:t>
+              <a:t>2/22/2016</a:t>
             </a:fld>
             <a:endParaRPr lang="en-US"/>
           </a:p>
@@ -2124,7 +2129,7 @@
           <a:p>
             <a:fld id="{725C34B6-1103-4777-865D-4EEE87E9CB6F}" type="datetimeFigureOut">
               <a:rPr lang="en-US" smtClean="0"/>
-              <a:t>2/21/2016</a:t>
+              <a:t>2/22/2016</a:t>
             </a:fld>
             <a:endParaRPr lang="en-US"/>
           </a:p>
@@ -2377,7 +2382,7 @@
           <a:p>
             <a:fld id="{725C34B6-1103-4777-865D-4EEE87E9CB6F}" type="datetimeFigureOut">
               <a:rPr lang="en-US" smtClean="0"/>
-              <a:t>2/21/2016</a:t>
+              <a:t>2/22/2016</a:t>
             </a:fld>
             <a:endParaRPr lang="en-US"/>
           </a:p>
@@ -2590,7 +2595,7 @@
           <a:p>
             <a:fld id="{725C34B6-1103-4777-865D-4EEE87E9CB6F}" type="datetimeFigureOut">
               <a:rPr lang="en-US" smtClean="0"/>
-              <a:t>2/21/2016</a:t>
+              <a:t>2/22/2016</a:t>
             </a:fld>
             <a:endParaRPr lang="en-US"/>
           </a:p>
@@ -3286,7 +3291,7 @@
         </p:nvSpPr>
         <p:spPr>
           <a:xfrm>
-            <a:off x="3213210" y="4480118"/>
+            <a:off x="3241785" y="5070668"/>
             <a:ext cx="6405087" cy="1569660"/>
           </a:xfrm>
           <a:prstGeom prst="rect">
@@ -4563,15 +4568,7 @@
           <a:p>
             <a:r>
               <a:rPr lang="en-US" dirty="0" smtClean="0"/>
-              <a:t>Label Optimization – </a:t>
-            </a:r>
-            <a:r>
-              <a:rPr lang="en-US" dirty="0" smtClean="0"/>
-              <a:t>(Local) </a:t>
-            </a:r>
-            <a:r>
-              <a:rPr lang="en-US" dirty="0" smtClean="0"/>
-              <a:t>Objective minimization using multi-label graph-cuts</a:t>
+              <a:t>Label Optimization – (Local) Objective minimization using multi-label graph-cuts</a:t>
             </a:r>
             <a:endParaRPr lang="en-US" dirty="0"/>
           </a:p>
@@ -6683,11 +6680,7 @@
             </a:r>
             <a:r>
               <a:rPr lang="en-US" sz="2000" dirty="0" smtClean="0"/>
-              <a:t> a layer to get input P to the layer P</a:t>
-            </a:r>
-            <a:r>
-              <a:rPr lang="en-US" sz="2000" dirty="0" smtClean="0"/>
-              <a:t> = {p</a:t>
+              <a:t> a layer to get input P to the layer P = {p</a:t>
             </a:r>
             <a:r>
               <a:rPr lang="en-US" sz="2000" baseline="-25000" dirty="0" smtClean="0"/>
@@ -6703,11 +6696,7 @@
             </a:r>
             <a:r>
               <a:rPr lang="en-US" sz="2000" dirty="0" smtClean="0"/>
-              <a:t>, …</a:t>
-            </a:r>
-            <a:r>
-              <a:rPr lang="en-US" sz="2000" dirty="0" smtClean="0"/>
-              <a:t>.</a:t>
+              <a:t>, ….</a:t>
             </a:r>
             <a:r>
               <a:rPr lang="en-US" sz="2000" dirty="0" err="1" smtClean="0"/>
@@ -6721,7 +6710,6 @@
               <a:rPr lang="en-US" sz="2000" dirty="0" smtClean="0"/>
               <a:t>}</a:t>
             </a:r>
-            <a:endParaRPr lang="en-US" sz="2000" dirty="0" smtClean="0"/>
           </a:p>
           <a:p>
             <a:pPr lvl="1"/>
@@ -7228,13 +7216,8 @@
           <a:p>
             <a:r>
               <a:rPr lang="en-US" sz="1000" dirty="0" smtClean="0"/>
-              <a:t>Lower Leg       Torso    Upper leg   Foot      Head  Lower Arm Upper     </a:t>
-            </a:r>
-            <a:r>
-              <a:rPr lang="en-US" sz="1000" dirty="0" smtClean="0"/>
-              <a:t> Hand</a:t>
-            </a:r>
-            <a:endParaRPr lang="en-US" sz="1000" dirty="0" smtClean="0"/>
+              <a:t>Lower Leg       Torso    Upper leg   Foot      Head  Lower Arm Upper      Hand</a:t>
+            </a:r>
           </a:p>
           <a:p>
             <a:r>
@@ -9921,11 +9904,7 @@
           <a:p>
             <a:r>
               <a:rPr lang="en-US" dirty="0" smtClean="0"/>
-              <a:t>Model the probability distribution of each label: </a:t>
-            </a:r>
-            <a:r>
-              <a:rPr lang="en-US" dirty="0" smtClean="0"/>
-              <a:t>p(label | v) = f(</a:t>
+              <a:t>Model the probability distribution of each label: p(label | v) = f(</a:t>
             </a:r>
             <a:r>
               <a:rPr lang="az-Cyrl-AZ" dirty="0" smtClean="0"/>
@@ -9962,7 +9941,6 @@
               <a:rPr lang="en-US" dirty="0" smtClean="0"/>
               <a:t> from input data for each label.</a:t>
             </a:r>
-            <a:endParaRPr lang="en-US" dirty="0" smtClean="0"/>
           </a:p>
         </p:txBody>
       </p:sp>

</xml_diff>